<commit_message>
tentativo de feedback y summary
</commit_message>
<xml_diff>
--- a/DesigningTestableApplications v2.pptx
+++ b/DesigningTestableApplications v2.pptx
@@ -6,10 +6,10 @@
     <p:sldMasterId id="2147483944" r:id="rId3"/>
   </p:sldMasterIdLst>
   <p:notesMasterIdLst>
-    <p:notesMasterId r:id="rId25"/>
+    <p:notesMasterId r:id="rId28"/>
   </p:notesMasterIdLst>
   <p:handoutMasterIdLst>
-    <p:handoutMasterId r:id="rId26"/>
+    <p:handoutMasterId r:id="rId29"/>
   </p:handoutMasterIdLst>
   <p:sldIdLst>
     <p:sldId id="321" r:id="rId4"/>
@@ -31,8 +31,11 @@
     <p:sldId id="375" r:id="rId20"/>
     <p:sldId id="376" r:id="rId21"/>
     <p:sldId id="377" r:id="rId22"/>
-    <p:sldId id="378" r:id="rId23"/>
-    <p:sldId id="349" r:id="rId24"/>
+    <p:sldId id="383" r:id="rId23"/>
+    <p:sldId id="384" r:id="rId24"/>
+    <p:sldId id="378" r:id="rId25"/>
+    <p:sldId id="382" r:id="rId26"/>
+    <p:sldId id="349" r:id="rId27"/>
   </p:sldIdLst>
   <p:sldSz cx="12192000" cy="6858000"/>
   <p:notesSz cx="6858000" cy="9144000"/>
@@ -21700,7 +21703,7 @@
                   <a:ea typeface="ＭＳ Ｐゴシック" charset="-128"/>
                   <a:cs typeface="Segoe UI Light" panose="020B0502040204020203" pitchFamily="34" charset="0"/>
                 </a:rPr>
-                <a:t>Summary</a:t>
+                <a:t>Feedback</a:t>
               </a:r>
               <a:endParaRPr lang="da-DK" dirty="0">
                 <a:solidFill>
@@ -21930,7 +21933,7 @@
                   <a:ea typeface="ＭＳ Ｐゴシック" charset="-128"/>
                   <a:cs typeface="Segoe UI Light" panose="020B0502040204020203" pitchFamily="34" charset="0"/>
                 </a:rPr>
-                <a:t>Feedback</a:t>
+                <a:t>Summary</a:t>
               </a:r>
               <a:endParaRPr lang="da-DK" dirty="0">
                 <a:solidFill>
@@ -22076,6 +22079,574 @@
           <a:p>
             <a:r>
               <a:rPr lang="es-AR" dirty="0" err="1" smtClean="0"/>
+              <a:t>Feedback</a:t>
+            </a:r>
+            <a:endParaRPr lang="es-AR" dirty="0"/>
+          </a:p>
+        </p:txBody>
+      </p:sp>
+    </p:spTree>
+    <p:extLst>
+      <p:ext uri="{BB962C8B-B14F-4D97-AF65-F5344CB8AC3E}">
+        <p14:creationId xmlns:p14="http://schemas.microsoft.com/office/powerpoint/2010/main" val="84412831"/>
+      </p:ext>
+    </p:extLst>
+  </p:cSld>
+  <p:clrMapOvr>
+    <a:masterClrMapping/>
+  </p:clrMapOvr>
+  <p:transition spd="slow">
+    <p:wipe/>
+  </p:transition>
+  <p:timing>
+    <p:tnLst>
+      <p:par>
+        <p:cTn id="1" dur="indefinite" restart="never" nodeType="tmRoot"/>
+      </p:par>
+    </p:tnLst>
+  </p:timing>
+</p:sld>
+</file>
+
+<file path=ppt/slides/slide21.xml><?xml version="1.0" encoding="utf-8"?>
+<p:sld xmlns:a="http://schemas.openxmlformats.org/drawingml/2006/main" xmlns:r="http://schemas.openxmlformats.org/officeDocument/2006/relationships" xmlns:p="http://schemas.openxmlformats.org/presentationml/2006/main">
+  <p:cSld>
+    <p:spTree>
+      <p:nvGrpSpPr>
+        <p:cNvPr id="1" name=""/>
+        <p:cNvGrpSpPr/>
+        <p:nvPr/>
+      </p:nvGrpSpPr>
+      <p:grpSpPr>
+        <a:xfrm>
+          <a:off x="0" y="0"/>
+          <a:ext cx="0" cy="0"/>
+          <a:chOff x="0" y="0"/>
+          <a:chExt cx="0" cy="0"/>
+        </a:xfrm>
+      </p:grpSpPr>
+      <p:sp>
+        <p:nvSpPr>
+          <p:cNvPr id="15" name="Rectangle 14"/>
+          <p:cNvSpPr/>
+          <p:nvPr/>
+        </p:nvSpPr>
+        <p:spPr>
+          <a:xfrm>
+            <a:off x="-13252" y="1"/>
+            <a:ext cx="12218504" cy="1016000"/>
+          </a:xfrm>
+          <a:prstGeom prst="rect">
+            <a:avLst/>
+          </a:prstGeom>
+          <a:solidFill>
+            <a:srgbClr val="FF9600"/>
+          </a:solidFill>
+          <a:ln>
+            <a:noFill/>
+          </a:ln>
+        </p:spPr>
+        <p:style>
+          <a:lnRef idx="1">
+            <a:schemeClr val="accent6"/>
+          </a:lnRef>
+          <a:fillRef idx="3">
+            <a:schemeClr val="accent6"/>
+          </a:fillRef>
+          <a:effectRef idx="2">
+            <a:schemeClr val="accent6"/>
+          </a:effectRef>
+          <a:fontRef idx="minor">
+            <a:schemeClr val="lt1"/>
+          </a:fontRef>
+        </p:style>
+        <p:txBody>
+          <a:bodyPr anchor="ctr"/>
+          <a:lstStyle/>
+          <a:p>
+            <a:pPr marL="0" marR="0" lvl="0" indent="0" algn="ctr" defTabSz="914400" eaLnBrk="1" fontAlgn="auto" latinLnBrk="0" hangingPunct="1">
+              <a:lnSpc>
+                <a:spcPct val="100000"/>
+              </a:lnSpc>
+              <a:spcBef>
+                <a:spcPts val="0"/>
+              </a:spcBef>
+              <a:spcAft>
+                <a:spcPts val="0"/>
+              </a:spcAft>
+              <a:buClrTx/>
+              <a:buSzTx/>
+              <a:buFontTx/>
+              <a:buNone/>
+              <a:tabLst/>
+              <a:defRPr/>
+            </a:pPr>
+            <a:r>
+              <a:rPr kumimoji="0" lang="es-ES_tradnl" sz="1800" b="0" i="0" u="none" strike="noStrike" kern="0" cap="none" spc="0" normalizeH="0" baseline="0" noProof="0" dirty="0" smtClean="0">
+                <a:ln>
+                  <a:noFill/>
+                </a:ln>
+                <a:solidFill>
+                  <a:srgbClr val="FFFFFF"/>
+                </a:solidFill>
+                <a:effectLst/>
+                <a:uLnTx/>
+                <a:uFillTx/>
+                <a:latin typeface="Arial"/>
+                <a:ea typeface="ＭＳ Ｐゴシック" pitchFamily="-108" charset="-128"/>
+                <a:cs typeface="+mn-cs"/>
+              </a:rPr>
+              <a:t>  </a:t>
+            </a:r>
+            <a:endParaRPr kumimoji="0" lang="es-ES_tradnl" sz="1800" b="0" i="0" u="none" strike="noStrike" kern="0" cap="none" spc="0" normalizeH="0" baseline="0" noProof="0" dirty="0">
+              <a:ln>
+                <a:noFill/>
+              </a:ln>
+              <a:solidFill>
+                <a:srgbClr val="FFFFFF"/>
+              </a:solidFill>
+              <a:effectLst/>
+              <a:uLnTx/>
+              <a:uFillTx/>
+              <a:latin typeface="Arial"/>
+              <a:ea typeface="ＭＳ Ｐゴシック" pitchFamily="-108" charset="-128"/>
+              <a:cs typeface="+mn-cs"/>
+            </a:endParaRPr>
+          </a:p>
+        </p:txBody>
+      </p:sp>
+      <p:sp>
+        <p:nvSpPr>
+          <p:cNvPr id="16" name="TextBox 15"/>
+          <p:cNvSpPr txBox="1"/>
+          <p:nvPr/>
+        </p:nvSpPr>
+        <p:spPr>
+          <a:xfrm>
+            <a:off x="515936" y="212035"/>
+            <a:ext cx="11676063" cy="553998"/>
+          </a:xfrm>
+          <a:prstGeom prst="rect">
+            <a:avLst/>
+          </a:prstGeom>
+          <a:noFill/>
+        </p:spPr>
+        <p:txBody>
+          <a:bodyPr wrap="square" lIns="0" tIns="0" rIns="0" bIns="0" rtlCol="0">
+            <a:spAutoFit/>
+          </a:bodyPr>
+          <a:lstStyle/>
+          <a:p>
+            <a:r>
+              <a:rPr lang="en-US" sz="3600" dirty="0" smtClean="0">
+                <a:solidFill>
+                  <a:schemeClr val="bg1"/>
+                </a:solidFill>
+              </a:rPr>
+              <a:t>Feedback</a:t>
+            </a:r>
+            <a:endParaRPr lang="es-AR" sz="3600" dirty="0">
+              <a:solidFill>
+                <a:schemeClr val="bg1"/>
+              </a:solidFill>
+            </a:endParaRPr>
+          </a:p>
+        </p:txBody>
+      </p:sp>
+      <p:sp>
+        <p:nvSpPr>
+          <p:cNvPr id="6" name="Content Placeholder 2"/>
+          <p:cNvSpPr txBox="1">
+            <a:spLocks/>
+          </p:cNvSpPr>
+          <p:nvPr/>
+        </p:nvSpPr>
+        <p:spPr>
+          <a:xfrm>
+            <a:off x="476534" y="1394213"/>
+            <a:ext cx="8142809" cy="4329621"/>
+          </a:xfrm>
+          <a:prstGeom prst="rect">
+            <a:avLst/>
+          </a:prstGeom>
+        </p:spPr>
+        <p:txBody>
+          <a:bodyPr vert="horz" lIns="91440" tIns="45720" rIns="91440" bIns="45720" rtlCol="0">
+            <a:noAutofit/>
+          </a:bodyPr>
+          <a:lstStyle>
+            <a:lvl1pPr marL="273050" marR="0" indent="-273050" algn="l" defTabSz="914400" rtl="0" eaLnBrk="1" fontAlgn="auto" latinLnBrk="0" hangingPunct="1">
+              <a:lnSpc>
+                <a:spcPct val="100000"/>
+              </a:lnSpc>
+              <a:spcBef>
+                <a:spcPts val="1200"/>
+              </a:spcBef>
+              <a:spcAft>
+                <a:spcPts val="0"/>
+              </a:spcAft>
+              <a:buClr>
+                <a:srgbClr val="DA1218"/>
+              </a:buClr>
+              <a:buSzTx/>
+              <a:buFont typeface="Wingdings" pitchFamily="2" charset="2"/>
+              <a:buChar char="§"/>
+              <a:tabLst/>
+              <a:defRPr lang="en-US" sz="2400" kern="1200">
+                <a:solidFill>
+                  <a:schemeClr val="tx1"/>
+                </a:solidFill>
+                <a:latin typeface="Arial" pitchFamily="34" charset="0"/>
+                <a:ea typeface="+mn-ea"/>
+                <a:cs typeface="Arial" pitchFamily="34" charset="0"/>
+              </a:defRPr>
+            </a:lvl1pPr>
+            <a:lvl2pPr marL="628650" marR="0" indent="-355600" algn="l" defTabSz="914400" rtl="0" eaLnBrk="1" fontAlgn="auto" latinLnBrk="0" hangingPunct="1">
+              <a:lnSpc>
+                <a:spcPct val="100000"/>
+              </a:lnSpc>
+              <a:spcBef>
+                <a:spcPct val="20000"/>
+              </a:spcBef>
+              <a:spcAft>
+                <a:spcPts val="0"/>
+              </a:spcAft>
+              <a:buClr>
+                <a:srgbClr val="DA1218"/>
+              </a:buClr>
+              <a:buSzTx/>
+              <a:buFont typeface="Wingdings" pitchFamily="2" charset="2"/>
+              <a:buChar char=""/>
+              <a:tabLst/>
+              <a:defRPr lang="en-US" sz="2000" kern="1200">
+                <a:solidFill>
+                  <a:schemeClr val="tx1"/>
+                </a:solidFill>
+                <a:latin typeface="Arial" pitchFamily="34" charset="0"/>
+                <a:ea typeface="+mn-ea"/>
+                <a:cs typeface="Arial" pitchFamily="34" charset="0"/>
+              </a:defRPr>
+            </a:lvl2pPr>
+            <a:lvl3pPr marL="903288" marR="0" indent="-274638" algn="l" defTabSz="914400" rtl="0" eaLnBrk="1" fontAlgn="auto" latinLnBrk="0" hangingPunct="1">
+              <a:lnSpc>
+                <a:spcPct val="100000"/>
+              </a:lnSpc>
+              <a:spcBef>
+                <a:spcPct val="20000"/>
+              </a:spcBef>
+              <a:spcAft>
+                <a:spcPts val="0"/>
+              </a:spcAft>
+              <a:buClr>
+                <a:srgbClr val="DA1218"/>
+              </a:buClr>
+              <a:buSzTx/>
+              <a:buFont typeface="Wingdings" pitchFamily="2" charset="2"/>
+              <a:buChar char="ü"/>
+              <a:tabLst/>
+              <a:defRPr lang="en-US" sz="1800" kern="1200">
+                <a:solidFill>
+                  <a:schemeClr val="tx1"/>
+                </a:solidFill>
+                <a:latin typeface="Arial" pitchFamily="34" charset="0"/>
+                <a:ea typeface="+mn-ea"/>
+                <a:cs typeface="Arial" pitchFamily="34" charset="0"/>
+              </a:defRPr>
+            </a:lvl3pPr>
+            <a:lvl4pPr marL="1081088" marR="0" indent="-177800" algn="l" defTabSz="914400" rtl="0" eaLnBrk="1" fontAlgn="auto" latinLnBrk="0" hangingPunct="1">
+              <a:lnSpc>
+                <a:spcPct val="100000"/>
+              </a:lnSpc>
+              <a:spcBef>
+                <a:spcPct val="20000"/>
+              </a:spcBef>
+              <a:spcAft>
+                <a:spcPts val="0"/>
+              </a:spcAft>
+              <a:buClr>
+                <a:srgbClr val="DA1218"/>
+              </a:buClr>
+              <a:buSzTx/>
+              <a:buFont typeface="Arial" pitchFamily="34" charset="0"/>
+              <a:buChar char="•"/>
+              <a:tabLst/>
+              <a:defRPr lang="en-US" sz="1600" kern="1200">
+                <a:solidFill>
+                  <a:schemeClr val="tx1"/>
+                </a:solidFill>
+                <a:latin typeface="Arial" pitchFamily="34" charset="0"/>
+                <a:ea typeface="+mn-ea"/>
+                <a:cs typeface="Arial" pitchFamily="34" charset="0"/>
+              </a:defRPr>
+            </a:lvl4pPr>
+            <a:lvl5pPr marL="1258888" marR="0" indent="-177800" algn="l" defTabSz="914400" rtl="0" eaLnBrk="1" fontAlgn="auto" latinLnBrk="0" hangingPunct="1">
+              <a:lnSpc>
+                <a:spcPct val="100000"/>
+              </a:lnSpc>
+              <a:spcBef>
+                <a:spcPct val="20000"/>
+              </a:spcBef>
+              <a:spcAft>
+                <a:spcPts val="0"/>
+              </a:spcAft>
+              <a:buClr>
+                <a:srgbClr val="DA1218"/>
+              </a:buClr>
+              <a:buSzPct val="100000"/>
+              <a:buFont typeface="Courier New" pitchFamily="49" charset="0"/>
+              <a:buChar char="o"/>
+              <a:tabLst/>
+              <a:defRPr lang="es-AR" sz="1400" kern="1200">
+                <a:solidFill>
+                  <a:schemeClr val="tx1"/>
+                </a:solidFill>
+                <a:latin typeface="Arial" pitchFamily="34" charset="0"/>
+                <a:ea typeface="+mn-ea"/>
+                <a:cs typeface="Arial" pitchFamily="34" charset="0"/>
+              </a:defRPr>
+            </a:lvl5pPr>
+            <a:lvl6pPr marL="2514600" indent="-228600" algn="l" defTabSz="914400" rtl="0" eaLnBrk="1" latinLnBrk="0" hangingPunct="1">
+              <a:spcBef>
+                <a:spcPct val="20000"/>
+              </a:spcBef>
+              <a:buFont typeface="Arial" pitchFamily="34" charset="0"/>
+              <a:buChar char="•"/>
+              <a:defRPr sz="2000" kern="1200">
+                <a:solidFill>
+                  <a:schemeClr val="tx1"/>
+                </a:solidFill>
+                <a:latin typeface="+mn-lt"/>
+                <a:ea typeface="+mn-ea"/>
+                <a:cs typeface="+mn-cs"/>
+              </a:defRPr>
+            </a:lvl6pPr>
+            <a:lvl7pPr marL="2971800" indent="-228600" algn="l" defTabSz="914400" rtl="0" eaLnBrk="1" latinLnBrk="0" hangingPunct="1">
+              <a:spcBef>
+                <a:spcPct val="20000"/>
+              </a:spcBef>
+              <a:buFont typeface="Arial" pitchFamily="34" charset="0"/>
+              <a:buChar char="•"/>
+              <a:defRPr sz="2000" kern="1200">
+                <a:solidFill>
+                  <a:schemeClr val="tx1"/>
+                </a:solidFill>
+                <a:latin typeface="+mn-lt"/>
+                <a:ea typeface="+mn-ea"/>
+                <a:cs typeface="+mn-cs"/>
+              </a:defRPr>
+            </a:lvl7pPr>
+            <a:lvl8pPr marL="3429000" indent="-228600" algn="l" defTabSz="914400" rtl="0" eaLnBrk="1" latinLnBrk="0" hangingPunct="1">
+              <a:spcBef>
+                <a:spcPct val="20000"/>
+              </a:spcBef>
+              <a:buFont typeface="Arial" pitchFamily="34" charset="0"/>
+              <a:buChar char="•"/>
+              <a:defRPr sz="2000" kern="1200">
+                <a:solidFill>
+                  <a:schemeClr val="tx1"/>
+                </a:solidFill>
+                <a:latin typeface="+mn-lt"/>
+                <a:ea typeface="+mn-ea"/>
+                <a:cs typeface="+mn-cs"/>
+              </a:defRPr>
+            </a:lvl8pPr>
+            <a:lvl9pPr marL="3886200" indent="-228600" algn="l" defTabSz="914400" rtl="0" eaLnBrk="1" latinLnBrk="0" hangingPunct="1">
+              <a:spcBef>
+                <a:spcPct val="20000"/>
+              </a:spcBef>
+              <a:buFont typeface="Arial" pitchFamily="34" charset="0"/>
+              <a:buChar char="•"/>
+              <a:defRPr sz="2000" kern="1200">
+                <a:solidFill>
+                  <a:schemeClr val="tx1"/>
+                </a:solidFill>
+                <a:latin typeface="+mn-lt"/>
+                <a:ea typeface="+mn-ea"/>
+                <a:cs typeface="+mn-cs"/>
+              </a:defRPr>
+            </a:lvl9pPr>
+          </a:lstStyle>
+          <a:p>
+            <a:pPr marL="0" lvl="1" indent="0">
+              <a:spcBef>
+                <a:spcPts val="1200"/>
+              </a:spcBef>
+              <a:buClrTx/>
+              <a:buFont typeface="Wingdings" panose="05000000000000000000" pitchFamily="2" charset="2"/>
+              <a:buChar char="§"/>
+            </a:pPr>
+            <a:r>
+              <a:rPr lang="en-GB" dirty="0" smtClean="0">
+                <a:latin typeface="Avenir 45 Book (Body)"/>
+              </a:rPr>
+              <a:t> What do you think about using these practices in your projects?</a:t>
+            </a:r>
+          </a:p>
+          <a:p>
+            <a:pPr marL="0" lvl="1" indent="0">
+              <a:spcBef>
+                <a:spcPts val="1200"/>
+              </a:spcBef>
+              <a:buClrTx/>
+              <a:buNone/>
+            </a:pPr>
+            <a:r>
+              <a:rPr lang="en-GB" dirty="0">
+                <a:latin typeface="Avenir 45 Book (Body)"/>
+              </a:rPr>
+              <a:t> </a:t>
+            </a:r>
+            <a:endParaRPr lang="en-GB" dirty="0" smtClean="0">
+              <a:latin typeface="Avenir 45 Book (Body)"/>
+            </a:endParaRPr>
+          </a:p>
+          <a:p>
+            <a:pPr marL="0" lvl="1" indent="0">
+              <a:spcBef>
+                <a:spcPts val="1200"/>
+              </a:spcBef>
+              <a:buClrTx/>
+              <a:buFont typeface="Wingdings" panose="05000000000000000000" pitchFamily="2" charset="2"/>
+              <a:buChar char="§"/>
+            </a:pPr>
+            <a:r>
+              <a:rPr lang="en-GB" dirty="0" smtClean="0">
+                <a:latin typeface="Avenir 45 Book (Body)"/>
+              </a:rPr>
+              <a:t> If </a:t>
+            </a:r>
+            <a:r>
+              <a:rPr lang="en-GB" dirty="0">
+                <a:latin typeface="Avenir 45 Book (Body)"/>
+              </a:rPr>
+              <a:t>you used these </a:t>
+            </a:r>
+            <a:r>
+              <a:rPr lang="en-GB" dirty="0" smtClean="0">
+                <a:latin typeface="Avenir 45 Book (Body)"/>
+              </a:rPr>
+              <a:t>practices, What advantages would you have?</a:t>
+            </a:r>
+          </a:p>
+          <a:p>
+            <a:pPr marL="0" lvl="1" indent="0">
+              <a:spcBef>
+                <a:spcPts val="1200"/>
+              </a:spcBef>
+              <a:buClrTx/>
+              <a:buNone/>
+            </a:pPr>
+            <a:endParaRPr lang="en-GB" dirty="0" smtClean="0">
+              <a:latin typeface="Avenir 45 Book (Body)"/>
+            </a:endParaRPr>
+          </a:p>
+          <a:p>
+            <a:pPr marL="0" lvl="1" indent="0">
+              <a:spcBef>
+                <a:spcPts val="1200"/>
+              </a:spcBef>
+              <a:buClrTx/>
+              <a:buFont typeface="Wingdings" panose="05000000000000000000" pitchFamily="2" charset="2"/>
+              <a:buChar char="§"/>
+            </a:pPr>
+            <a:r>
+              <a:rPr lang="en-GB" dirty="0" smtClean="0">
+                <a:latin typeface="Avenir 45 Book (Body)"/>
+              </a:rPr>
+              <a:t> What do you believe about the talk?</a:t>
+            </a:r>
+            <a:endParaRPr lang="en-GB" dirty="0">
+              <a:latin typeface="Avenir 45 Book (Body)"/>
+            </a:endParaRPr>
+          </a:p>
+          <a:p>
+            <a:pPr lvl="0" defTabSz="914363">
+              <a:lnSpc>
+                <a:spcPct val="90000"/>
+              </a:lnSpc>
+              <a:spcBef>
+                <a:spcPts val="0"/>
+              </a:spcBef>
+              <a:spcAft>
+                <a:spcPts val="400"/>
+              </a:spcAft>
+              <a:buClr>
+                <a:schemeClr val="tx1">
+                  <a:lumMod val="75000"/>
+                  <a:lumOff val="25000"/>
+                </a:schemeClr>
+              </a:buClr>
+              <a:buSzPct val="100000"/>
+              <a:buFont typeface="Wingdings" panose="05000000000000000000" pitchFamily="2" charset="2"/>
+              <a:buChar char="ä"/>
+            </a:pPr>
+            <a:endParaRPr lang="es-AR" sz="1600" b="1" dirty="0">
+              <a:solidFill>
+                <a:srgbClr val="000000"/>
+              </a:solidFill>
+              <a:latin typeface="Avenir 45 Book (Body)"/>
+              <a:cs typeface="+mn-cs"/>
+            </a:endParaRPr>
+          </a:p>
+        </p:txBody>
+      </p:sp>
+    </p:spTree>
+    <p:extLst>
+      <p:ext uri="{BB962C8B-B14F-4D97-AF65-F5344CB8AC3E}">
+        <p14:creationId xmlns:p14="http://schemas.microsoft.com/office/powerpoint/2010/main" val="4101275204"/>
+      </p:ext>
+    </p:extLst>
+  </p:cSld>
+  <p:clrMapOvr>
+    <a:masterClrMapping/>
+  </p:clrMapOvr>
+  <p:transition spd="slow">
+    <p:wipe/>
+  </p:transition>
+  <p:timing>
+    <p:tnLst>
+      <p:par>
+        <p:cTn id="1" dur="indefinite" restart="never" nodeType="tmRoot"/>
+      </p:par>
+    </p:tnLst>
+  </p:timing>
+</p:sld>
+</file>
+
+<file path=ppt/slides/slide22.xml><?xml version="1.0" encoding="utf-8"?>
+<p:sld xmlns:a="http://schemas.openxmlformats.org/drawingml/2006/main" xmlns:r="http://schemas.openxmlformats.org/officeDocument/2006/relationships" xmlns:p="http://schemas.openxmlformats.org/presentationml/2006/main">
+  <p:cSld>
+    <p:spTree>
+      <p:nvGrpSpPr>
+        <p:cNvPr id="1" name=""/>
+        <p:cNvGrpSpPr/>
+        <p:nvPr/>
+      </p:nvGrpSpPr>
+      <p:grpSpPr>
+        <a:xfrm>
+          <a:off x="0" y="0"/>
+          <a:ext cx="0" cy="0"/>
+          <a:chOff x="0" y="0"/>
+          <a:chExt cx="0" cy="0"/>
+        </a:xfrm>
+      </p:grpSpPr>
+      <p:sp>
+        <p:nvSpPr>
+          <p:cNvPr id="4" name="Title 3"/>
+          <p:cNvSpPr>
+            <a:spLocks noGrp="1"/>
+          </p:cNvSpPr>
+          <p:nvPr>
+            <p:ph type="ctrTitle"/>
+          </p:nvPr>
+        </p:nvSpPr>
+        <p:spPr/>
+        <p:txBody>
+          <a:bodyPr/>
+          <a:lstStyle/>
+          <a:p>
+            <a:r>
+              <a:rPr lang="es-AR" dirty="0" err="1" smtClean="0"/>
               <a:t>Summary</a:t>
             </a:r>
             <a:endParaRPr lang="es-AR" dirty="0"/>
@@ -22105,7 +22676,542 @@
 </p:sld>
 </file>
 
-<file path=ppt/slides/slide21.xml><?xml version="1.0" encoding="utf-8"?>
+<file path=ppt/slides/slide23.xml><?xml version="1.0" encoding="utf-8"?>
+<p:sld xmlns:a="http://schemas.openxmlformats.org/drawingml/2006/main" xmlns:r="http://schemas.openxmlformats.org/officeDocument/2006/relationships" xmlns:p="http://schemas.openxmlformats.org/presentationml/2006/main">
+  <p:cSld>
+    <p:spTree>
+      <p:nvGrpSpPr>
+        <p:cNvPr id="1" name=""/>
+        <p:cNvGrpSpPr/>
+        <p:nvPr/>
+      </p:nvGrpSpPr>
+      <p:grpSpPr>
+        <a:xfrm>
+          <a:off x="0" y="0"/>
+          <a:ext cx="0" cy="0"/>
+          <a:chOff x="0" y="0"/>
+          <a:chExt cx="0" cy="0"/>
+        </a:xfrm>
+      </p:grpSpPr>
+      <p:sp>
+        <p:nvSpPr>
+          <p:cNvPr id="15" name="Rectangle 14"/>
+          <p:cNvSpPr/>
+          <p:nvPr/>
+        </p:nvSpPr>
+        <p:spPr>
+          <a:xfrm>
+            <a:off x="-13252" y="1"/>
+            <a:ext cx="12218504" cy="1016000"/>
+          </a:xfrm>
+          <a:prstGeom prst="rect">
+            <a:avLst/>
+          </a:prstGeom>
+          <a:solidFill>
+            <a:srgbClr val="FF9600"/>
+          </a:solidFill>
+          <a:ln>
+            <a:noFill/>
+          </a:ln>
+        </p:spPr>
+        <p:style>
+          <a:lnRef idx="1">
+            <a:schemeClr val="accent6"/>
+          </a:lnRef>
+          <a:fillRef idx="3">
+            <a:schemeClr val="accent6"/>
+          </a:fillRef>
+          <a:effectRef idx="2">
+            <a:schemeClr val="accent6"/>
+          </a:effectRef>
+          <a:fontRef idx="minor">
+            <a:schemeClr val="lt1"/>
+          </a:fontRef>
+        </p:style>
+        <p:txBody>
+          <a:bodyPr anchor="ctr"/>
+          <a:lstStyle/>
+          <a:p>
+            <a:pPr marL="0" marR="0" lvl="0" indent="0" algn="ctr" defTabSz="914400" eaLnBrk="1" fontAlgn="auto" latinLnBrk="0" hangingPunct="1">
+              <a:lnSpc>
+                <a:spcPct val="100000"/>
+              </a:lnSpc>
+              <a:spcBef>
+                <a:spcPts val="0"/>
+              </a:spcBef>
+              <a:spcAft>
+                <a:spcPts val="0"/>
+              </a:spcAft>
+              <a:buClrTx/>
+              <a:buSzTx/>
+              <a:buFontTx/>
+              <a:buNone/>
+              <a:tabLst/>
+              <a:defRPr/>
+            </a:pPr>
+            <a:r>
+              <a:rPr kumimoji="0" lang="es-ES_tradnl" sz="1800" b="0" i="0" u="none" strike="noStrike" kern="0" cap="none" spc="0" normalizeH="0" baseline="0" noProof="0" dirty="0" smtClean="0">
+                <a:ln>
+                  <a:noFill/>
+                </a:ln>
+                <a:solidFill>
+                  <a:srgbClr val="FFFFFF"/>
+                </a:solidFill>
+                <a:effectLst/>
+                <a:uLnTx/>
+                <a:uFillTx/>
+                <a:latin typeface="Arial"/>
+                <a:ea typeface="ＭＳ Ｐゴシック" pitchFamily="-108" charset="-128"/>
+                <a:cs typeface="+mn-cs"/>
+              </a:rPr>
+              <a:t>  </a:t>
+            </a:r>
+            <a:endParaRPr kumimoji="0" lang="es-ES_tradnl" sz="1800" b="0" i="0" u="none" strike="noStrike" kern="0" cap="none" spc="0" normalizeH="0" baseline="0" noProof="0" dirty="0">
+              <a:ln>
+                <a:noFill/>
+              </a:ln>
+              <a:solidFill>
+                <a:srgbClr val="FFFFFF"/>
+              </a:solidFill>
+              <a:effectLst/>
+              <a:uLnTx/>
+              <a:uFillTx/>
+              <a:latin typeface="Arial"/>
+              <a:ea typeface="ＭＳ Ｐゴシック" pitchFamily="-108" charset="-128"/>
+              <a:cs typeface="+mn-cs"/>
+            </a:endParaRPr>
+          </a:p>
+        </p:txBody>
+      </p:sp>
+      <p:sp>
+        <p:nvSpPr>
+          <p:cNvPr id="16" name="TextBox 15"/>
+          <p:cNvSpPr txBox="1"/>
+          <p:nvPr/>
+        </p:nvSpPr>
+        <p:spPr>
+          <a:xfrm>
+            <a:off x="515936" y="212035"/>
+            <a:ext cx="11676063" cy="553998"/>
+          </a:xfrm>
+          <a:prstGeom prst="rect">
+            <a:avLst/>
+          </a:prstGeom>
+          <a:noFill/>
+        </p:spPr>
+        <p:txBody>
+          <a:bodyPr wrap="square" lIns="0" tIns="0" rIns="0" bIns="0" rtlCol="0">
+            <a:spAutoFit/>
+          </a:bodyPr>
+          <a:lstStyle/>
+          <a:p>
+            <a:r>
+              <a:rPr lang="en-US" sz="3600" dirty="0" smtClean="0">
+                <a:solidFill>
+                  <a:schemeClr val="bg1"/>
+                </a:solidFill>
+              </a:rPr>
+              <a:t>Summary</a:t>
+            </a:r>
+            <a:endParaRPr lang="es-AR" sz="3600" dirty="0">
+              <a:solidFill>
+                <a:schemeClr val="bg1"/>
+              </a:solidFill>
+            </a:endParaRPr>
+          </a:p>
+        </p:txBody>
+      </p:sp>
+      <p:sp>
+        <p:nvSpPr>
+          <p:cNvPr id="6" name="Content Placeholder 2"/>
+          <p:cNvSpPr txBox="1">
+            <a:spLocks/>
+          </p:cNvSpPr>
+          <p:nvPr/>
+        </p:nvSpPr>
+        <p:spPr>
+          <a:xfrm>
+            <a:off x="476534" y="1394213"/>
+            <a:ext cx="8142809" cy="4329621"/>
+          </a:xfrm>
+          <a:prstGeom prst="rect">
+            <a:avLst/>
+          </a:prstGeom>
+        </p:spPr>
+        <p:txBody>
+          <a:bodyPr vert="horz" lIns="91440" tIns="45720" rIns="91440" bIns="45720" rtlCol="0">
+            <a:noAutofit/>
+          </a:bodyPr>
+          <a:lstStyle>
+            <a:lvl1pPr marL="273050" marR="0" indent="-273050" algn="l" defTabSz="914400" rtl="0" eaLnBrk="1" fontAlgn="auto" latinLnBrk="0" hangingPunct="1">
+              <a:lnSpc>
+                <a:spcPct val="100000"/>
+              </a:lnSpc>
+              <a:spcBef>
+                <a:spcPts val="1200"/>
+              </a:spcBef>
+              <a:spcAft>
+                <a:spcPts val="0"/>
+              </a:spcAft>
+              <a:buClr>
+                <a:srgbClr val="DA1218"/>
+              </a:buClr>
+              <a:buSzTx/>
+              <a:buFont typeface="Wingdings" pitchFamily="2" charset="2"/>
+              <a:buChar char="§"/>
+              <a:tabLst/>
+              <a:defRPr lang="en-US" sz="2400" kern="1200">
+                <a:solidFill>
+                  <a:schemeClr val="tx1"/>
+                </a:solidFill>
+                <a:latin typeface="Arial" pitchFamily="34" charset="0"/>
+                <a:ea typeface="+mn-ea"/>
+                <a:cs typeface="Arial" pitchFamily="34" charset="0"/>
+              </a:defRPr>
+            </a:lvl1pPr>
+            <a:lvl2pPr marL="628650" marR="0" indent="-355600" algn="l" defTabSz="914400" rtl="0" eaLnBrk="1" fontAlgn="auto" latinLnBrk="0" hangingPunct="1">
+              <a:lnSpc>
+                <a:spcPct val="100000"/>
+              </a:lnSpc>
+              <a:spcBef>
+                <a:spcPct val="20000"/>
+              </a:spcBef>
+              <a:spcAft>
+                <a:spcPts val="0"/>
+              </a:spcAft>
+              <a:buClr>
+                <a:srgbClr val="DA1218"/>
+              </a:buClr>
+              <a:buSzTx/>
+              <a:buFont typeface="Wingdings" pitchFamily="2" charset="2"/>
+              <a:buChar char=""/>
+              <a:tabLst/>
+              <a:defRPr lang="en-US" sz="2000" kern="1200">
+                <a:solidFill>
+                  <a:schemeClr val="tx1"/>
+                </a:solidFill>
+                <a:latin typeface="Arial" pitchFamily="34" charset="0"/>
+                <a:ea typeface="+mn-ea"/>
+                <a:cs typeface="Arial" pitchFamily="34" charset="0"/>
+              </a:defRPr>
+            </a:lvl2pPr>
+            <a:lvl3pPr marL="903288" marR="0" indent="-274638" algn="l" defTabSz="914400" rtl="0" eaLnBrk="1" fontAlgn="auto" latinLnBrk="0" hangingPunct="1">
+              <a:lnSpc>
+                <a:spcPct val="100000"/>
+              </a:lnSpc>
+              <a:spcBef>
+                <a:spcPct val="20000"/>
+              </a:spcBef>
+              <a:spcAft>
+                <a:spcPts val="0"/>
+              </a:spcAft>
+              <a:buClr>
+                <a:srgbClr val="DA1218"/>
+              </a:buClr>
+              <a:buSzTx/>
+              <a:buFont typeface="Wingdings" pitchFamily="2" charset="2"/>
+              <a:buChar char="ü"/>
+              <a:tabLst/>
+              <a:defRPr lang="en-US" sz="1800" kern="1200">
+                <a:solidFill>
+                  <a:schemeClr val="tx1"/>
+                </a:solidFill>
+                <a:latin typeface="Arial" pitchFamily="34" charset="0"/>
+                <a:ea typeface="+mn-ea"/>
+                <a:cs typeface="Arial" pitchFamily="34" charset="0"/>
+              </a:defRPr>
+            </a:lvl3pPr>
+            <a:lvl4pPr marL="1081088" marR="0" indent="-177800" algn="l" defTabSz="914400" rtl="0" eaLnBrk="1" fontAlgn="auto" latinLnBrk="0" hangingPunct="1">
+              <a:lnSpc>
+                <a:spcPct val="100000"/>
+              </a:lnSpc>
+              <a:spcBef>
+                <a:spcPct val="20000"/>
+              </a:spcBef>
+              <a:spcAft>
+                <a:spcPts val="0"/>
+              </a:spcAft>
+              <a:buClr>
+                <a:srgbClr val="DA1218"/>
+              </a:buClr>
+              <a:buSzTx/>
+              <a:buFont typeface="Arial" pitchFamily="34" charset="0"/>
+              <a:buChar char="•"/>
+              <a:tabLst/>
+              <a:defRPr lang="en-US" sz="1600" kern="1200">
+                <a:solidFill>
+                  <a:schemeClr val="tx1"/>
+                </a:solidFill>
+                <a:latin typeface="Arial" pitchFamily="34" charset="0"/>
+                <a:ea typeface="+mn-ea"/>
+                <a:cs typeface="Arial" pitchFamily="34" charset="0"/>
+              </a:defRPr>
+            </a:lvl4pPr>
+            <a:lvl5pPr marL="1258888" marR="0" indent="-177800" algn="l" defTabSz="914400" rtl="0" eaLnBrk="1" fontAlgn="auto" latinLnBrk="0" hangingPunct="1">
+              <a:lnSpc>
+                <a:spcPct val="100000"/>
+              </a:lnSpc>
+              <a:spcBef>
+                <a:spcPct val="20000"/>
+              </a:spcBef>
+              <a:spcAft>
+                <a:spcPts val="0"/>
+              </a:spcAft>
+              <a:buClr>
+                <a:srgbClr val="DA1218"/>
+              </a:buClr>
+              <a:buSzPct val="100000"/>
+              <a:buFont typeface="Courier New" pitchFamily="49" charset="0"/>
+              <a:buChar char="o"/>
+              <a:tabLst/>
+              <a:defRPr lang="es-AR" sz="1400" kern="1200">
+                <a:solidFill>
+                  <a:schemeClr val="tx1"/>
+                </a:solidFill>
+                <a:latin typeface="Arial" pitchFamily="34" charset="0"/>
+                <a:ea typeface="+mn-ea"/>
+                <a:cs typeface="Arial" pitchFamily="34" charset="0"/>
+              </a:defRPr>
+            </a:lvl5pPr>
+            <a:lvl6pPr marL="2514600" indent="-228600" algn="l" defTabSz="914400" rtl="0" eaLnBrk="1" latinLnBrk="0" hangingPunct="1">
+              <a:spcBef>
+                <a:spcPct val="20000"/>
+              </a:spcBef>
+              <a:buFont typeface="Arial" pitchFamily="34" charset="0"/>
+              <a:buChar char="•"/>
+              <a:defRPr sz="2000" kern="1200">
+                <a:solidFill>
+                  <a:schemeClr val="tx1"/>
+                </a:solidFill>
+                <a:latin typeface="+mn-lt"/>
+                <a:ea typeface="+mn-ea"/>
+                <a:cs typeface="+mn-cs"/>
+              </a:defRPr>
+            </a:lvl6pPr>
+            <a:lvl7pPr marL="2971800" indent="-228600" algn="l" defTabSz="914400" rtl="0" eaLnBrk="1" latinLnBrk="0" hangingPunct="1">
+              <a:spcBef>
+                <a:spcPct val="20000"/>
+              </a:spcBef>
+              <a:buFont typeface="Arial" pitchFamily="34" charset="0"/>
+              <a:buChar char="•"/>
+              <a:defRPr sz="2000" kern="1200">
+                <a:solidFill>
+                  <a:schemeClr val="tx1"/>
+                </a:solidFill>
+                <a:latin typeface="+mn-lt"/>
+                <a:ea typeface="+mn-ea"/>
+                <a:cs typeface="+mn-cs"/>
+              </a:defRPr>
+            </a:lvl7pPr>
+            <a:lvl8pPr marL="3429000" indent="-228600" algn="l" defTabSz="914400" rtl="0" eaLnBrk="1" latinLnBrk="0" hangingPunct="1">
+              <a:spcBef>
+                <a:spcPct val="20000"/>
+              </a:spcBef>
+              <a:buFont typeface="Arial" pitchFamily="34" charset="0"/>
+              <a:buChar char="•"/>
+              <a:defRPr sz="2000" kern="1200">
+                <a:solidFill>
+                  <a:schemeClr val="tx1"/>
+                </a:solidFill>
+                <a:latin typeface="+mn-lt"/>
+                <a:ea typeface="+mn-ea"/>
+                <a:cs typeface="+mn-cs"/>
+              </a:defRPr>
+            </a:lvl8pPr>
+            <a:lvl9pPr marL="3886200" indent="-228600" algn="l" defTabSz="914400" rtl="0" eaLnBrk="1" latinLnBrk="0" hangingPunct="1">
+              <a:spcBef>
+                <a:spcPct val="20000"/>
+              </a:spcBef>
+              <a:buFont typeface="Arial" pitchFamily="34" charset="0"/>
+              <a:buChar char="•"/>
+              <a:defRPr sz="2000" kern="1200">
+                <a:solidFill>
+                  <a:schemeClr val="tx1"/>
+                </a:solidFill>
+                <a:latin typeface="+mn-lt"/>
+                <a:ea typeface="+mn-ea"/>
+                <a:cs typeface="+mn-cs"/>
+              </a:defRPr>
+            </a:lvl9pPr>
+          </a:lstStyle>
+          <a:p>
+            <a:pPr marL="0" lvl="1" indent="0">
+              <a:spcBef>
+                <a:spcPts val="1200"/>
+              </a:spcBef>
+              <a:buClrTx/>
+              <a:buFont typeface="Wingdings" panose="05000000000000000000" pitchFamily="2" charset="2"/>
+              <a:buChar char="§"/>
+            </a:pPr>
+            <a:r>
+              <a:rPr lang="en-GB" dirty="0" smtClean="0">
+                <a:latin typeface="Avenir 45 Book (Body)"/>
+              </a:rPr>
+              <a:t> Makes more m</a:t>
+            </a:r>
+            <a:r>
+              <a:rPr lang="en-GB" dirty="0" smtClean="0">
+                <a:latin typeface="Avenir 45 Book (Body)"/>
+              </a:rPr>
+              <a:t>aintainable code</a:t>
+            </a:r>
+            <a:endParaRPr lang="en-GB" dirty="0">
+              <a:latin typeface="Avenir 45 Book (Body)"/>
+            </a:endParaRPr>
+          </a:p>
+          <a:p>
+            <a:pPr marL="0" lvl="1" indent="0">
+              <a:spcBef>
+                <a:spcPts val="1200"/>
+              </a:spcBef>
+              <a:buClrTx/>
+              <a:buFont typeface="Wingdings" panose="05000000000000000000" pitchFamily="2" charset="2"/>
+              <a:buChar char="§"/>
+            </a:pPr>
+            <a:r>
+              <a:rPr lang="en-GB" dirty="0">
+                <a:latin typeface="Avenir 45 Book (Body)"/>
+              </a:rPr>
+              <a:t> </a:t>
+            </a:r>
+            <a:r>
+              <a:rPr lang="en-GB" dirty="0" smtClean="0">
+                <a:latin typeface="Avenir 45 Book (Body)"/>
+              </a:rPr>
+              <a:t>Minimizes errors count</a:t>
+            </a:r>
+          </a:p>
+          <a:p>
+            <a:pPr marL="0" lvl="1" indent="0">
+              <a:spcBef>
+                <a:spcPts val="1200"/>
+              </a:spcBef>
+              <a:buClrTx/>
+              <a:buFont typeface="Wingdings" panose="05000000000000000000" pitchFamily="2" charset="2"/>
+              <a:buChar char="§"/>
+            </a:pPr>
+            <a:r>
+              <a:rPr lang="en-GB" dirty="0" smtClean="0">
+                <a:latin typeface="Avenir 45 Book (Body)"/>
+              </a:rPr>
+              <a:t> Detects errors earlier</a:t>
+            </a:r>
+          </a:p>
+          <a:p>
+            <a:pPr marL="0" lvl="1" indent="0">
+              <a:spcBef>
+                <a:spcPts val="1200"/>
+              </a:spcBef>
+              <a:buClrTx/>
+              <a:buFont typeface="Wingdings" panose="05000000000000000000" pitchFamily="2" charset="2"/>
+              <a:buChar char="§"/>
+            </a:pPr>
+            <a:r>
+              <a:rPr lang="en-GB" dirty="0" smtClean="0">
+                <a:latin typeface="Avenir 45 Book (Body)"/>
+              </a:rPr>
+              <a:t> Performs team organization</a:t>
+            </a:r>
+            <a:endParaRPr lang="en-GB" dirty="0">
+              <a:latin typeface="Avenir 45 Book (Body)"/>
+            </a:endParaRPr>
+          </a:p>
+          <a:p>
+            <a:pPr marL="0" lvl="1" indent="0">
+              <a:spcBef>
+                <a:spcPts val="1200"/>
+              </a:spcBef>
+              <a:buClrTx/>
+              <a:buFont typeface="Wingdings" panose="05000000000000000000" pitchFamily="2" charset="2"/>
+              <a:buChar char="§"/>
+            </a:pPr>
+            <a:r>
+              <a:rPr lang="en-GB" dirty="0">
+                <a:latin typeface="Avenir 45 Book (Body)"/>
+              </a:rPr>
+              <a:t> </a:t>
+            </a:r>
+            <a:r>
+              <a:rPr lang="en-GB" dirty="0" smtClean="0">
+                <a:latin typeface="Avenir 45 Book (Body)"/>
+              </a:rPr>
+              <a:t>Improves </a:t>
+            </a:r>
+            <a:r>
+              <a:rPr lang="en-GB" dirty="0">
+                <a:latin typeface="Avenir 45 Book (Body)"/>
+              </a:rPr>
+              <a:t>final product quality</a:t>
+            </a:r>
+          </a:p>
+          <a:p>
+            <a:pPr marL="0" lvl="1" indent="0">
+              <a:spcBef>
+                <a:spcPts val="1200"/>
+              </a:spcBef>
+              <a:buClrTx/>
+              <a:buFont typeface="Wingdings" panose="05000000000000000000" pitchFamily="2" charset="2"/>
+              <a:buChar char="§"/>
+            </a:pPr>
+            <a:endParaRPr lang="en-GB" dirty="0">
+              <a:latin typeface="Avenir 45 Book (Body)"/>
+            </a:endParaRPr>
+          </a:p>
+          <a:p>
+            <a:pPr lvl="0" defTabSz="914363">
+              <a:lnSpc>
+                <a:spcPct val="90000"/>
+              </a:lnSpc>
+              <a:spcBef>
+                <a:spcPts val="0"/>
+              </a:spcBef>
+              <a:spcAft>
+                <a:spcPts val="400"/>
+              </a:spcAft>
+              <a:buClr>
+                <a:schemeClr val="tx1">
+                  <a:lumMod val="75000"/>
+                  <a:lumOff val="25000"/>
+                </a:schemeClr>
+              </a:buClr>
+              <a:buSzPct val="100000"/>
+              <a:buFont typeface="Wingdings" panose="05000000000000000000" pitchFamily="2" charset="2"/>
+              <a:buChar char="ä"/>
+            </a:pPr>
+            <a:endParaRPr lang="es-AR" sz="1600" b="1" dirty="0">
+              <a:solidFill>
+                <a:srgbClr val="000000"/>
+              </a:solidFill>
+              <a:latin typeface="Avenir 45 Book (Body)"/>
+              <a:cs typeface="+mn-cs"/>
+            </a:endParaRPr>
+          </a:p>
+        </p:txBody>
+      </p:sp>
+    </p:spTree>
+    <p:extLst>
+      <p:ext uri="{BB962C8B-B14F-4D97-AF65-F5344CB8AC3E}">
+        <p14:creationId xmlns:p14="http://schemas.microsoft.com/office/powerpoint/2010/main" val="3539865254"/>
+      </p:ext>
+    </p:extLst>
+  </p:cSld>
+  <p:clrMapOvr>
+    <a:masterClrMapping/>
+  </p:clrMapOvr>
+  <p:transition spd="slow">
+    <p:wipe/>
+  </p:transition>
+  <p:timing>
+    <p:tnLst>
+      <p:par>
+        <p:cTn id="1" dur="indefinite" restart="never" nodeType="tmRoot"/>
+      </p:par>
+    </p:tnLst>
+  </p:timing>
+</p:sld>
+</file>
+
+<file path=ppt/slides/slide24.xml><?xml version="1.0" encoding="utf-8"?>
 <p:sld xmlns:a="http://schemas.openxmlformats.org/drawingml/2006/main" xmlns:r="http://schemas.openxmlformats.org/officeDocument/2006/relationships" xmlns:p="http://schemas.openxmlformats.org/presentationml/2006/main">
   <p:cSld>
     <p:spTree>
@@ -23441,15 +24547,6 @@
               </a:rPr>
               <a:t>csmirnoff@baufest.com</a:t>
             </a:r>
-            <a:r>
-              <a:rPr lang="es-AR" sz="1800" dirty="0" smtClean="0">
-                <a:solidFill>
-                  <a:schemeClr val="bg1"/>
-                </a:solidFill>
-                <a:latin typeface="Calibri" panose="020F0502020204030204" pitchFamily="34" charset="0"/>
-              </a:rPr>
-              <a:t/>
-            </a:r>
             <a:br>
               <a:rPr lang="es-AR" sz="1800" dirty="0" smtClean="0">
                 <a:solidFill>
@@ -23798,17 +24895,7 @@
                 <a:latin typeface="Avenir 45 Book"/>
                 <a:cs typeface="+mn-cs"/>
               </a:rPr>
-              <a:t>Divulge the use of best practices such as unit &amp; integration testing </a:t>
-            </a:r>
-            <a:r>
-              <a:rPr lang="en-GB" sz="1800" dirty="0" smtClean="0">
-                <a:solidFill>
-                  <a:srgbClr val="000000"/>
-                </a:solidFill>
-                <a:latin typeface="Avenir 45 Book"/>
-                <a:cs typeface="+mn-cs"/>
-              </a:rPr>
-              <a:t>and continuous integration</a:t>
+              <a:t>Divulge the use of best practices such as unit &amp; integration testing and continuous integration</a:t>
             </a:r>
             <a:r>
               <a:rPr lang="en-GB" sz="1600" b="1" dirty="0" smtClean="0">

</xml_diff>

<commit_message>
Actualización PPT: Feedback / Summary
</commit_message>
<xml_diff>
--- a/DesigningTestableApplications v2.pptx
+++ b/DesigningTestableApplications v2.pptx
@@ -6,10 +6,10 @@
     <p:sldMasterId id="2147483944" r:id="rId3"/>
   </p:sldMasterIdLst>
   <p:notesMasterIdLst>
-    <p:notesMasterId r:id="rId28"/>
+    <p:notesMasterId r:id="rId29"/>
   </p:notesMasterIdLst>
   <p:handoutMasterIdLst>
-    <p:handoutMasterId r:id="rId29"/>
+    <p:handoutMasterId r:id="rId30"/>
   </p:handoutMasterIdLst>
   <p:sldIdLst>
     <p:sldId id="321" r:id="rId4"/>
@@ -35,7 +35,8 @@
     <p:sldId id="384" r:id="rId24"/>
     <p:sldId id="378" r:id="rId25"/>
     <p:sldId id="382" r:id="rId26"/>
-    <p:sldId id="349" r:id="rId27"/>
+    <p:sldId id="385" r:id="rId27"/>
+    <p:sldId id="349" r:id="rId28"/>
   </p:sldIdLst>
   <p:sldSz cx="12192000" cy="6858000"/>
   <p:notesSz cx="6858000" cy="9144000"/>
@@ -248,7 +249,7 @@
           <a:p>
             <a:fld id="{D63D5444-F62C-42C3-A75A-D9DBA807730F}" type="datetimeFigureOut">
               <a:rPr lang="en-US" smtClean="0"/>
-              <a:t>3/17/2015</a:t>
+              <a:t>3/18/2015</a:t>
             </a:fld>
             <a:endParaRPr lang="en-US"/>
           </a:p>
@@ -413,7 +414,7 @@
           <a:p>
             <a:fld id="{12CAA1FA-7B6A-47D2-8D61-F225D71B51FF}" type="datetimeFigureOut">
               <a:rPr lang="en-US" smtClean="0"/>
-              <a:t>3/17/2015</a:t>
+              <a:t>3/18/2015</a:t>
             </a:fld>
             <a:endParaRPr lang="en-US"/>
           </a:p>
@@ -679,6 +680,174 @@
     </a:lvl9pPr>
   </p:notesStyle>
 </p:notesMaster>
+</file>
+
+<file path=ppt/notesSlides/notesSlide1.xml><?xml version="1.0" encoding="utf-8"?>
+<p:notes xmlns:a="http://schemas.openxmlformats.org/drawingml/2006/main" xmlns:r="http://schemas.openxmlformats.org/officeDocument/2006/relationships" xmlns:p="http://schemas.openxmlformats.org/presentationml/2006/main">
+  <p:cSld>
+    <p:spTree>
+      <p:nvGrpSpPr>
+        <p:cNvPr id="1" name=""/>
+        <p:cNvGrpSpPr/>
+        <p:nvPr/>
+      </p:nvGrpSpPr>
+      <p:grpSpPr>
+        <a:xfrm>
+          <a:off x="0" y="0"/>
+          <a:ext cx="0" cy="0"/>
+          <a:chOff x="0" y="0"/>
+          <a:chExt cx="0" cy="0"/>
+        </a:xfrm>
+      </p:grpSpPr>
+      <p:sp>
+        <p:nvSpPr>
+          <p:cNvPr id="2" name="Slide Image Placeholder 1"/>
+          <p:cNvSpPr>
+            <a:spLocks noGrp="1" noRot="1" noChangeAspect="1"/>
+          </p:cNvSpPr>
+          <p:nvPr>
+            <p:ph type="sldImg"/>
+          </p:nvPr>
+        </p:nvSpPr>
+        <p:spPr/>
+      </p:sp>
+      <p:sp>
+        <p:nvSpPr>
+          <p:cNvPr id="3" name="Notes Placeholder 2"/>
+          <p:cNvSpPr>
+            <a:spLocks noGrp="1"/>
+          </p:cNvSpPr>
+          <p:nvPr>
+            <p:ph type="body" idx="1"/>
+          </p:nvPr>
+        </p:nvSpPr>
+        <p:spPr/>
+        <p:txBody>
+          <a:bodyPr/>
+          <a:lstStyle/>
+          <a:p>
+            <a:endParaRPr lang="es-AR" dirty="0"/>
+          </a:p>
+        </p:txBody>
+      </p:sp>
+      <p:sp>
+        <p:nvSpPr>
+          <p:cNvPr id="4" name="Slide Number Placeholder 3"/>
+          <p:cNvSpPr>
+            <a:spLocks noGrp="1"/>
+          </p:cNvSpPr>
+          <p:nvPr>
+            <p:ph type="sldNum" sz="quarter" idx="10"/>
+          </p:nvPr>
+        </p:nvSpPr>
+        <p:spPr/>
+        <p:txBody>
+          <a:bodyPr/>
+          <a:lstStyle/>
+          <a:p>
+            <a:fld id="{1B9A179D-2D27-49E2-B022-8EDDA2EFE682}" type="slidenum">
+              <a:rPr lang="en-US" smtClean="0"/>
+              <a:t>23</a:t>
+            </a:fld>
+            <a:endParaRPr lang="en-US"/>
+          </a:p>
+        </p:txBody>
+      </p:sp>
+    </p:spTree>
+    <p:extLst>
+      <p:ext uri="{BB962C8B-B14F-4D97-AF65-F5344CB8AC3E}">
+        <p14:creationId xmlns:p14="http://schemas.microsoft.com/office/powerpoint/2010/main" val="237494102"/>
+      </p:ext>
+    </p:extLst>
+  </p:cSld>
+  <p:clrMapOvr>
+    <a:masterClrMapping/>
+  </p:clrMapOvr>
+</p:notes>
+</file>
+
+<file path=ppt/notesSlides/notesSlide2.xml><?xml version="1.0" encoding="utf-8"?>
+<p:notes xmlns:a="http://schemas.openxmlformats.org/drawingml/2006/main" xmlns:r="http://schemas.openxmlformats.org/officeDocument/2006/relationships" xmlns:p="http://schemas.openxmlformats.org/presentationml/2006/main">
+  <p:cSld>
+    <p:spTree>
+      <p:nvGrpSpPr>
+        <p:cNvPr id="1" name=""/>
+        <p:cNvGrpSpPr/>
+        <p:nvPr/>
+      </p:nvGrpSpPr>
+      <p:grpSpPr>
+        <a:xfrm>
+          <a:off x="0" y="0"/>
+          <a:ext cx="0" cy="0"/>
+          <a:chOff x="0" y="0"/>
+          <a:chExt cx="0" cy="0"/>
+        </a:xfrm>
+      </p:grpSpPr>
+      <p:sp>
+        <p:nvSpPr>
+          <p:cNvPr id="2" name="Slide Image Placeholder 1"/>
+          <p:cNvSpPr>
+            <a:spLocks noGrp="1" noRot="1" noChangeAspect="1"/>
+          </p:cNvSpPr>
+          <p:nvPr>
+            <p:ph type="sldImg"/>
+          </p:nvPr>
+        </p:nvSpPr>
+        <p:spPr/>
+      </p:sp>
+      <p:sp>
+        <p:nvSpPr>
+          <p:cNvPr id="3" name="Notes Placeholder 2"/>
+          <p:cNvSpPr>
+            <a:spLocks noGrp="1"/>
+          </p:cNvSpPr>
+          <p:nvPr>
+            <p:ph type="body" idx="1"/>
+          </p:nvPr>
+        </p:nvSpPr>
+        <p:spPr/>
+        <p:txBody>
+          <a:bodyPr/>
+          <a:lstStyle/>
+          <a:p>
+            <a:endParaRPr lang="es-AR" dirty="0"/>
+          </a:p>
+        </p:txBody>
+      </p:sp>
+      <p:sp>
+        <p:nvSpPr>
+          <p:cNvPr id="4" name="Slide Number Placeholder 3"/>
+          <p:cNvSpPr>
+            <a:spLocks noGrp="1"/>
+          </p:cNvSpPr>
+          <p:nvPr>
+            <p:ph type="sldNum" sz="quarter" idx="10"/>
+          </p:nvPr>
+        </p:nvSpPr>
+        <p:spPr/>
+        <p:txBody>
+          <a:bodyPr/>
+          <a:lstStyle/>
+          <a:p>
+            <a:fld id="{1B9A179D-2D27-49E2-B022-8EDDA2EFE682}" type="slidenum">
+              <a:rPr lang="en-US" smtClean="0"/>
+              <a:t>24</a:t>
+            </a:fld>
+            <a:endParaRPr lang="en-US"/>
+          </a:p>
+        </p:txBody>
+      </p:sp>
+    </p:spTree>
+    <p:extLst>
+      <p:ext uri="{BB962C8B-B14F-4D97-AF65-F5344CB8AC3E}">
+        <p14:creationId xmlns:p14="http://schemas.microsoft.com/office/powerpoint/2010/main" val="1419720355"/>
+      </p:ext>
+    </p:extLst>
+  </p:cSld>
+  <p:clrMapOvr>
+    <a:masterClrMapping/>
+  </p:clrMapOvr>
+</p:notes>
 </file>
 
 <file path=ppt/slideLayouts/slideLayout1.xml><?xml version="1.0" encoding="utf-8"?>
@@ -15968,6 +16137,83 @@
           </a:p>
         </p:txBody>
       </p:sp>
+      <p:sp>
+        <p:nvSpPr>
+          <p:cNvPr id="4" name="Title 4"/>
+          <p:cNvSpPr txBox="1">
+            <a:spLocks/>
+          </p:cNvSpPr>
+          <p:nvPr/>
+        </p:nvSpPr>
+        <p:spPr>
+          <a:xfrm>
+            <a:off x="1323632" y="3968322"/>
+            <a:ext cx="10589876" cy="891089"/>
+          </a:xfrm>
+          <a:prstGeom prst="rect">
+            <a:avLst/>
+          </a:prstGeom>
+        </p:spPr>
+        <p:txBody>
+          <a:bodyPr vert="horz" wrap="square" lIns="0" tIns="0" rIns="0" bIns="0" rtlCol="0" anchor="b">
+            <a:normAutofit/>
+          </a:bodyPr>
+          <a:lstStyle>
+            <a:lvl1pPr algn="l" defTabSz="914363" rtl="0" eaLnBrk="1" latinLnBrk="0" hangingPunct="1">
+              <a:lnSpc>
+                <a:spcPct val="90000"/>
+              </a:lnSpc>
+              <a:spcBef>
+                <a:spcPct val="0"/>
+              </a:spcBef>
+              <a:buNone/>
+              <a:defRPr lang="en-US" sz="4000" b="0" kern="1200" cap="none" spc="-100" baseline="0">
+                <a:ln w="3175">
+                  <a:noFill/>
+                </a:ln>
+                <a:solidFill>
+                  <a:schemeClr val="bg1"/>
+                </a:solidFill>
+                <a:effectLst/>
+                <a:latin typeface="+mj-lt"/>
+                <a:ea typeface="+mn-ea"/>
+                <a:cs typeface="Arial" charset="0"/>
+              </a:defRPr>
+            </a:lvl1pPr>
+          </a:lstStyle>
+          <a:p>
+            <a:r>
+              <a:rPr lang="es-AR" sz="2400" dirty="0" err="1" smtClean="0"/>
+              <a:t>Part</a:t>
+            </a:r>
+            <a:r>
+              <a:rPr lang="es-AR" sz="2400" dirty="0" smtClean="0"/>
+              <a:t> I: </a:t>
+            </a:r>
+            <a:r>
+              <a:rPr lang="es-AR" sz="2400" dirty="0" err="1" smtClean="0"/>
+              <a:t>Unit</a:t>
+            </a:r>
+            <a:r>
+              <a:rPr lang="es-AR" sz="2400" dirty="0" smtClean="0"/>
+              <a:t> </a:t>
+            </a:r>
+            <a:r>
+              <a:rPr lang="es-AR" sz="2400" dirty="0" err="1" smtClean="0"/>
+              <a:t>Tests</a:t>
+            </a:r>
+            <a:endParaRPr lang="es-AR" sz="2400" b="1" dirty="0">
+              <a:effectLst>
+                <a:outerShdw blurRad="38100" dist="38100" dir="2700000" algn="tl">
+                  <a:srgbClr val="000000">
+                    <a:alpha val="43137"/>
+                  </a:srgbClr>
+                </a:outerShdw>
+              </a:effectLst>
+            </a:endParaRPr>
+          </a:p>
+        </p:txBody>
+      </p:sp>
     </p:spTree>
     <p:extLst>
       <p:ext uri="{BB962C8B-B14F-4D97-AF65-F5344CB8AC3E}">
@@ -22513,20 +22759,29 @@
               <a:rPr lang="en-GB" dirty="0" smtClean="0">
                 <a:latin typeface="Avenir 45 Book (Body)"/>
               </a:rPr>
-              <a:t> If </a:t>
-            </a:r>
-            <a:r>
-              <a:rPr lang="en-GB" dirty="0">
-                <a:latin typeface="Avenir 45 Book (Body)"/>
-              </a:rPr>
-              <a:t>you used these </a:t>
+              <a:t> </a:t>
             </a:r>
             <a:r>
               <a:rPr lang="en-GB" dirty="0" smtClean="0">
                 <a:latin typeface="Avenir 45 Book (Body)"/>
               </a:rPr>
-              <a:t>practices, What advantages would you have?</a:t>
-            </a:r>
+              <a:t>What advantages wou</a:t>
+            </a:r>
+            <a:r>
+              <a:rPr lang="en-GB" dirty="0" smtClean="0">
+                <a:latin typeface="Avenir 45 Book (Body)"/>
+              </a:rPr>
+              <a:t>ld you have by incorporating these practices in your current project</a:t>
+            </a:r>
+            <a:r>
+              <a:rPr lang="en-GB" dirty="0" smtClean="0">
+                <a:latin typeface="Avenir 45 Book (Body)"/>
+              </a:rPr>
+              <a:t>?</a:t>
+            </a:r>
+            <a:endParaRPr lang="en-GB" dirty="0" smtClean="0">
+              <a:latin typeface="Avenir 45 Book (Body)"/>
+            </a:endParaRPr>
           </a:p>
           <a:p>
             <a:pPr marL="0" lvl="1" indent="0">
@@ -22553,33 +22808,14 @@
               <a:rPr lang="en-GB" dirty="0" smtClean="0">
                 <a:latin typeface="Avenir 45 Book (Body)"/>
               </a:rPr>
-              <a:t> What do you believe about the talk?</a:t>
-            </a:r>
-            <a:endParaRPr lang="en-GB" dirty="0">
-              <a:latin typeface="Avenir 45 Book (Body)"/>
-            </a:endParaRPr>
-          </a:p>
-          <a:p>
-            <a:pPr lvl="0" defTabSz="914363">
-              <a:lnSpc>
-                <a:spcPct val="90000"/>
-              </a:lnSpc>
-              <a:spcBef>
-                <a:spcPts val="0"/>
-              </a:spcBef>
-              <a:spcAft>
-                <a:spcPts val="400"/>
-              </a:spcAft>
-              <a:buClr>
-                <a:schemeClr val="tx1">
-                  <a:lumMod val="75000"/>
-                  <a:lumOff val="25000"/>
-                </a:schemeClr>
-              </a:buClr>
-              <a:buSzPct val="100000"/>
-              <a:buFont typeface="Wingdings" panose="05000000000000000000" pitchFamily="2" charset="2"/>
-              <a:buChar char="ä"/>
-            </a:pPr>
+              <a:t> </a:t>
+            </a:r>
+            <a:r>
+              <a:rPr lang="en-GB" dirty="0" smtClean="0">
+                <a:latin typeface="Avenir 45 Book (Body)"/>
+              </a:rPr>
+              <a:t>What’s your take on the concept’s of today’s talk?</a:t>
+            </a:r>
             <a:endParaRPr lang="es-AR" sz="1600" b="1" dirty="0">
               <a:solidFill>
                 <a:srgbClr val="000000"/>
@@ -22831,8 +23067,8 @@
         </p:nvSpPr>
         <p:spPr>
           <a:xfrm>
-            <a:off x="476534" y="1394213"/>
-            <a:ext cx="8142809" cy="4329621"/>
+            <a:off x="476534" y="1312325"/>
+            <a:ext cx="10987585" cy="4329621"/>
           </a:xfrm>
           <a:prstGeom prst="rect">
             <a:avLst/>
@@ -23040,22 +23276,15 @@
                 <a:spcPts val="1200"/>
               </a:spcBef>
               <a:buClrTx/>
-              <a:buFont typeface="Wingdings" panose="05000000000000000000" pitchFamily="2" charset="2"/>
-              <a:buChar char="§"/>
+              <a:buNone/>
             </a:pPr>
             <a:r>
               <a:rPr lang="en-GB" dirty="0" smtClean="0">
                 <a:latin typeface="Avenir 45 Book (Body)"/>
               </a:rPr>
-              <a:t> Makes more m</a:t>
-            </a:r>
-            <a:r>
-              <a:rPr lang="en-GB" dirty="0" smtClean="0">
-                <a:latin typeface="Avenir 45 Book (Body)"/>
-              </a:rPr>
-              <a:t>aintainable code</a:t>
-            </a:r>
-            <a:endParaRPr lang="en-GB" dirty="0">
+              <a:t>These practices:</a:t>
+            </a:r>
+            <a:endParaRPr lang="en-GB" dirty="0" smtClean="0">
               <a:latin typeface="Avenir 45 Book (Body)"/>
             </a:endParaRPr>
           </a:p>
@@ -23068,6 +23297,38 @@
               <a:buFont typeface="Wingdings" panose="05000000000000000000" pitchFamily="2" charset="2"/>
               <a:buChar char="§"/>
             </a:pPr>
+            <a:endParaRPr lang="en-GB" dirty="0" smtClean="0">
+              <a:latin typeface="Avenir 45 Book (Body)"/>
+            </a:endParaRPr>
+          </a:p>
+          <a:p>
+            <a:pPr marL="0" lvl="1" indent="0">
+              <a:spcBef>
+                <a:spcPts val="1200"/>
+              </a:spcBef>
+              <a:buClrTx/>
+              <a:buFont typeface="Wingdings" panose="05000000000000000000" pitchFamily="2" charset="2"/>
+              <a:buChar char="§"/>
+            </a:pPr>
+            <a:r>
+              <a:rPr lang="en-GB" dirty="0" smtClean="0">
+                <a:latin typeface="Avenir 45 Book (Body)"/>
+              </a:rPr>
+              <a:t> Make your code more maintainable</a:t>
+            </a:r>
+            <a:endParaRPr lang="en-GB" dirty="0">
+              <a:latin typeface="Avenir 45 Book (Body)"/>
+            </a:endParaRPr>
+          </a:p>
+          <a:p>
+            <a:pPr marL="0" lvl="1" indent="0">
+              <a:spcBef>
+                <a:spcPts val="1200"/>
+              </a:spcBef>
+              <a:buClrTx/>
+              <a:buFont typeface="Wingdings" panose="05000000000000000000" pitchFamily="2" charset="2"/>
+              <a:buChar char="§"/>
+            </a:pPr>
             <a:r>
               <a:rPr lang="en-GB" dirty="0">
                 <a:latin typeface="Avenir 45 Book (Body)"/>
@@ -23078,8 +23339,11 @@
               <a:rPr lang="en-GB" dirty="0" smtClean="0">
                 <a:latin typeface="Avenir 45 Book (Body)"/>
               </a:rPr>
-              <a:t>Minimizes errors count</a:t>
-            </a:r>
+              <a:t>Minimize the number of errors in the final product</a:t>
+            </a:r>
+            <a:endParaRPr lang="en-GB" dirty="0" smtClean="0">
+              <a:latin typeface="Avenir 45 Book (Body)"/>
+            </a:endParaRPr>
           </a:p>
           <a:p>
             <a:pPr marL="0" lvl="1" indent="0">
@@ -23094,7 +23358,13 @@
               <a:rPr lang="en-GB" dirty="0" smtClean="0">
                 <a:latin typeface="Avenir 45 Book (Body)"/>
               </a:rPr>
-              <a:t> Detects errors earlier</a:t>
+              <a:t> </a:t>
+            </a:r>
+            <a:r>
+              <a:rPr lang="en-GB" dirty="0" smtClean="0">
+                <a:latin typeface="Avenir 45 Book (Body)"/>
+              </a:rPr>
+              <a:t>Allow early detection of errors in the development environment</a:t>
             </a:r>
           </a:p>
           <a:p>
@@ -23107,12 +23377,18 @@
               <a:buChar char="§"/>
             </a:pPr>
             <a:r>
+              <a:rPr lang="en-GB" dirty="0">
+                <a:latin typeface="Avenir 45 Book (Body)"/>
+              </a:rPr>
+              <a:t> </a:t>
+            </a:r>
+            <a:r>
               <a:rPr lang="en-GB" dirty="0" smtClean="0">
                 <a:latin typeface="Avenir 45 Book (Body)"/>
               </a:rPr>
-              <a:t> Performs team organization</a:t>
-            </a:r>
-            <a:endParaRPr lang="en-GB" dirty="0">
+              <a:t>Reduce development and maintenance time over the project’s lifecycle</a:t>
+            </a:r>
+            <a:endParaRPr lang="en-GB" dirty="0" smtClean="0">
               <a:latin typeface="Avenir 45 Book (Body)"/>
             </a:endParaRPr>
           </a:p>
@@ -23126,6 +23402,28 @@
               <a:buChar char="§"/>
             </a:pPr>
             <a:r>
+              <a:rPr lang="en-GB" dirty="0" smtClean="0">
+                <a:latin typeface="Avenir 45 Book (Body)"/>
+              </a:rPr>
+              <a:t> </a:t>
+            </a:r>
+            <a:r>
+              <a:rPr lang="en-GB" dirty="0" smtClean="0">
+                <a:latin typeface="Avenir 45 Book (Body)"/>
+              </a:rPr>
+              <a:t>Improve the development team’s internal organization</a:t>
+            </a:r>
+          </a:p>
+          <a:p>
+            <a:pPr marL="0" lvl="1" indent="0">
+              <a:spcBef>
+                <a:spcPts val="1200"/>
+              </a:spcBef>
+              <a:buClrTx/>
+              <a:buFont typeface="Wingdings" panose="05000000000000000000" pitchFamily="2" charset="2"/>
+              <a:buChar char="§"/>
+            </a:pPr>
+            <a:r>
               <a:rPr lang="en-GB" dirty="0">
                 <a:latin typeface="Avenir 45 Book (Body)"/>
               </a:rPr>
@@ -23135,14 +23433,43 @@
               <a:rPr lang="en-GB" dirty="0" smtClean="0">
                 <a:latin typeface="Avenir 45 Book (Body)"/>
               </a:rPr>
-              <a:t>Improves </a:t>
-            </a:r>
-            <a:r>
-              <a:rPr lang="en-GB" dirty="0">
+              <a:t>Maintain a current build always available for testing, demos or deployment</a:t>
+            </a:r>
+          </a:p>
+          <a:p>
+            <a:pPr marL="0" lvl="1" indent="0">
+              <a:spcBef>
+                <a:spcPts val="1200"/>
+              </a:spcBef>
+              <a:buClrTx/>
+              <a:buFont typeface="Wingdings" panose="05000000000000000000" pitchFamily="2" charset="2"/>
+              <a:buChar char="§"/>
+            </a:pPr>
+            <a:r>
+              <a:rPr lang="en-GB" dirty="0" smtClean="0">
                 <a:latin typeface="Avenir 45 Book (Body)"/>
               </a:rPr>
-              <a:t>final product quality</a:t>
-            </a:r>
+              <a:t> Allow you to generate metrics of code quality, test coverage, etc.</a:t>
+            </a:r>
+          </a:p>
+          <a:p>
+            <a:pPr marL="0" lvl="1" indent="0">
+              <a:spcBef>
+                <a:spcPts val="1200"/>
+              </a:spcBef>
+              <a:buClrTx/>
+              <a:buFont typeface="Wingdings" panose="05000000000000000000" pitchFamily="2" charset="2"/>
+              <a:buChar char="§"/>
+            </a:pPr>
+            <a:r>
+              <a:rPr lang="en-GB" b="1" dirty="0" smtClean="0">
+                <a:latin typeface="Avenir 45 Book (Body)"/>
+              </a:rPr>
+              <a:t> Improve the quality of the final product</a:t>
+            </a:r>
+            <a:endParaRPr lang="en-GB" b="1" dirty="0">
+              <a:latin typeface="Avenir 45 Book (Body)"/>
+            </a:endParaRPr>
           </a:p>
           <a:p>
             <a:pPr marL="0" lvl="1" indent="0">
@@ -23212,6 +23539,474 @@
 </file>
 
 <file path=ppt/slides/slide24.xml><?xml version="1.0" encoding="utf-8"?>
+<p:sld xmlns:a="http://schemas.openxmlformats.org/drawingml/2006/main" xmlns:r="http://schemas.openxmlformats.org/officeDocument/2006/relationships" xmlns:p="http://schemas.openxmlformats.org/presentationml/2006/main">
+  <p:cSld>
+    <p:spTree>
+      <p:nvGrpSpPr>
+        <p:cNvPr id="1" name=""/>
+        <p:cNvGrpSpPr/>
+        <p:nvPr/>
+      </p:nvGrpSpPr>
+      <p:grpSpPr>
+        <a:xfrm>
+          <a:off x="0" y="0"/>
+          <a:ext cx="0" cy="0"/>
+          <a:chOff x="0" y="0"/>
+          <a:chExt cx="0" cy="0"/>
+        </a:xfrm>
+      </p:grpSpPr>
+      <p:sp>
+        <p:nvSpPr>
+          <p:cNvPr id="15" name="Rectangle 14"/>
+          <p:cNvSpPr/>
+          <p:nvPr/>
+        </p:nvSpPr>
+        <p:spPr>
+          <a:xfrm>
+            <a:off x="-13252" y="1"/>
+            <a:ext cx="12218504" cy="1016000"/>
+          </a:xfrm>
+          <a:prstGeom prst="rect">
+            <a:avLst/>
+          </a:prstGeom>
+          <a:solidFill>
+            <a:srgbClr val="FF9600"/>
+          </a:solidFill>
+          <a:ln>
+            <a:noFill/>
+          </a:ln>
+        </p:spPr>
+        <p:style>
+          <a:lnRef idx="1">
+            <a:schemeClr val="accent6"/>
+          </a:lnRef>
+          <a:fillRef idx="3">
+            <a:schemeClr val="accent6"/>
+          </a:fillRef>
+          <a:effectRef idx="2">
+            <a:schemeClr val="accent6"/>
+          </a:effectRef>
+          <a:fontRef idx="minor">
+            <a:schemeClr val="lt1"/>
+          </a:fontRef>
+        </p:style>
+        <p:txBody>
+          <a:bodyPr anchor="ctr"/>
+          <a:lstStyle/>
+          <a:p>
+            <a:pPr marL="0" marR="0" lvl="0" indent="0" algn="ctr" defTabSz="914400" eaLnBrk="1" fontAlgn="auto" latinLnBrk="0" hangingPunct="1">
+              <a:lnSpc>
+                <a:spcPct val="100000"/>
+              </a:lnSpc>
+              <a:spcBef>
+                <a:spcPts val="0"/>
+              </a:spcBef>
+              <a:spcAft>
+                <a:spcPts val="0"/>
+              </a:spcAft>
+              <a:buClrTx/>
+              <a:buSzTx/>
+              <a:buFontTx/>
+              <a:buNone/>
+              <a:tabLst/>
+              <a:defRPr/>
+            </a:pPr>
+            <a:r>
+              <a:rPr kumimoji="0" lang="es-ES_tradnl" sz="1800" b="0" i="0" u="none" strike="noStrike" kern="0" cap="none" spc="0" normalizeH="0" baseline="0" noProof="0" dirty="0" smtClean="0">
+                <a:ln>
+                  <a:noFill/>
+                </a:ln>
+                <a:solidFill>
+                  <a:srgbClr val="FFFFFF"/>
+                </a:solidFill>
+                <a:effectLst/>
+                <a:uLnTx/>
+                <a:uFillTx/>
+                <a:latin typeface="Arial"/>
+                <a:ea typeface="ＭＳ Ｐゴシック" pitchFamily="-108" charset="-128"/>
+                <a:cs typeface="+mn-cs"/>
+              </a:rPr>
+              <a:t>  </a:t>
+            </a:r>
+            <a:endParaRPr kumimoji="0" lang="es-ES_tradnl" sz="1800" b="0" i="0" u="none" strike="noStrike" kern="0" cap="none" spc="0" normalizeH="0" baseline="0" noProof="0" dirty="0">
+              <a:ln>
+                <a:noFill/>
+              </a:ln>
+              <a:solidFill>
+                <a:srgbClr val="FFFFFF"/>
+              </a:solidFill>
+              <a:effectLst/>
+              <a:uLnTx/>
+              <a:uFillTx/>
+              <a:latin typeface="Arial"/>
+              <a:ea typeface="ＭＳ Ｐゴシック" pitchFamily="-108" charset="-128"/>
+              <a:cs typeface="+mn-cs"/>
+            </a:endParaRPr>
+          </a:p>
+        </p:txBody>
+      </p:sp>
+      <p:sp>
+        <p:nvSpPr>
+          <p:cNvPr id="16" name="TextBox 15"/>
+          <p:cNvSpPr txBox="1"/>
+          <p:nvPr/>
+        </p:nvSpPr>
+        <p:spPr>
+          <a:xfrm>
+            <a:off x="515936" y="212035"/>
+            <a:ext cx="11676063" cy="553998"/>
+          </a:xfrm>
+          <a:prstGeom prst="rect">
+            <a:avLst/>
+          </a:prstGeom>
+          <a:noFill/>
+        </p:spPr>
+        <p:txBody>
+          <a:bodyPr wrap="square" lIns="0" tIns="0" rIns="0" bIns="0" rtlCol="0">
+            <a:spAutoFit/>
+          </a:bodyPr>
+          <a:lstStyle/>
+          <a:p>
+            <a:r>
+              <a:rPr lang="en-US" sz="3600" dirty="0" smtClean="0">
+                <a:solidFill>
+                  <a:schemeClr val="bg1"/>
+                </a:solidFill>
+              </a:rPr>
+              <a:t>Part II: Scenes of the next episode…</a:t>
+            </a:r>
+            <a:endParaRPr lang="es-AR" sz="3600" dirty="0">
+              <a:solidFill>
+                <a:schemeClr val="bg1"/>
+              </a:solidFill>
+            </a:endParaRPr>
+          </a:p>
+        </p:txBody>
+      </p:sp>
+      <p:sp>
+        <p:nvSpPr>
+          <p:cNvPr id="6" name="Content Placeholder 2"/>
+          <p:cNvSpPr txBox="1">
+            <a:spLocks/>
+          </p:cNvSpPr>
+          <p:nvPr/>
+        </p:nvSpPr>
+        <p:spPr>
+          <a:xfrm>
+            <a:off x="476534" y="1312325"/>
+            <a:ext cx="10987585" cy="4329621"/>
+          </a:xfrm>
+          <a:prstGeom prst="rect">
+            <a:avLst/>
+          </a:prstGeom>
+        </p:spPr>
+        <p:txBody>
+          <a:bodyPr vert="horz" lIns="91440" tIns="45720" rIns="91440" bIns="45720" rtlCol="0">
+            <a:noAutofit/>
+          </a:bodyPr>
+          <a:lstStyle>
+            <a:lvl1pPr marL="273050" marR="0" indent="-273050" algn="l" defTabSz="914400" rtl="0" eaLnBrk="1" fontAlgn="auto" latinLnBrk="0" hangingPunct="1">
+              <a:lnSpc>
+                <a:spcPct val="100000"/>
+              </a:lnSpc>
+              <a:spcBef>
+                <a:spcPts val="1200"/>
+              </a:spcBef>
+              <a:spcAft>
+                <a:spcPts val="0"/>
+              </a:spcAft>
+              <a:buClr>
+                <a:srgbClr val="DA1218"/>
+              </a:buClr>
+              <a:buSzTx/>
+              <a:buFont typeface="Wingdings" pitchFamily="2" charset="2"/>
+              <a:buChar char="§"/>
+              <a:tabLst/>
+              <a:defRPr lang="en-US" sz="2400" kern="1200">
+                <a:solidFill>
+                  <a:schemeClr val="tx1"/>
+                </a:solidFill>
+                <a:latin typeface="Arial" pitchFamily="34" charset="0"/>
+                <a:ea typeface="+mn-ea"/>
+                <a:cs typeface="Arial" pitchFamily="34" charset="0"/>
+              </a:defRPr>
+            </a:lvl1pPr>
+            <a:lvl2pPr marL="628650" marR="0" indent="-355600" algn="l" defTabSz="914400" rtl="0" eaLnBrk="1" fontAlgn="auto" latinLnBrk="0" hangingPunct="1">
+              <a:lnSpc>
+                <a:spcPct val="100000"/>
+              </a:lnSpc>
+              <a:spcBef>
+                <a:spcPct val="20000"/>
+              </a:spcBef>
+              <a:spcAft>
+                <a:spcPts val="0"/>
+              </a:spcAft>
+              <a:buClr>
+                <a:srgbClr val="DA1218"/>
+              </a:buClr>
+              <a:buSzTx/>
+              <a:buFont typeface="Wingdings" pitchFamily="2" charset="2"/>
+              <a:buChar char=""/>
+              <a:tabLst/>
+              <a:defRPr lang="en-US" sz="2000" kern="1200">
+                <a:solidFill>
+                  <a:schemeClr val="tx1"/>
+                </a:solidFill>
+                <a:latin typeface="Arial" pitchFamily="34" charset="0"/>
+                <a:ea typeface="+mn-ea"/>
+                <a:cs typeface="Arial" pitchFamily="34" charset="0"/>
+              </a:defRPr>
+            </a:lvl2pPr>
+            <a:lvl3pPr marL="903288" marR="0" indent="-274638" algn="l" defTabSz="914400" rtl="0" eaLnBrk="1" fontAlgn="auto" latinLnBrk="0" hangingPunct="1">
+              <a:lnSpc>
+                <a:spcPct val="100000"/>
+              </a:lnSpc>
+              <a:spcBef>
+                <a:spcPct val="20000"/>
+              </a:spcBef>
+              <a:spcAft>
+                <a:spcPts val="0"/>
+              </a:spcAft>
+              <a:buClr>
+                <a:srgbClr val="DA1218"/>
+              </a:buClr>
+              <a:buSzTx/>
+              <a:buFont typeface="Wingdings" pitchFamily="2" charset="2"/>
+              <a:buChar char="ü"/>
+              <a:tabLst/>
+              <a:defRPr lang="en-US" sz="1800" kern="1200">
+                <a:solidFill>
+                  <a:schemeClr val="tx1"/>
+                </a:solidFill>
+                <a:latin typeface="Arial" pitchFamily="34" charset="0"/>
+                <a:ea typeface="+mn-ea"/>
+                <a:cs typeface="Arial" pitchFamily="34" charset="0"/>
+              </a:defRPr>
+            </a:lvl3pPr>
+            <a:lvl4pPr marL="1081088" marR="0" indent="-177800" algn="l" defTabSz="914400" rtl="0" eaLnBrk="1" fontAlgn="auto" latinLnBrk="0" hangingPunct="1">
+              <a:lnSpc>
+                <a:spcPct val="100000"/>
+              </a:lnSpc>
+              <a:spcBef>
+                <a:spcPct val="20000"/>
+              </a:spcBef>
+              <a:spcAft>
+                <a:spcPts val="0"/>
+              </a:spcAft>
+              <a:buClr>
+                <a:srgbClr val="DA1218"/>
+              </a:buClr>
+              <a:buSzTx/>
+              <a:buFont typeface="Arial" pitchFamily="34" charset="0"/>
+              <a:buChar char="•"/>
+              <a:tabLst/>
+              <a:defRPr lang="en-US" sz="1600" kern="1200">
+                <a:solidFill>
+                  <a:schemeClr val="tx1"/>
+                </a:solidFill>
+                <a:latin typeface="Arial" pitchFamily="34" charset="0"/>
+                <a:ea typeface="+mn-ea"/>
+                <a:cs typeface="Arial" pitchFamily="34" charset="0"/>
+              </a:defRPr>
+            </a:lvl4pPr>
+            <a:lvl5pPr marL="1258888" marR="0" indent="-177800" algn="l" defTabSz="914400" rtl="0" eaLnBrk="1" fontAlgn="auto" latinLnBrk="0" hangingPunct="1">
+              <a:lnSpc>
+                <a:spcPct val="100000"/>
+              </a:lnSpc>
+              <a:spcBef>
+                <a:spcPct val="20000"/>
+              </a:spcBef>
+              <a:spcAft>
+                <a:spcPts val="0"/>
+              </a:spcAft>
+              <a:buClr>
+                <a:srgbClr val="DA1218"/>
+              </a:buClr>
+              <a:buSzPct val="100000"/>
+              <a:buFont typeface="Courier New" pitchFamily="49" charset="0"/>
+              <a:buChar char="o"/>
+              <a:tabLst/>
+              <a:defRPr lang="es-AR" sz="1400" kern="1200">
+                <a:solidFill>
+                  <a:schemeClr val="tx1"/>
+                </a:solidFill>
+                <a:latin typeface="Arial" pitchFamily="34" charset="0"/>
+                <a:ea typeface="+mn-ea"/>
+                <a:cs typeface="Arial" pitchFamily="34" charset="0"/>
+              </a:defRPr>
+            </a:lvl5pPr>
+            <a:lvl6pPr marL="2514600" indent="-228600" algn="l" defTabSz="914400" rtl="0" eaLnBrk="1" latinLnBrk="0" hangingPunct="1">
+              <a:spcBef>
+                <a:spcPct val="20000"/>
+              </a:spcBef>
+              <a:buFont typeface="Arial" pitchFamily="34" charset="0"/>
+              <a:buChar char="•"/>
+              <a:defRPr sz="2000" kern="1200">
+                <a:solidFill>
+                  <a:schemeClr val="tx1"/>
+                </a:solidFill>
+                <a:latin typeface="+mn-lt"/>
+                <a:ea typeface="+mn-ea"/>
+                <a:cs typeface="+mn-cs"/>
+              </a:defRPr>
+            </a:lvl6pPr>
+            <a:lvl7pPr marL="2971800" indent="-228600" algn="l" defTabSz="914400" rtl="0" eaLnBrk="1" latinLnBrk="0" hangingPunct="1">
+              <a:spcBef>
+                <a:spcPct val="20000"/>
+              </a:spcBef>
+              <a:buFont typeface="Arial" pitchFamily="34" charset="0"/>
+              <a:buChar char="•"/>
+              <a:defRPr sz="2000" kern="1200">
+                <a:solidFill>
+                  <a:schemeClr val="tx1"/>
+                </a:solidFill>
+                <a:latin typeface="+mn-lt"/>
+                <a:ea typeface="+mn-ea"/>
+                <a:cs typeface="+mn-cs"/>
+              </a:defRPr>
+            </a:lvl7pPr>
+            <a:lvl8pPr marL="3429000" indent="-228600" algn="l" defTabSz="914400" rtl="0" eaLnBrk="1" latinLnBrk="0" hangingPunct="1">
+              <a:spcBef>
+                <a:spcPct val="20000"/>
+              </a:spcBef>
+              <a:buFont typeface="Arial" pitchFamily="34" charset="0"/>
+              <a:buChar char="•"/>
+              <a:defRPr sz="2000" kern="1200">
+                <a:solidFill>
+                  <a:schemeClr val="tx1"/>
+                </a:solidFill>
+                <a:latin typeface="+mn-lt"/>
+                <a:ea typeface="+mn-ea"/>
+                <a:cs typeface="+mn-cs"/>
+              </a:defRPr>
+            </a:lvl8pPr>
+            <a:lvl9pPr marL="3886200" indent="-228600" algn="l" defTabSz="914400" rtl="0" eaLnBrk="1" latinLnBrk="0" hangingPunct="1">
+              <a:spcBef>
+                <a:spcPct val="20000"/>
+              </a:spcBef>
+              <a:buFont typeface="Arial" pitchFamily="34" charset="0"/>
+              <a:buChar char="•"/>
+              <a:defRPr sz="2000" kern="1200">
+                <a:solidFill>
+                  <a:schemeClr val="tx1"/>
+                </a:solidFill>
+                <a:latin typeface="+mn-lt"/>
+                <a:ea typeface="+mn-ea"/>
+                <a:cs typeface="+mn-cs"/>
+              </a:defRPr>
+            </a:lvl9pPr>
+          </a:lstStyle>
+          <a:p>
+            <a:pPr marL="0" lvl="1" indent="0">
+              <a:spcBef>
+                <a:spcPts val="1200"/>
+              </a:spcBef>
+              <a:buClrTx/>
+              <a:buFont typeface="Wingdings" panose="05000000000000000000" pitchFamily="2" charset="2"/>
+              <a:buChar char="§"/>
+            </a:pPr>
+            <a:r>
+              <a:rPr lang="en-GB" dirty="0" smtClean="0">
+                <a:latin typeface="Avenir 45 Book (Body)"/>
+              </a:rPr>
+              <a:t> Database Integration Tests</a:t>
+            </a:r>
+            <a:endParaRPr lang="en-GB" dirty="0">
+              <a:latin typeface="Avenir 45 Book (Body)"/>
+            </a:endParaRPr>
+          </a:p>
+          <a:p>
+            <a:pPr marL="0" lvl="1" indent="0">
+              <a:spcBef>
+                <a:spcPts val="1200"/>
+              </a:spcBef>
+              <a:buClrTx/>
+              <a:buFont typeface="Wingdings" panose="05000000000000000000" pitchFamily="2" charset="2"/>
+              <a:buChar char="§"/>
+            </a:pPr>
+            <a:r>
+              <a:rPr lang="en-GB" dirty="0">
+                <a:latin typeface="Avenir 45 Book (Body)"/>
+              </a:rPr>
+              <a:t> </a:t>
+            </a:r>
+            <a:r>
+              <a:rPr lang="en-GB" dirty="0" smtClean="0">
+                <a:latin typeface="Avenir 45 Book (Body)"/>
+              </a:rPr>
+              <a:t>How to work with Legacy Code</a:t>
+            </a:r>
+            <a:endParaRPr lang="en-GB" dirty="0" smtClean="0">
+              <a:latin typeface="Avenir 45 Book (Body)"/>
+            </a:endParaRPr>
+          </a:p>
+          <a:p>
+            <a:pPr marL="0" lvl="1" indent="0">
+              <a:spcBef>
+                <a:spcPts val="1200"/>
+              </a:spcBef>
+              <a:buClrTx/>
+              <a:buNone/>
+            </a:pPr>
+            <a:endParaRPr lang="en-GB" dirty="0">
+              <a:latin typeface="Avenir 45 Book (Body)"/>
+            </a:endParaRPr>
+          </a:p>
+          <a:p>
+            <a:pPr lvl="0" defTabSz="914363">
+              <a:lnSpc>
+                <a:spcPct val="90000"/>
+              </a:lnSpc>
+              <a:spcBef>
+                <a:spcPts val="0"/>
+              </a:spcBef>
+              <a:spcAft>
+                <a:spcPts val="400"/>
+              </a:spcAft>
+              <a:buClr>
+                <a:schemeClr val="tx1">
+                  <a:lumMod val="75000"/>
+                  <a:lumOff val="25000"/>
+                </a:schemeClr>
+              </a:buClr>
+              <a:buSzPct val="100000"/>
+              <a:buFont typeface="Wingdings" panose="05000000000000000000" pitchFamily="2" charset="2"/>
+              <a:buChar char="ä"/>
+            </a:pPr>
+            <a:endParaRPr lang="es-AR" sz="1600" b="1" dirty="0">
+              <a:solidFill>
+                <a:srgbClr val="000000"/>
+              </a:solidFill>
+              <a:latin typeface="Avenir 45 Book (Body)"/>
+              <a:cs typeface="+mn-cs"/>
+            </a:endParaRPr>
+          </a:p>
+        </p:txBody>
+      </p:sp>
+    </p:spTree>
+    <p:extLst>
+      <p:ext uri="{BB962C8B-B14F-4D97-AF65-F5344CB8AC3E}">
+        <p14:creationId xmlns:p14="http://schemas.microsoft.com/office/powerpoint/2010/main" val="2265722533"/>
+      </p:ext>
+    </p:extLst>
+  </p:cSld>
+  <p:clrMapOvr>
+    <a:masterClrMapping/>
+  </p:clrMapOvr>
+  <p:transition spd="slow">
+    <p:wipe/>
+  </p:transition>
+  <p:timing>
+    <p:tnLst>
+      <p:par>
+        <p:cTn id="1" dur="indefinite" restart="never" nodeType="tmRoot"/>
+      </p:par>
+    </p:tnLst>
+  </p:timing>
+</p:sld>
+</file>
+
+<file path=ppt/slides/slide25.xml><?xml version="1.0" encoding="utf-8"?>
 <p:sld xmlns:a="http://schemas.openxmlformats.org/drawingml/2006/main" xmlns:r="http://schemas.openxmlformats.org/officeDocument/2006/relationships" xmlns:p="http://schemas.openxmlformats.org/presentationml/2006/main">
   <p:cSld>
     <p:spTree>
@@ -24895,7 +25690,17 @@
                 <a:latin typeface="Avenir 45 Book"/>
                 <a:cs typeface="+mn-cs"/>
               </a:rPr>
-              <a:t>Divulge the use of best practices such as unit &amp; integration testing and continuous integration</a:t>
+              <a:t>Divulge the use of best practices such as unit &amp; integration </a:t>
+            </a:r>
+            <a:r>
+              <a:rPr lang="en-GB" sz="1800" dirty="0" smtClean="0">
+                <a:solidFill>
+                  <a:srgbClr val="000000"/>
+                </a:solidFill>
+                <a:latin typeface="Avenir 45 Book"/>
+                <a:cs typeface="+mn-cs"/>
+              </a:rPr>
+              <a:t>testing and continuous integration</a:t>
             </a:r>
             <a:r>
               <a:rPr lang="en-GB" sz="1600" b="1" dirty="0" smtClean="0">

</xml_diff>

<commit_message>
modificaciones a la ppt
</commit_message>
<xml_diff>
--- a/DesigningTestableApplications v2.pptx
+++ b/DesigningTestableApplications v2.pptx
@@ -6,10 +6,10 @@
     <p:sldMasterId id="2147483944" r:id="rId3"/>
   </p:sldMasterIdLst>
   <p:notesMasterIdLst>
-    <p:notesMasterId r:id="rId29"/>
+    <p:notesMasterId r:id="rId31"/>
   </p:notesMasterIdLst>
   <p:handoutMasterIdLst>
-    <p:handoutMasterId r:id="rId30"/>
+    <p:handoutMasterId r:id="rId32"/>
   </p:handoutMasterIdLst>
   <p:sldIdLst>
     <p:sldId id="321" r:id="rId4"/>
@@ -31,12 +31,14 @@
     <p:sldId id="375" r:id="rId20"/>
     <p:sldId id="376" r:id="rId21"/>
     <p:sldId id="377" r:id="rId22"/>
-    <p:sldId id="383" r:id="rId23"/>
-    <p:sldId id="384" r:id="rId24"/>
-    <p:sldId id="378" r:id="rId25"/>
-    <p:sldId id="382" r:id="rId26"/>
-    <p:sldId id="385" r:id="rId27"/>
-    <p:sldId id="349" r:id="rId28"/>
+    <p:sldId id="387" r:id="rId23"/>
+    <p:sldId id="383" r:id="rId24"/>
+    <p:sldId id="384" r:id="rId25"/>
+    <p:sldId id="378" r:id="rId26"/>
+    <p:sldId id="382" r:id="rId27"/>
+    <p:sldId id="386" r:id="rId28"/>
+    <p:sldId id="385" r:id="rId29"/>
+    <p:sldId id="349" r:id="rId30"/>
   </p:sldIdLst>
   <p:sldSz cx="12192000" cy="6858000"/>
   <p:notesSz cx="6858000" cy="9144000"/>
@@ -249,7 +251,7 @@
           <a:p>
             <a:fld id="{D63D5444-F62C-42C3-A75A-D9DBA807730F}" type="datetimeFigureOut">
               <a:rPr lang="en-US" smtClean="0"/>
-              <a:t>3/18/2015</a:t>
+              <a:t>3/19/2015</a:t>
             </a:fld>
             <a:endParaRPr lang="en-US"/>
           </a:p>
@@ -414,7 +416,7 @@
           <a:p>
             <a:fld id="{12CAA1FA-7B6A-47D2-8D61-F225D71B51FF}" type="datetimeFigureOut">
               <a:rPr lang="en-US" smtClean="0"/>
-              <a:t>3/18/2015</a:t>
+              <a:t>3/19/2015</a:t>
             </a:fld>
             <a:endParaRPr lang="en-US"/>
           </a:p>
@@ -747,7 +749,7 @@
           <a:p>
             <a:fld id="{1B9A179D-2D27-49E2-B022-8EDDA2EFE682}" type="slidenum">
               <a:rPr lang="en-US" smtClean="0"/>
-              <a:t>23</a:t>
+              <a:t>24</a:t>
             </a:fld>
             <a:endParaRPr lang="en-US"/>
           </a:p>
@@ -831,7 +833,91 @@
           <a:p>
             <a:fld id="{1B9A179D-2D27-49E2-B022-8EDDA2EFE682}" type="slidenum">
               <a:rPr lang="en-US" smtClean="0"/>
-              <a:t>24</a:t>
+              <a:t>25</a:t>
+            </a:fld>
+            <a:endParaRPr lang="en-US"/>
+          </a:p>
+        </p:txBody>
+      </p:sp>
+    </p:spTree>
+    <p:extLst>
+      <p:ext uri="{BB962C8B-B14F-4D97-AF65-F5344CB8AC3E}">
+        <p14:creationId xmlns:p14="http://schemas.microsoft.com/office/powerpoint/2010/main" val="3852295329"/>
+      </p:ext>
+    </p:extLst>
+  </p:cSld>
+  <p:clrMapOvr>
+    <a:masterClrMapping/>
+  </p:clrMapOvr>
+</p:notes>
+</file>
+
+<file path=ppt/notesSlides/notesSlide3.xml><?xml version="1.0" encoding="utf-8"?>
+<p:notes xmlns:a="http://schemas.openxmlformats.org/drawingml/2006/main" xmlns:r="http://schemas.openxmlformats.org/officeDocument/2006/relationships" xmlns:p="http://schemas.openxmlformats.org/presentationml/2006/main">
+  <p:cSld>
+    <p:spTree>
+      <p:nvGrpSpPr>
+        <p:cNvPr id="1" name=""/>
+        <p:cNvGrpSpPr/>
+        <p:nvPr/>
+      </p:nvGrpSpPr>
+      <p:grpSpPr>
+        <a:xfrm>
+          <a:off x="0" y="0"/>
+          <a:ext cx="0" cy="0"/>
+          <a:chOff x="0" y="0"/>
+          <a:chExt cx="0" cy="0"/>
+        </a:xfrm>
+      </p:grpSpPr>
+      <p:sp>
+        <p:nvSpPr>
+          <p:cNvPr id="2" name="Slide Image Placeholder 1"/>
+          <p:cNvSpPr>
+            <a:spLocks noGrp="1" noRot="1" noChangeAspect="1"/>
+          </p:cNvSpPr>
+          <p:nvPr>
+            <p:ph type="sldImg"/>
+          </p:nvPr>
+        </p:nvSpPr>
+        <p:spPr/>
+      </p:sp>
+      <p:sp>
+        <p:nvSpPr>
+          <p:cNvPr id="3" name="Notes Placeholder 2"/>
+          <p:cNvSpPr>
+            <a:spLocks noGrp="1"/>
+          </p:cNvSpPr>
+          <p:nvPr>
+            <p:ph type="body" idx="1"/>
+          </p:nvPr>
+        </p:nvSpPr>
+        <p:spPr/>
+        <p:txBody>
+          <a:bodyPr/>
+          <a:lstStyle/>
+          <a:p>
+            <a:endParaRPr lang="es-AR" dirty="0"/>
+          </a:p>
+        </p:txBody>
+      </p:sp>
+      <p:sp>
+        <p:nvSpPr>
+          <p:cNvPr id="4" name="Slide Number Placeholder 3"/>
+          <p:cNvSpPr>
+            <a:spLocks noGrp="1"/>
+          </p:cNvSpPr>
+          <p:nvPr>
+            <p:ph type="sldNum" sz="quarter" idx="10"/>
+          </p:nvPr>
+        </p:nvSpPr>
+        <p:spPr/>
+        <p:txBody>
+          <a:bodyPr/>
+          <a:lstStyle/>
+          <a:p>
+            <a:fld id="{1B9A179D-2D27-49E2-B022-8EDDA2EFE682}" type="slidenum">
+              <a:rPr lang="en-US" smtClean="0"/>
+              <a:t>26</a:t>
             </a:fld>
             <a:endParaRPr lang="en-US"/>
           </a:p>
@@ -22310,6 +22396,457 @@
       </p:grpSpPr>
       <p:sp>
         <p:nvSpPr>
+          <p:cNvPr id="15" name="Rectangle 14"/>
+          <p:cNvSpPr/>
+          <p:nvPr/>
+        </p:nvSpPr>
+        <p:spPr>
+          <a:xfrm>
+            <a:off x="-13252" y="1"/>
+            <a:ext cx="12218504" cy="1016000"/>
+          </a:xfrm>
+          <a:prstGeom prst="rect">
+            <a:avLst/>
+          </a:prstGeom>
+          <a:solidFill>
+            <a:srgbClr val="FF9600"/>
+          </a:solidFill>
+          <a:ln>
+            <a:noFill/>
+          </a:ln>
+        </p:spPr>
+        <p:style>
+          <a:lnRef idx="1">
+            <a:schemeClr val="accent6"/>
+          </a:lnRef>
+          <a:fillRef idx="3">
+            <a:schemeClr val="accent6"/>
+          </a:fillRef>
+          <a:effectRef idx="2">
+            <a:schemeClr val="accent6"/>
+          </a:effectRef>
+          <a:fontRef idx="minor">
+            <a:schemeClr val="lt1"/>
+          </a:fontRef>
+        </p:style>
+        <p:txBody>
+          <a:bodyPr anchor="ctr"/>
+          <a:lstStyle/>
+          <a:p>
+            <a:pPr marL="0" marR="0" lvl="0" indent="0" algn="ctr" defTabSz="914400" eaLnBrk="1" fontAlgn="auto" latinLnBrk="0" hangingPunct="1">
+              <a:lnSpc>
+                <a:spcPct val="100000"/>
+              </a:lnSpc>
+              <a:spcBef>
+                <a:spcPts val="0"/>
+              </a:spcBef>
+              <a:spcAft>
+                <a:spcPts val="0"/>
+              </a:spcAft>
+              <a:buClrTx/>
+              <a:buSzTx/>
+              <a:buFontTx/>
+              <a:buNone/>
+              <a:tabLst/>
+              <a:defRPr/>
+            </a:pPr>
+            <a:r>
+              <a:rPr kumimoji="0" lang="es-ES_tradnl" sz="1800" b="0" i="0" u="none" strike="noStrike" kern="0" cap="none" spc="0" normalizeH="0" baseline="0" noProof="0" dirty="0" smtClean="0">
+                <a:ln>
+                  <a:noFill/>
+                </a:ln>
+                <a:solidFill>
+                  <a:srgbClr val="FFFFFF"/>
+                </a:solidFill>
+                <a:effectLst/>
+                <a:uLnTx/>
+                <a:uFillTx/>
+                <a:latin typeface="Arial"/>
+                <a:ea typeface="ＭＳ Ｐゴシック" pitchFamily="-108" charset="-128"/>
+                <a:cs typeface="+mn-cs"/>
+              </a:rPr>
+              <a:t>  </a:t>
+            </a:r>
+            <a:endParaRPr kumimoji="0" lang="es-ES_tradnl" sz="1800" b="0" i="0" u="none" strike="noStrike" kern="0" cap="none" spc="0" normalizeH="0" baseline="0" noProof="0" dirty="0">
+              <a:ln>
+                <a:noFill/>
+              </a:ln>
+              <a:solidFill>
+                <a:srgbClr val="FFFFFF"/>
+              </a:solidFill>
+              <a:effectLst/>
+              <a:uLnTx/>
+              <a:uFillTx/>
+              <a:latin typeface="Arial"/>
+              <a:ea typeface="ＭＳ Ｐゴシック" pitchFamily="-108" charset="-128"/>
+              <a:cs typeface="+mn-cs"/>
+            </a:endParaRPr>
+          </a:p>
+        </p:txBody>
+      </p:sp>
+      <p:sp>
+        <p:nvSpPr>
+          <p:cNvPr id="16" name="TextBox 15"/>
+          <p:cNvSpPr txBox="1"/>
+          <p:nvPr/>
+        </p:nvSpPr>
+        <p:spPr>
+          <a:xfrm>
+            <a:off x="515936" y="212035"/>
+            <a:ext cx="11676063" cy="553998"/>
+          </a:xfrm>
+          <a:prstGeom prst="rect">
+            <a:avLst/>
+          </a:prstGeom>
+          <a:noFill/>
+        </p:spPr>
+        <p:txBody>
+          <a:bodyPr wrap="square" lIns="0" tIns="0" rIns="0" bIns="0" rtlCol="0">
+            <a:spAutoFit/>
+          </a:bodyPr>
+          <a:lstStyle/>
+          <a:p>
+            <a:r>
+              <a:rPr lang="en-US" sz="3600" dirty="0" smtClean="0">
+                <a:solidFill>
+                  <a:schemeClr val="bg1"/>
+                </a:solidFill>
+              </a:rPr>
+              <a:t>Questions</a:t>
+            </a:r>
+            <a:endParaRPr lang="es-AR" sz="3600" dirty="0">
+              <a:solidFill>
+                <a:schemeClr val="bg1"/>
+              </a:solidFill>
+            </a:endParaRPr>
+          </a:p>
+        </p:txBody>
+      </p:sp>
+      <p:sp>
+        <p:nvSpPr>
+          <p:cNvPr id="6" name="Content Placeholder 2"/>
+          <p:cNvSpPr txBox="1">
+            <a:spLocks/>
+          </p:cNvSpPr>
+          <p:nvPr/>
+        </p:nvSpPr>
+        <p:spPr>
+          <a:xfrm>
+            <a:off x="476534" y="1394213"/>
+            <a:ext cx="8142809" cy="4329621"/>
+          </a:xfrm>
+          <a:prstGeom prst="rect">
+            <a:avLst/>
+          </a:prstGeom>
+        </p:spPr>
+        <p:txBody>
+          <a:bodyPr vert="horz" lIns="91440" tIns="45720" rIns="91440" bIns="45720" rtlCol="0">
+            <a:noAutofit/>
+          </a:bodyPr>
+          <a:lstStyle>
+            <a:lvl1pPr marL="273050" marR="0" indent="-273050" algn="l" defTabSz="914400" rtl="0" eaLnBrk="1" fontAlgn="auto" latinLnBrk="0" hangingPunct="1">
+              <a:lnSpc>
+                <a:spcPct val="100000"/>
+              </a:lnSpc>
+              <a:spcBef>
+                <a:spcPts val="1200"/>
+              </a:spcBef>
+              <a:spcAft>
+                <a:spcPts val="0"/>
+              </a:spcAft>
+              <a:buClr>
+                <a:srgbClr val="DA1218"/>
+              </a:buClr>
+              <a:buSzTx/>
+              <a:buFont typeface="Wingdings" pitchFamily="2" charset="2"/>
+              <a:buChar char="§"/>
+              <a:tabLst/>
+              <a:defRPr lang="en-US" sz="2400" kern="1200">
+                <a:solidFill>
+                  <a:schemeClr val="tx1"/>
+                </a:solidFill>
+                <a:latin typeface="Arial" pitchFamily="34" charset="0"/>
+                <a:ea typeface="+mn-ea"/>
+                <a:cs typeface="Arial" pitchFamily="34" charset="0"/>
+              </a:defRPr>
+            </a:lvl1pPr>
+            <a:lvl2pPr marL="628650" marR="0" indent="-355600" algn="l" defTabSz="914400" rtl="0" eaLnBrk="1" fontAlgn="auto" latinLnBrk="0" hangingPunct="1">
+              <a:lnSpc>
+                <a:spcPct val="100000"/>
+              </a:lnSpc>
+              <a:spcBef>
+                <a:spcPct val="20000"/>
+              </a:spcBef>
+              <a:spcAft>
+                <a:spcPts val="0"/>
+              </a:spcAft>
+              <a:buClr>
+                <a:srgbClr val="DA1218"/>
+              </a:buClr>
+              <a:buSzTx/>
+              <a:buFont typeface="Wingdings" pitchFamily="2" charset="2"/>
+              <a:buChar char=""/>
+              <a:tabLst/>
+              <a:defRPr lang="en-US" sz="2000" kern="1200">
+                <a:solidFill>
+                  <a:schemeClr val="tx1"/>
+                </a:solidFill>
+                <a:latin typeface="Arial" pitchFamily="34" charset="0"/>
+                <a:ea typeface="+mn-ea"/>
+                <a:cs typeface="Arial" pitchFamily="34" charset="0"/>
+              </a:defRPr>
+            </a:lvl2pPr>
+            <a:lvl3pPr marL="903288" marR="0" indent="-274638" algn="l" defTabSz="914400" rtl="0" eaLnBrk="1" fontAlgn="auto" latinLnBrk="0" hangingPunct="1">
+              <a:lnSpc>
+                <a:spcPct val="100000"/>
+              </a:lnSpc>
+              <a:spcBef>
+                <a:spcPct val="20000"/>
+              </a:spcBef>
+              <a:spcAft>
+                <a:spcPts val="0"/>
+              </a:spcAft>
+              <a:buClr>
+                <a:srgbClr val="DA1218"/>
+              </a:buClr>
+              <a:buSzTx/>
+              <a:buFont typeface="Wingdings" pitchFamily="2" charset="2"/>
+              <a:buChar char="ü"/>
+              <a:tabLst/>
+              <a:defRPr lang="en-US" sz="1800" kern="1200">
+                <a:solidFill>
+                  <a:schemeClr val="tx1"/>
+                </a:solidFill>
+                <a:latin typeface="Arial" pitchFamily="34" charset="0"/>
+                <a:ea typeface="+mn-ea"/>
+                <a:cs typeface="Arial" pitchFamily="34" charset="0"/>
+              </a:defRPr>
+            </a:lvl3pPr>
+            <a:lvl4pPr marL="1081088" marR="0" indent="-177800" algn="l" defTabSz="914400" rtl="0" eaLnBrk="1" fontAlgn="auto" latinLnBrk="0" hangingPunct="1">
+              <a:lnSpc>
+                <a:spcPct val="100000"/>
+              </a:lnSpc>
+              <a:spcBef>
+                <a:spcPct val="20000"/>
+              </a:spcBef>
+              <a:spcAft>
+                <a:spcPts val="0"/>
+              </a:spcAft>
+              <a:buClr>
+                <a:srgbClr val="DA1218"/>
+              </a:buClr>
+              <a:buSzTx/>
+              <a:buFont typeface="Arial" pitchFamily="34" charset="0"/>
+              <a:buChar char="•"/>
+              <a:tabLst/>
+              <a:defRPr lang="en-US" sz="1600" kern="1200">
+                <a:solidFill>
+                  <a:schemeClr val="tx1"/>
+                </a:solidFill>
+                <a:latin typeface="Arial" pitchFamily="34" charset="0"/>
+                <a:ea typeface="+mn-ea"/>
+                <a:cs typeface="Arial" pitchFamily="34" charset="0"/>
+              </a:defRPr>
+            </a:lvl4pPr>
+            <a:lvl5pPr marL="1258888" marR="0" indent="-177800" algn="l" defTabSz="914400" rtl="0" eaLnBrk="1" fontAlgn="auto" latinLnBrk="0" hangingPunct="1">
+              <a:lnSpc>
+                <a:spcPct val="100000"/>
+              </a:lnSpc>
+              <a:spcBef>
+                <a:spcPct val="20000"/>
+              </a:spcBef>
+              <a:spcAft>
+                <a:spcPts val="0"/>
+              </a:spcAft>
+              <a:buClr>
+                <a:srgbClr val="DA1218"/>
+              </a:buClr>
+              <a:buSzPct val="100000"/>
+              <a:buFont typeface="Courier New" pitchFamily="49" charset="0"/>
+              <a:buChar char="o"/>
+              <a:tabLst/>
+              <a:defRPr lang="es-AR" sz="1400" kern="1200">
+                <a:solidFill>
+                  <a:schemeClr val="tx1"/>
+                </a:solidFill>
+                <a:latin typeface="Arial" pitchFamily="34" charset="0"/>
+                <a:ea typeface="+mn-ea"/>
+                <a:cs typeface="Arial" pitchFamily="34" charset="0"/>
+              </a:defRPr>
+            </a:lvl5pPr>
+            <a:lvl6pPr marL="2514600" indent="-228600" algn="l" defTabSz="914400" rtl="0" eaLnBrk="1" latinLnBrk="0" hangingPunct="1">
+              <a:spcBef>
+                <a:spcPct val="20000"/>
+              </a:spcBef>
+              <a:buFont typeface="Arial" pitchFamily="34" charset="0"/>
+              <a:buChar char="•"/>
+              <a:defRPr sz="2000" kern="1200">
+                <a:solidFill>
+                  <a:schemeClr val="tx1"/>
+                </a:solidFill>
+                <a:latin typeface="+mn-lt"/>
+                <a:ea typeface="+mn-ea"/>
+                <a:cs typeface="+mn-cs"/>
+              </a:defRPr>
+            </a:lvl6pPr>
+            <a:lvl7pPr marL="2971800" indent="-228600" algn="l" defTabSz="914400" rtl="0" eaLnBrk="1" latinLnBrk="0" hangingPunct="1">
+              <a:spcBef>
+                <a:spcPct val="20000"/>
+              </a:spcBef>
+              <a:buFont typeface="Arial" pitchFamily="34" charset="0"/>
+              <a:buChar char="•"/>
+              <a:defRPr sz="2000" kern="1200">
+                <a:solidFill>
+                  <a:schemeClr val="tx1"/>
+                </a:solidFill>
+                <a:latin typeface="+mn-lt"/>
+                <a:ea typeface="+mn-ea"/>
+                <a:cs typeface="+mn-cs"/>
+              </a:defRPr>
+            </a:lvl7pPr>
+            <a:lvl8pPr marL="3429000" indent="-228600" algn="l" defTabSz="914400" rtl="0" eaLnBrk="1" latinLnBrk="0" hangingPunct="1">
+              <a:spcBef>
+                <a:spcPct val="20000"/>
+              </a:spcBef>
+              <a:buFont typeface="Arial" pitchFamily="34" charset="0"/>
+              <a:buChar char="•"/>
+              <a:defRPr sz="2000" kern="1200">
+                <a:solidFill>
+                  <a:schemeClr val="tx1"/>
+                </a:solidFill>
+                <a:latin typeface="+mn-lt"/>
+                <a:ea typeface="+mn-ea"/>
+                <a:cs typeface="+mn-cs"/>
+              </a:defRPr>
+            </a:lvl8pPr>
+            <a:lvl9pPr marL="3886200" indent="-228600" algn="l" defTabSz="914400" rtl="0" eaLnBrk="1" latinLnBrk="0" hangingPunct="1">
+              <a:spcBef>
+                <a:spcPct val="20000"/>
+              </a:spcBef>
+              <a:buFont typeface="Arial" pitchFamily="34" charset="0"/>
+              <a:buChar char="•"/>
+              <a:defRPr sz="2000" kern="1200">
+                <a:solidFill>
+                  <a:schemeClr val="tx1"/>
+                </a:solidFill>
+                <a:latin typeface="+mn-lt"/>
+                <a:ea typeface="+mn-ea"/>
+                <a:cs typeface="+mn-cs"/>
+              </a:defRPr>
+            </a:lvl9pPr>
+          </a:lstStyle>
+          <a:p>
+            <a:pPr marL="0" lvl="1" indent="0">
+              <a:spcBef>
+                <a:spcPts val="1200"/>
+              </a:spcBef>
+              <a:buClrTx/>
+              <a:buNone/>
+            </a:pPr>
+            <a:endParaRPr lang="en-GB" dirty="0">
+              <a:latin typeface="Avenir 45 Book (Body)"/>
+            </a:endParaRPr>
+          </a:p>
+          <a:p>
+            <a:pPr marL="0" lvl="1" indent="0">
+              <a:spcBef>
+                <a:spcPts val="1200"/>
+              </a:spcBef>
+              <a:buClrTx/>
+              <a:buNone/>
+            </a:pPr>
+            <a:endParaRPr lang="es-AR" sz="1600" b="1" dirty="0">
+              <a:solidFill>
+                <a:srgbClr val="000000"/>
+              </a:solidFill>
+              <a:latin typeface="Avenir 45 Book (Body)"/>
+              <a:cs typeface="+mn-cs"/>
+            </a:endParaRPr>
+          </a:p>
+        </p:txBody>
+      </p:sp>
+      <p:pic>
+        <p:nvPicPr>
+          <p:cNvPr id="2" name="Picture 1"/>
+          <p:cNvPicPr>
+            <a:picLocks noChangeAspect="1"/>
+          </p:cNvPicPr>
+          <p:nvPr/>
+        </p:nvPicPr>
+        <p:blipFill>
+          <a:blip r:embed="rId2">
+            <a:extLst>
+              <a:ext uri="{28A0092B-C50C-407E-A947-70E740481C1C}">
+                <a14:useLocalDpi xmlns:a14="http://schemas.microsoft.com/office/drawing/2010/main" val="0"/>
+              </a:ext>
+            </a:extLst>
+          </a:blip>
+          <a:stretch>
+            <a:fillRect/>
+          </a:stretch>
+        </p:blipFill>
+        <p:spPr>
+          <a:xfrm>
+            <a:off x="3675389" y="1322164"/>
+            <a:ext cx="4661777" cy="4661777"/>
+          </a:xfrm>
+          <a:prstGeom prst="rect">
+            <a:avLst/>
+          </a:prstGeom>
+          <a:ln>
+            <a:noFill/>
+          </a:ln>
+          <a:effectLst>
+            <a:outerShdw blurRad="292100" dist="139700" dir="2700000" algn="tl" rotWithShape="0">
+              <a:srgbClr val="333333">
+                <a:alpha val="65000"/>
+              </a:srgbClr>
+            </a:outerShdw>
+          </a:effectLst>
+        </p:spPr>
+      </p:pic>
+    </p:spTree>
+    <p:extLst>
+      <p:ext uri="{BB962C8B-B14F-4D97-AF65-F5344CB8AC3E}">
+        <p14:creationId xmlns:p14="http://schemas.microsoft.com/office/powerpoint/2010/main" val="76703024"/>
+      </p:ext>
+    </p:extLst>
+  </p:cSld>
+  <p:clrMapOvr>
+    <a:masterClrMapping/>
+  </p:clrMapOvr>
+  <p:transition spd="slow">
+    <p:wipe/>
+  </p:transition>
+  <p:timing>
+    <p:tnLst>
+      <p:par>
+        <p:cTn id="1" dur="indefinite" restart="never" nodeType="tmRoot"/>
+      </p:par>
+    </p:tnLst>
+  </p:timing>
+</p:sld>
+</file>
+
+<file path=ppt/slides/slide21.xml><?xml version="1.0" encoding="utf-8"?>
+<p:sld xmlns:a="http://schemas.openxmlformats.org/drawingml/2006/main" xmlns:r="http://schemas.openxmlformats.org/officeDocument/2006/relationships" xmlns:p="http://schemas.openxmlformats.org/presentationml/2006/main">
+  <p:cSld>
+    <p:spTree>
+      <p:nvGrpSpPr>
+        <p:cNvPr id="1" name=""/>
+        <p:cNvGrpSpPr/>
+        <p:nvPr/>
+      </p:nvGrpSpPr>
+      <p:grpSpPr>
+        <a:xfrm>
+          <a:off x="0" y="0"/>
+          <a:ext cx="0" cy="0"/>
+          <a:chOff x="0" y="0"/>
+          <a:chExt cx="0" cy="0"/>
+        </a:xfrm>
+      </p:grpSpPr>
+      <p:sp>
+        <p:nvSpPr>
           <p:cNvPr id="4" name="Title 3"/>
           <p:cNvSpPr>
             <a:spLocks noGrp="1"/>
@@ -22354,7 +22891,7 @@
 </p:sld>
 </file>
 
-<file path=ppt/slides/slide21.xml><?xml version="1.0" encoding="utf-8"?>
+<file path=ppt/slides/slide22.xml><?xml version="1.0" encoding="utf-8"?>
 <p:sld xmlns:a="http://schemas.openxmlformats.org/drawingml/2006/main" xmlns:r="http://schemas.openxmlformats.org/officeDocument/2006/relationships" xmlns:p="http://schemas.openxmlformats.org/presentationml/2006/main">
   <p:cSld>
     <p:spTree>
@@ -22793,13 +23330,7 @@
               <a:rPr lang="en-GB" smtClean="0">
                 <a:latin typeface="Avenir 45 Book (Body)"/>
               </a:rPr>
-              <a:t>the </a:t>
-            </a:r>
-            <a:r>
-              <a:rPr lang="en-GB" smtClean="0">
-                <a:latin typeface="Avenir 45 Book (Body)"/>
-              </a:rPr>
-              <a:t>concepts </a:t>
+              <a:t>the concepts </a:t>
             </a:r>
             <a:r>
               <a:rPr lang="en-GB" dirty="0" smtClean="0">
@@ -22821,69 +23352,6 @@
     <p:extLst>
       <p:ext uri="{BB962C8B-B14F-4D97-AF65-F5344CB8AC3E}">
         <p14:creationId xmlns:p14="http://schemas.microsoft.com/office/powerpoint/2010/main" val="4101275204"/>
-      </p:ext>
-    </p:extLst>
-  </p:cSld>
-  <p:clrMapOvr>
-    <a:masterClrMapping/>
-  </p:clrMapOvr>
-  <p:transition spd="slow">
-    <p:wipe/>
-  </p:transition>
-  <p:timing>
-    <p:tnLst>
-      <p:par>
-        <p:cTn id="1" dur="indefinite" restart="never" nodeType="tmRoot"/>
-      </p:par>
-    </p:tnLst>
-  </p:timing>
-</p:sld>
-</file>
-
-<file path=ppt/slides/slide22.xml><?xml version="1.0" encoding="utf-8"?>
-<p:sld xmlns:a="http://schemas.openxmlformats.org/drawingml/2006/main" xmlns:r="http://schemas.openxmlformats.org/officeDocument/2006/relationships" xmlns:p="http://schemas.openxmlformats.org/presentationml/2006/main">
-  <p:cSld>
-    <p:spTree>
-      <p:nvGrpSpPr>
-        <p:cNvPr id="1" name=""/>
-        <p:cNvGrpSpPr/>
-        <p:nvPr/>
-      </p:nvGrpSpPr>
-      <p:grpSpPr>
-        <a:xfrm>
-          <a:off x="0" y="0"/>
-          <a:ext cx="0" cy="0"/>
-          <a:chOff x="0" y="0"/>
-          <a:chExt cx="0" cy="0"/>
-        </a:xfrm>
-      </p:grpSpPr>
-      <p:sp>
-        <p:nvSpPr>
-          <p:cNvPr id="4" name="Title 3"/>
-          <p:cNvSpPr>
-            <a:spLocks noGrp="1"/>
-          </p:cNvSpPr>
-          <p:nvPr>
-            <p:ph type="ctrTitle"/>
-          </p:nvPr>
-        </p:nvSpPr>
-        <p:spPr/>
-        <p:txBody>
-          <a:bodyPr/>
-          <a:lstStyle/>
-          <a:p>
-            <a:r>
-              <a:rPr lang="es-AR" dirty="0" err="1" smtClean="0"/>
-              <a:t>Summary</a:t>
-            </a:r>
-            <a:endParaRPr lang="es-AR" dirty="0"/>
-          </a:p>
-        </p:txBody>
-      </p:sp>
-    </p:spTree>
-    <p:extLst>
-      <p:ext uri="{BB962C8B-B14F-4D97-AF65-F5344CB8AC3E}">
-        <p14:creationId xmlns:p14="http://schemas.microsoft.com/office/powerpoint/2010/main" val="689075145"/>
       </p:ext>
     </p:extLst>
   </p:cSld>
@@ -22922,573 +23390,31 @@
       </p:grpSpPr>
       <p:sp>
         <p:nvSpPr>
-          <p:cNvPr id="15" name="Rectangle 14"/>
-          <p:cNvSpPr/>
-          <p:nvPr/>
+          <p:cNvPr id="4" name="Title 3"/>
+          <p:cNvSpPr>
+            <a:spLocks noGrp="1"/>
+          </p:cNvSpPr>
+          <p:nvPr>
+            <p:ph type="ctrTitle"/>
+          </p:nvPr>
         </p:nvSpPr>
-        <p:spPr>
-          <a:xfrm>
-            <a:off x="-13252" y="1"/>
-            <a:ext cx="12218504" cy="1016000"/>
-          </a:xfrm>
-          <a:prstGeom prst="rect">
-            <a:avLst/>
-          </a:prstGeom>
-          <a:solidFill>
-            <a:srgbClr val="FF9600"/>
-          </a:solidFill>
-          <a:ln>
-            <a:noFill/>
-          </a:ln>
-        </p:spPr>
-        <p:style>
-          <a:lnRef idx="1">
-            <a:schemeClr val="accent6"/>
-          </a:lnRef>
-          <a:fillRef idx="3">
-            <a:schemeClr val="accent6"/>
-          </a:fillRef>
-          <a:effectRef idx="2">
-            <a:schemeClr val="accent6"/>
-          </a:effectRef>
-          <a:fontRef idx="minor">
-            <a:schemeClr val="lt1"/>
-          </a:fontRef>
-        </p:style>
+        <p:spPr/>
         <p:txBody>
-          <a:bodyPr anchor="ctr"/>
+          <a:bodyPr/>
           <a:lstStyle/>
           <a:p>
-            <a:pPr marL="0" marR="0" lvl="0" indent="0" algn="ctr" defTabSz="914400" eaLnBrk="1" fontAlgn="auto" latinLnBrk="0" hangingPunct="1">
-              <a:lnSpc>
-                <a:spcPct val="100000"/>
-              </a:lnSpc>
-              <a:spcBef>
-                <a:spcPts val="0"/>
-              </a:spcBef>
-              <a:spcAft>
-                <a:spcPts val="0"/>
-              </a:spcAft>
-              <a:buClrTx/>
-              <a:buSzTx/>
-              <a:buFontTx/>
-              <a:buNone/>
-              <a:tabLst/>
-              <a:defRPr/>
-            </a:pPr>
-            <a:r>
-              <a:rPr kumimoji="0" lang="es-ES_tradnl" sz="1800" b="0" i="0" u="none" strike="noStrike" kern="0" cap="none" spc="0" normalizeH="0" baseline="0" noProof="0" dirty="0" smtClean="0">
-                <a:ln>
-                  <a:noFill/>
-                </a:ln>
-                <a:solidFill>
-                  <a:srgbClr val="FFFFFF"/>
-                </a:solidFill>
-                <a:effectLst/>
-                <a:uLnTx/>
-                <a:uFillTx/>
-                <a:latin typeface="Arial"/>
-                <a:ea typeface="ＭＳ Ｐゴシック" pitchFamily="-108" charset="-128"/>
-                <a:cs typeface="+mn-cs"/>
-              </a:rPr>
-              <a:t>  </a:t>
-            </a:r>
-            <a:endParaRPr kumimoji="0" lang="es-ES_tradnl" sz="1800" b="0" i="0" u="none" strike="noStrike" kern="0" cap="none" spc="0" normalizeH="0" baseline="0" noProof="0" dirty="0">
-              <a:ln>
-                <a:noFill/>
-              </a:ln>
-              <a:solidFill>
-                <a:srgbClr val="FFFFFF"/>
-              </a:solidFill>
-              <a:effectLst/>
-              <a:uLnTx/>
-              <a:uFillTx/>
-              <a:latin typeface="Arial"/>
-              <a:ea typeface="ＭＳ Ｐゴシック" pitchFamily="-108" charset="-128"/>
-              <a:cs typeface="+mn-cs"/>
-            </a:endParaRPr>
-          </a:p>
-        </p:txBody>
-      </p:sp>
-      <p:sp>
-        <p:nvSpPr>
-          <p:cNvPr id="16" name="TextBox 15"/>
-          <p:cNvSpPr txBox="1"/>
-          <p:nvPr/>
-        </p:nvSpPr>
-        <p:spPr>
-          <a:xfrm>
-            <a:off x="515936" y="212035"/>
-            <a:ext cx="11676063" cy="553998"/>
-          </a:xfrm>
-          <a:prstGeom prst="rect">
-            <a:avLst/>
-          </a:prstGeom>
-          <a:noFill/>
-        </p:spPr>
-        <p:txBody>
-          <a:bodyPr wrap="square" lIns="0" tIns="0" rIns="0" bIns="0" rtlCol="0">
-            <a:spAutoFit/>
-          </a:bodyPr>
-          <a:lstStyle/>
-          <a:p>
-            <a:r>
-              <a:rPr lang="en-US" sz="3600" dirty="0" smtClean="0">
-                <a:solidFill>
-                  <a:schemeClr val="bg1"/>
-                </a:solidFill>
-              </a:rPr>
+            <a:r>
+              <a:rPr lang="es-AR" dirty="0" err="1" smtClean="0"/>
               <a:t>Summary</a:t>
             </a:r>
-            <a:endParaRPr lang="es-AR" sz="3600" dirty="0">
-              <a:solidFill>
-                <a:schemeClr val="bg1"/>
-              </a:solidFill>
-            </a:endParaRPr>
-          </a:p>
-        </p:txBody>
-      </p:sp>
-      <p:sp>
-        <p:nvSpPr>
-          <p:cNvPr id="6" name="Content Placeholder 2"/>
-          <p:cNvSpPr txBox="1">
-            <a:spLocks/>
-          </p:cNvSpPr>
-          <p:nvPr/>
-        </p:nvSpPr>
-        <p:spPr>
-          <a:xfrm>
-            <a:off x="476534" y="1312325"/>
-            <a:ext cx="10987585" cy="4329621"/>
-          </a:xfrm>
-          <a:prstGeom prst="rect">
-            <a:avLst/>
-          </a:prstGeom>
-        </p:spPr>
-        <p:txBody>
-          <a:bodyPr vert="horz" lIns="91440" tIns="45720" rIns="91440" bIns="45720" rtlCol="0">
-            <a:noAutofit/>
-          </a:bodyPr>
-          <a:lstStyle>
-            <a:lvl1pPr marL="273050" marR="0" indent="-273050" algn="l" defTabSz="914400" rtl="0" eaLnBrk="1" fontAlgn="auto" latinLnBrk="0" hangingPunct="1">
-              <a:lnSpc>
-                <a:spcPct val="100000"/>
-              </a:lnSpc>
-              <a:spcBef>
-                <a:spcPts val="1200"/>
-              </a:spcBef>
-              <a:spcAft>
-                <a:spcPts val="0"/>
-              </a:spcAft>
-              <a:buClr>
-                <a:srgbClr val="DA1218"/>
-              </a:buClr>
-              <a:buSzTx/>
-              <a:buFont typeface="Wingdings" pitchFamily="2" charset="2"/>
-              <a:buChar char="§"/>
-              <a:tabLst/>
-              <a:defRPr lang="en-US" sz="2400" kern="1200">
-                <a:solidFill>
-                  <a:schemeClr val="tx1"/>
-                </a:solidFill>
-                <a:latin typeface="Arial" pitchFamily="34" charset="0"/>
-                <a:ea typeface="+mn-ea"/>
-                <a:cs typeface="Arial" pitchFamily="34" charset="0"/>
-              </a:defRPr>
-            </a:lvl1pPr>
-            <a:lvl2pPr marL="628650" marR="0" indent="-355600" algn="l" defTabSz="914400" rtl="0" eaLnBrk="1" fontAlgn="auto" latinLnBrk="0" hangingPunct="1">
-              <a:lnSpc>
-                <a:spcPct val="100000"/>
-              </a:lnSpc>
-              <a:spcBef>
-                <a:spcPct val="20000"/>
-              </a:spcBef>
-              <a:spcAft>
-                <a:spcPts val="0"/>
-              </a:spcAft>
-              <a:buClr>
-                <a:srgbClr val="DA1218"/>
-              </a:buClr>
-              <a:buSzTx/>
-              <a:buFont typeface="Wingdings" pitchFamily="2" charset="2"/>
-              <a:buChar char=""/>
-              <a:tabLst/>
-              <a:defRPr lang="en-US" sz="2000" kern="1200">
-                <a:solidFill>
-                  <a:schemeClr val="tx1"/>
-                </a:solidFill>
-                <a:latin typeface="Arial" pitchFamily="34" charset="0"/>
-                <a:ea typeface="+mn-ea"/>
-                <a:cs typeface="Arial" pitchFamily="34" charset="0"/>
-              </a:defRPr>
-            </a:lvl2pPr>
-            <a:lvl3pPr marL="903288" marR="0" indent="-274638" algn="l" defTabSz="914400" rtl="0" eaLnBrk="1" fontAlgn="auto" latinLnBrk="0" hangingPunct="1">
-              <a:lnSpc>
-                <a:spcPct val="100000"/>
-              </a:lnSpc>
-              <a:spcBef>
-                <a:spcPct val="20000"/>
-              </a:spcBef>
-              <a:spcAft>
-                <a:spcPts val="0"/>
-              </a:spcAft>
-              <a:buClr>
-                <a:srgbClr val="DA1218"/>
-              </a:buClr>
-              <a:buSzTx/>
-              <a:buFont typeface="Wingdings" pitchFamily="2" charset="2"/>
-              <a:buChar char="ü"/>
-              <a:tabLst/>
-              <a:defRPr lang="en-US" sz="1800" kern="1200">
-                <a:solidFill>
-                  <a:schemeClr val="tx1"/>
-                </a:solidFill>
-                <a:latin typeface="Arial" pitchFamily="34" charset="0"/>
-                <a:ea typeface="+mn-ea"/>
-                <a:cs typeface="Arial" pitchFamily="34" charset="0"/>
-              </a:defRPr>
-            </a:lvl3pPr>
-            <a:lvl4pPr marL="1081088" marR="0" indent="-177800" algn="l" defTabSz="914400" rtl="0" eaLnBrk="1" fontAlgn="auto" latinLnBrk="0" hangingPunct="1">
-              <a:lnSpc>
-                <a:spcPct val="100000"/>
-              </a:lnSpc>
-              <a:spcBef>
-                <a:spcPct val="20000"/>
-              </a:spcBef>
-              <a:spcAft>
-                <a:spcPts val="0"/>
-              </a:spcAft>
-              <a:buClr>
-                <a:srgbClr val="DA1218"/>
-              </a:buClr>
-              <a:buSzTx/>
-              <a:buFont typeface="Arial" pitchFamily="34" charset="0"/>
-              <a:buChar char="•"/>
-              <a:tabLst/>
-              <a:defRPr lang="en-US" sz="1600" kern="1200">
-                <a:solidFill>
-                  <a:schemeClr val="tx1"/>
-                </a:solidFill>
-                <a:latin typeface="Arial" pitchFamily="34" charset="0"/>
-                <a:ea typeface="+mn-ea"/>
-                <a:cs typeface="Arial" pitchFamily="34" charset="0"/>
-              </a:defRPr>
-            </a:lvl4pPr>
-            <a:lvl5pPr marL="1258888" marR="0" indent="-177800" algn="l" defTabSz="914400" rtl="0" eaLnBrk="1" fontAlgn="auto" latinLnBrk="0" hangingPunct="1">
-              <a:lnSpc>
-                <a:spcPct val="100000"/>
-              </a:lnSpc>
-              <a:spcBef>
-                <a:spcPct val="20000"/>
-              </a:spcBef>
-              <a:spcAft>
-                <a:spcPts val="0"/>
-              </a:spcAft>
-              <a:buClr>
-                <a:srgbClr val="DA1218"/>
-              </a:buClr>
-              <a:buSzPct val="100000"/>
-              <a:buFont typeface="Courier New" pitchFamily="49" charset="0"/>
-              <a:buChar char="o"/>
-              <a:tabLst/>
-              <a:defRPr lang="es-AR" sz="1400" kern="1200">
-                <a:solidFill>
-                  <a:schemeClr val="tx1"/>
-                </a:solidFill>
-                <a:latin typeface="Arial" pitchFamily="34" charset="0"/>
-                <a:ea typeface="+mn-ea"/>
-                <a:cs typeface="Arial" pitchFamily="34" charset="0"/>
-              </a:defRPr>
-            </a:lvl5pPr>
-            <a:lvl6pPr marL="2514600" indent="-228600" algn="l" defTabSz="914400" rtl="0" eaLnBrk="1" latinLnBrk="0" hangingPunct="1">
-              <a:spcBef>
-                <a:spcPct val="20000"/>
-              </a:spcBef>
-              <a:buFont typeface="Arial" pitchFamily="34" charset="0"/>
-              <a:buChar char="•"/>
-              <a:defRPr sz="2000" kern="1200">
-                <a:solidFill>
-                  <a:schemeClr val="tx1"/>
-                </a:solidFill>
-                <a:latin typeface="+mn-lt"/>
-                <a:ea typeface="+mn-ea"/>
-                <a:cs typeface="+mn-cs"/>
-              </a:defRPr>
-            </a:lvl6pPr>
-            <a:lvl7pPr marL="2971800" indent="-228600" algn="l" defTabSz="914400" rtl="0" eaLnBrk="1" latinLnBrk="0" hangingPunct="1">
-              <a:spcBef>
-                <a:spcPct val="20000"/>
-              </a:spcBef>
-              <a:buFont typeface="Arial" pitchFamily="34" charset="0"/>
-              <a:buChar char="•"/>
-              <a:defRPr sz="2000" kern="1200">
-                <a:solidFill>
-                  <a:schemeClr val="tx1"/>
-                </a:solidFill>
-                <a:latin typeface="+mn-lt"/>
-                <a:ea typeface="+mn-ea"/>
-                <a:cs typeface="+mn-cs"/>
-              </a:defRPr>
-            </a:lvl7pPr>
-            <a:lvl8pPr marL="3429000" indent="-228600" algn="l" defTabSz="914400" rtl="0" eaLnBrk="1" latinLnBrk="0" hangingPunct="1">
-              <a:spcBef>
-                <a:spcPct val="20000"/>
-              </a:spcBef>
-              <a:buFont typeface="Arial" pitchFamily="34" charset="0"/>
-              <a:buChar char="•"/>
-              <a:defRPr sz="2000" kern="1200">
-                <a:solidFill>
-                  <a:schemeClr val="tx1"/>
-                </a:solidFill>
-                <a:latin typeface="+mn-lt"/>
-                <a:ea typeface="+mn-ea"/>
-                <a:cs typeface="+mn-cs"/>
-              </a:defRPr>
-            </a:lvl8pPr>
-            <a:lvl9pPr marL="3886200" indent="-228600" algn="l" defTabSz="914400" rtl="0" eaLnBrk="1" latinLnBrk="0" hangingPunct="1">
-              <a:spcBef>
-                <a:spcPct val="20000"/>
-              </a:spcBef>
-              <a:buFont typeface="Arial" pitchFamily="34" charset="0"/>
-              <a:buChar char="•"/>
-              <a:defRPr sz="2000" kern="1200">
-                <a:solidFill>
-                  <a:schemeClr val="tx1"/>
-                </a:solidFill>
-                <a:latin typeface="+mn-lt"/>
-                <a:ea typeface="+mn-ea"/>
-                <a:cs typeface="+mn-cs"/>
-              </a:defRPr>
-            </a:lvl9pPr>
-          </a:lstStyle>
-          <a:p>
-            <a:pPr marL="0" lvl="1" indent="0">
-              <a:spcBef>
-                <a:spcPts val="1200"/>
-              </a:spcBef>
-              <a:buClrTx/>
-              <a:buNone/>
-            </a:pPr>
-            <a:r>
-              <a:rPr lang="en-GB" dirty="0" smtClean="0">
-                <a:latin typeface="Avenir 45 Book (Body)"/>
-              </a:rPr>
-              <a:t>These practices:</a:t>
-            </a:r>
-          </a:p>
-          <a:p>
-            <a:pPr marL="0" lvl="1" indent="0">
-              <a:spcBef>
-                <a:spcPts val="1200"/>
-              </a:spcBef>
-              <a:buClrTx/>
-              <a:buFont typeface="Wingdings" panose="05000000000000000000" pitchFamily="2" charset="2"/>
-              <a:buChar char="§"/>
-            </a:pPr>
-            <a:endParaRPr lang="en-GB" dirty="0" smtClean="0">
-              <a:latin typeface="Avenir 45 Book (Body)"/>
-            </a:endParaRPr>
-          </a:p>
-          <a:p>
-            <a:pPr marL="0" lvl="1" indent="0">
-              <a:spcBef>
-                <a:spcPts val="1200"/>
-              </a:spcBef>
-              <a:buClrTx/>
-              <a:buFont typeface="Wingdings" panose="05000000000000000000" pitchFamily="2" charset="2"/>
-              <a:buChar char="§"/>
-            </a:pPr>
-            <a:r>
-              <a:rPr lang="en-GB" dirty="0" smtClean="0">
-                <a:latin typeface="Avenir 45 Book (Body)"/>
-              </a:rPr>
-              <a:t> Make your code more maintainable</a:t>
-            </a:r>
-            <a:endParaRPr lang="en-GB" dirty="0">
-              <a:latin typeface="Avenir 45 Book (Body)"/>
-            </a:endParaRPr>
-          </a:p>
-          <a:p>
-            <a:pPr marL="0" lvl="1" indent="0">
-              <a:spcBef>
-                <a:spcPts val="1200"/>
-              </a:spcBef>
-              <a:buClrTx/>
-              <a:buFont typeface="Wingdings" panose="05000000000000000000" pitchFamily="2" charset="2"/>
-              <a:buChar char="§"/>
-            </a:pPr>
-            <a:r>
-              <a:rPr lang="en-GB" dirty="0">
-                <a:latin typeface="Avenir 45 Book (Body)"/>
-              </a:rPr>
-              <a:t> </a:t>
-            </a:r>
-            <a:r>
-              <a:rPr lang="en-GB" dirty="0" smtClean="0">
-                <a:latin typeface="Avenir 45 Book (Body)"/>
-              </a:rPr>
-              <a:t>Minimize the number of errors in the final product</a:t>
-            </a:r>
-          </a:p>
-          <a:p>
-            <a:pPr marL="0" lvl="1" indent="0">
-              <a:spcBef>
-                <a:spcPts val="1200"/>
-              </a:spcBef>
-              <a:buClrTx/>
-              <a:buFont typeface="Wingdings" panose="05000000000000000000" pitchFamily="2" charset="2"/>
-              <a:buChar char="§"/>
-            </a:pPr>
-            <a:r>
-              <a:rPr lang="en-GB" dirty="0" smtClean="0">
-                <a:latin typeface="Avenir 45 Book (Body)"/>
-              </a:rPr>
-              <a:t> Allow early detection of errors in the development environment</a:t>
-            </a:r>
-          </a:p>
-          <a:p>
-            <a:pPr marL="0" lvl="1" indent="0">
-              <a:spcBef>
-                <a:spcPts val="1200"/>
-              </a:spcBef>
-              <a:buClrTx/>
-              <a:buFont typeface="Wingdings" panose="05000000000000000000" pitchFamily="2" charset="2"/>
-              <a:buChar char="§"/>
-            </a:pPr>
-            <a:r>
-              <a:rPr lang="en-GB" dirty="0">
-                <a:latin typeface="Avenir 45 Book (Body)"/>
-              </a:rPr>
-              <a:t> </a:t>
-            </a:r>
-            <a:r>
-              <a:rPr lang="en-GB" dirty="0" smtClean="0">
-                <a:latin typeface="Avenir 45 Book (Body)"/>
-              </a:rPr>
-              <a:t>Reduce development and maintenance time over the project’s lifecycle</a:t>
-            </a:r>
-          </a:p>
-          <a:p>
-            <a:pPr marL="0" lvl="1" indent="0">
-              <a:spcBef>
-                <a:spcPts val="1200"/>
-              </a:spcBef>
-              <a:buClrTx/>
-              <a:buFont typeface="Wingdings" panose="05000000000000000000" pitchFamily="2" charset="2"/>
-              <a:buChar char="§"/>
-            </a:pPr>
-            <a:r>
-              <a:rPr lang="en-GB" dirty="0" smtClean="0">
-                <a:latin typeface="Avenir 45 Book (Body)"/>
-              </a:rPr>
-              <a:t> Improve the development team’s internal organization</a:t>
-            </a:r>
-          </a:p>
-          <a:p>
-            <a:pPr marL="0" lvl="1" indent="0">
-              <a:spcBef>
-                <a:spcPts val="1200"/>
-              </a:spcBef>
-              <a:buClrTx/>
-              <a:buFont typeface="Wingdings" panose="05000000000000000000" pitchFamily="2" charset="2"/>
-              <a:buChar char="§"/>
-            </a:pPr>
-            <a:r>
-              <a:rPr lang="en-GB" dirty="0">
-                <a:latin typeface="Avenir 45 Book (Body)"/>
-              </a:rPr>
-              <a:t> </a:t>
-            </a:r>
-            <a:r>
-              <a:rPr lang="en-GB" dirty="0" smtClean="0">
-                <a:latin typeface="Avenir 45 Book (Body)"/>
-              </a:rPr>
-              <a:t>Maintain a current build always available for testing, demos or deployment</a:t>
-            </a:r>
-          </a:p>
-          <a:p>
-            <a:pPr marL="0" lvl="1" indent="0">
-              <a:spcBef>
-                <a:spcPts val="1200"/>
-              </a:spcBef>
-              <a:buClrTx/>
-              <a:buFont typeface="Wingdings" panose="05000000000000000000" pitchFamily="2" charset="2"/>
-              <a:buChar char="§"/>
-            </a:pPr>
-            <a:r>
-              <a:rPr lang="en-GB" dirty="0" smtClean="0">
-                <a:latin typeface="Avenir 45 Book (Body)"/>
-              </a:rPr>
-              <a:t> Allow you to generate metrics of code quality, test coverage, etc.</a:t>
-            </a:r>
-          </a:p>
-          <a:p>
-            <a:pPr marL="0" lvl="1" indent="0">
-              <a:spcBef>
-                <a:spcPts val="1200"/>
-              </a:spcBef>
-              <a:buClrTx/>
-              <a:buFont typeface="Wingdings" panose="05000000000000000000" pitchFamily="2" charset="2"/>
-              <a:buChar char="§"/>
-            </a:pPr>
-            <a:r>
-              <a:rPr lang="en-GB" b="1" dirty="0" smtClean="0">
-                <a:latin typeface="Avenir 45 Book (Body)"/>
-              </a:rPr>
-              <a:t> Improve the quality of the final product</a:t>
-            </a:r>
-            <a:endParaRPr lang="en-GB" b="1" dirty="0">
-              <a:latin typeface="Avenir 45 Book (Body)"/>
-            </a:endParaRPr>
-          </a:p>
-          <a:p>
-            <a:pPr marL="0" lvl="1" indent="0">
-              <a:spcBef>
-                <a:spcPts val="1200"/>
-              </a:spcBef>
-              <a:buClrTx/>
-              <a:buFont typeface="Wingdings" panose="05000000000000000000" pitchFamily="2" charset="2"/>
-              <a:buChar char="§"/>
-            </a:pPr>
-            <a:endParaRPr lang="en-GB" dirty="0">
-              <a:latin typeface="Avenir 45 Book (Body)"/>
-            </a:endParaRPr>
-          </a:p>
-          <a:p>
-            <a:pPr lvl="0" defTabSz="914363">
-              <a:lnSpc>
-                <a:spcPct val="90000"/>
-              </a:lnSpc>
-              <a:spcBef>
-                <a:spcPts val="0"/>
-              </a:spcBef>
-              <a:spcAft>
-                <a:spcPts val="400"/>
-              </a:spcAft>
-              <a:buClr>
-                <a:schemeClr val="tx1">
-                  <a:lumMod val="75000"/>
-                  <a:lumOff val="25000"/>
-                </a:schemeClr>
-              </a:buClr>
-              <a:buSzPct val="100000"/>
-              <a:buFont typeface="Wingdings" panose="05000000000000000000" pitchFamily="2" charset="2"/>
-              <a:buChar char="ä"/>
-            </a:pPr>
-            <a:endParaRPr lang="es-AR" sz="1600" b="1" dirty="0">
-              <a:solidFill>
-                <a:srgbClr val="000000"/>
-              </a:solidFill>
-              <a:latin typeface="Avenir 45 Book (Body)"/>
-              <a:cs typeface="+mn-cs"/>
-            </a:endParaRPr>
+            <a:endParaRPr lang="es-AR" dirty="0"/>
           </a:p>
         </p:txBody>
       </p:sp>
     </p:spTree>
     <p:extLst>
       <p:ext uri="{BB962C8B-B14F-4D97-AF65-F5344CB8AC3E}">
-        <p14:creationId xmlns:p14="http://schemas.microsoft.com/office/powerpoint/2010/main" val="3539865254"/>
+        <p14:creationId xmlns:p14="http://schemas.microsoft.com/office/powerpoint/2010/main" val="689075145"/>
       </p:ext>
     </p:extLst>
   </p:cSld>
@@ -23643,7 +23569,7 @@
                   <a:schemeClr val="bg1"/>
                 </a:solidFill>
               </a:rPr>
-              <a:t>Part II: Scenes of the next episode…</a:t>
+              <a:t>Summary</a:t>
             </a:r>
             <a:endParaRPr lang="es-AR" sz="3600" dirty="0">
               <a:solidFill>
@@ -23872,6 +23798,1087 @@
                 <a:spcPts val="1200"/>
               </a:spcBef>
               <a:buClrTx/>
+              <a:buNone/>
+            </a:pPr>
+            <a:r>
+              <a:rPr lang="en-GB" dirty="0" smtClean="0">
+                <a:latin typeface="Avenir 45 Book (Body)"/>
+              </a:rPr>
+              <a:t>These practices:</a:t>
+            </a:r>
+          </a:p>
+          <a:p>
+            <a:pPr marL="0" lvl="1" indent="0">
+              <a:spcBef>
+                <a:spcPts val="1200"/>
+              </a:spcBef>
+              <a:buClrTx/>
+              <a:buFont typeface="Wingdings" panose="05000000000000000000" pitchFamily="2" charset="2"/>
+              <a:buChar char="§"/>
+            </a:pPr>
+            <a:endParaRPr lang="en-GB" dirty="0" smtClean="0">
+              <a:latin typeface="Avenir 45 Book (Body)"/>
+            </a:endParaRPr>
+          </a:p>
+          <a:p>
+            <a:pPr marL="0" lvl="1" indent="0">
+              <a:spcBef>
+                <a:spcPts val="1200"/>
+              </a:spcBef>
+              <a:buClrTx/>
+              <a:buFont typeface="Wingdings" panose="05000000000000000000" pitchFamily="2" charset="2"/>
+              <a:buChar char="§"/>
+            </a:pPr>
+            <a:r>
+              <a:rPr lang="en-GB" dirty="0" smtClean="0">
+                <a:latin typeface="Avenir 45 Book (Body)"/>
+              </a:rPr>
+              <a:t> Make your code more maintainable</a:t>
+            </a:r>
+            <a:endParaRPr lang="en-GB" dirty="0">
+              <a:latin typeface="Avenir 45 Book (Body)"/>
+            </a:endParaRPr>
+          </a:p>
+          <a:p>
+            <a:pPr marL="0" lvl="1" indent="0">
+              <a:spcBef>
+                <a:spcPts val="1200"/>
+              </a:spcBef>
+              <a:buClrTx/>
+              <a:buFont typeface="Wingdings" panose="05000000000000000000" pitchFamily="2" charset="2"/>
+              <a:buChar char="§"/>
+            </a:pPr>
+            <a:r>
+              <a:rPr lang="en-GB" dirty="0">
+                <a:latin typeface="Avenir 45 Book (Body)"/>
+              </a:rPr>
+              <a:t> </a:t>
+            </a:r>
+            <a:r>
+              <a:rPr lang="en-GB" dirty="0" smtClean="0">
+                <a:latin typeface="Avenir 45 Book (Body)"/>
+              </a:rPr>
+              <a:t>Minimize the number of errors in the final product</a:t>
+            </a:r>
+          </a:p>
+          <a:p>
+            <a:pPr marL="0" lvl="1" indent="0">
+              <a:spcBef>
+                <a:spcPts val="1200"/>
+              </a:spcBef>
+              <a:buClrTx/>
+              <a:buFont typeface="Wingdings" panose="05000000000000000000" pitchFamily="2" charset="2"/>
+              <a:buChar char="§"/>
+            </a:pPr>
+            <a:r>
+              <a:rPr lang="en-GB" dirty="0" smtClean="0">
+                <a:latin typeface="Avenir 45 Book (Body)"/>
+              </a:rPr>
+              <a:t> Allow early detection of errors in the development environment</a:t>
+            </a:r>
+          </a:p>
+          <a:p>
+            <a:pPr marL="0" lvl="1" indent="0">
+              <a:spcBef>
+                <a:spcPts val="1200"/>
+              </a:spcBef>
+              <a:buClrTx/>
+              <a:buFont typeface="Wingdings" panose="05000000000000000000" pitchFamily="2" charset="2"/>
+              <a:buChar char="§"/>
+            </a:pPr>
+            <a:r>
+              <a:rPr lang="en-GB" dirty="0">
+                <a:latin typeface="Avenir 45 Book (Body)"/>
+              </a:rPr>
+              <a:t> </a:t>
+            </a:r>
+            <a:r>
+              <a:rPr lang="en-GB" dirty="0" smtClean="0">
+                <a:latin typeface="Avenir 45 Book (Body)"/>
+              </a:rPr>
+              <a:t>Reduce development and maintenance time over the project’s lifecycle</a:t>
+            </a:r>
+          </a:p>
+          <a:p>
+            <a:pPr marL="0" lvl="1" indent="0">
+              <a:spcBef>
+                <a:spcPts val="1200"/>
+              </a:spcBef>
+              <a:buClrTx/>
+              <a:buFont typeface="Wingdings" panose="05000000000000000000" pitchFamily="2" charset="2"/>
+              <a:buChar char="§"/>
+            </a:pPr>
+            <a:r>
+              <a:rPr lang="en-GB" b="1" dirty="0" smtClean="0">
+                <a:latin typeface="Avenir 45 Book (Body)"/>
+              </a:rPr>
+              <a:t> Improve </a:t>
+            </a:r>
+            <a:r>
+              <a:rPr lang="en-GB" b="1" dirty="0" smtClean="0">
+                <a:latin typeface="Avenir 45 Book (Body)"/>
+              </a:rPr>
+              <a:t>the quality of the final product</a:t>
+            </a:r>
+            <a:endParaRPr lang="en-GB" b="1" dirty="0">
+              <a:latin typeface="Avenir 45 Book (Body)"/>
+            </a:endParaRPr>
+          </a:p>
+          <a:p>
+            <a:pPr marL="0" lvl="1" indent="0">
+              <a:spcBef>
+                <a:spcPts val="1200"/>
+              </a:spcBef>
+              <a:buClrTx/>
+              <a:buFont typeface="Wingdings" panose="05000000000000000000" pitchFamily="2" charset="2"/>
+              <a:buChar char="§"/>
+            </a:pPr>
+            <a:endParaRPr lang="en-GB" dirty="0">
+              <a:latin typeface="Avenir 45 Book (Body)"/>
+            </a:endParaRPr>
+          </a:p>
+          <a:p>
+            <a:pPr lvl="0" defTabSz="914363">
+              <a:lnSpc>
+                <a:spcPct val="90000"/>
+              </a:lnSpc>
+              <a:spcBef>
+                <a:spcPts val="0"/>
+              </a:spcBef>
+              <a:spcAft>
+                <a:spcPts val="400"/>
+              </a:spcAft>
+              <a:buClr>
+                <a:schemeClr val="tx1">
+                  <a:lumMod val="75000"/>
+                  <a:lumOff val="25000"/>
+                </a:schemeClr>
+              </a:buClr>
+              <a:buSzPct val="100000"/>
+              <a:buFont typeface="Wingdings" panose="05000000000000000000" pitchFamily="2" charset="2"/>
+              <a:buChar char="ä"/>
+            </a:pPr>
+            <a:endParaRPr lang="es-AR" sz="1600" b="1" dirty="0">
+              <a:solidFill>
+                <a:srgbClr val="000000"/>
+              </a:solidFill>
+              <a:latin typeface="Avenir 45 Book (Body)"/>
+              <a:cs typeface="+mn-cs"/>
+            </a:endParaRPr>
+          </a:p>
+        </p:txBody>
+      </p:sp>
+    </p:spTree>
+    <p:extLst>
+      <p:ext uri="{BB962C8B-B14F-4D97-AF65-F5344CB8AC3E}">
+        <p14:creationId xmlns:p14="http://schemas.microsoft.com/office/powerpoint/2010/main" val="3539865254"/>
+      </p:ext>
+    </p:extLst>
+  </p:cSld>
+  <p:clrMapOvr>
+    <a:masterClrMapping/>
+  </p:clrMapOvr>
+  <p:transition spd="slow">
+    <p:wipe/>
+  </p:transition>
+  <p:timing>
+    <p:tnLst>
+      <p:par>
+        <p:cTn id="1" dur="indefinite" restart="never" nodeType="tmRoot"/>
+      </p:par>
+    </p:tnLst>
+  </p:timing>
+</p:sld>
+</file>
+
+<file path=ppt/slides/slide25.xml><?xml version="1.0" encoding="utf-8"?>
+<p:sld xmlns:a="http://schemas.openxmlformats.org/drawingml/2006/main" xmlns:r="http://schemas.openxmlformats.org/officeDocument/2006/relationships" xmlns:p="http://schemas.openxmlformats.org/presentationml/2006/main">
+  <p:cSld>
+    <p:spTree>
+      <p:nvGrpSpPr>
+        <p:cNvPr id="1" name=""/>
+        <p:cNvGrpSpPr/>
+        <p:nvPr/>
+      </p:nvGrpSpPr>
+      <p:grpSpPr>
+        <a:xfrm>
+          <a:off x="0" y="0"/>
+          <a:ext cx="0" cy="0"/>
+          <a:chOff x="0" y="0"/>
+          <a:chExt cx="0" cy="0"/>
+        </a:xfrm>
+      </p:grpSpPr>
+      <p:sp>
+        <p:nvSpPr>
+          <p:cNvPr id="15" name="Rectangle 14"/>
+          <p:cNvSpPr/>
+          <p:nvPr/>
+        </p:nvSpPr>
+        <p:spPr>
+          <a:xfrm>
+            <a:off x="-13252" y="1"/>
+            <a:ext cx="12218504" cy="1016000"/>
+          </a:xfrm>
+          <a:prstGeom prst="rect">
+            <a:avLst/>
+          </a:prstGeom>
+          <a:solidFill>
+            <a:srgbClr val="FF9600"/>
+          </a:solidFill>
+          <a:ln>
+            <a:noFill/>
+          </a:ln>
+        </p:spPr>
+        <p:style>
+          <a:lnRef idx="1">
+            <a:schemeClr val="accent6"/>
+          </a:lnRef>
+          <a:fillRef idx="3">
+            <a:schemeClr val="accent6"/>
+          </a:fillRef>
+          <a:effectRef idx="2">
+            <a:schemeClr val="accent6"/>
+          </a:effectRef>
+          <a:fontRef idx="minor">
+            <a:schemeClr val="lt1"/>
+          </a:fontRef>
+        </p:style>
+        <p:txBody>
+          <a:bodyPr anchor="ctr"/>
+          <a:lstStyle/>
+          <a:p>
+            <a:pPr marL="0" marR="0" lvl="0" indent="0" algn="ctr" defTabSz="914400" eaLnBrk="1" fontAlgn="auto" latinLnBrk="0" hangingPunct="1">
+              <a:lnSpc>
+                <a:spcPct val="100000"/>
+              </a:lnSpc>
+              <a:spcBef>
+                <a:spcPts val="0"/>
+              </a:spcBef>
+              <a:spcAft>
+                <a:spcPts val="0"/>
+              </a:spcAft>
+              <a:buClrTx/>
+              <a:buSzTx/>
+              <a:buFontTx/>
+              <a:buNone/>
+              <a:tabLst/>
+              <a:defRPr/>
+            </a:pPr>
+            <a:r>
+              <a:rPr kumimoji="0" lang="es-ES_tradnl" sz="1800" b="0" i="0" u="none" strike="noStrike" kern="0" cap="none" spc="0" normalizeH="0" baseline="0" noProof="0" dirty="0" smtClean="0">
+                <a:ln>
+                  <a:noFill/>
+                </a:ln>
+                <a:solidFill>
+                  <a:srgbClr val="FFFFFF"/>
+                </a:solidFill>
+                <a:effectLst/>
+                <a:uLnTx/>
+                <a:uFillTx/>
+                <a:latin typeface="Arial"/>
+                <a:ea typeface="ＭＳ Ｐゴシック" pitchFamily="-108" charset="-128"/>
+                <a:cs typeface="+mn-cs"/>
+              </a:rPr>
+              <a:t>  </a:t>
+            </a:r>
+            <a:endParaRPr kumimoji="0" lang="es-ES_tradnl" sz="1800" b="0" i="0" u="none" strike="noStrike" kern="0" cap="none" spc="0" normalizeH="0" baseline="0" noProof="0" dirty="0">
+              <a:ln>
+                <a:noFill/>
+              </a:ln>
+              <a:solidFill>
+                <a:srgbClr val="FFFFFF"/>
+              </a:solidFill>
+              <a:effectLst/>
+              <a:uLnTx/>
+              <a:uFillTx/>
+              <a:latin typeface="Arial"/>
+              <a:ea typeface="ＭＳ Ｐゴシック" pitchFamily="-108" charset="-128"/>
+              <a:cs typeface="+mn-cs"/>
+            </a:endParaRPr>
+          </a:p>
+        </p:txBody>
+      </p:sp>
+      <p:sp>
+        <p:nvSpPr>
+          <p:cNvPr id="16" name="TextBox 15"/>
+          <p:cNvSpPr txBox="1"/>
+          <p:nvPr/>
+        </p:nvSpPr>
+        <p:spPr>
+          <a:xfrm>
+            <a:off x="515936" y="212035"/>
+            <a:ext cx="11676063" cy="553998"/>
+          </a:xfrm>
+          <a:prstGeom prst="rect">
+            <a:avLst/>
+          </a:prstGeom>
+          <a:noFill/>
+        </p:spPr>
+        <p:txBody>
+          <a:bodyPr wrap="square" lIns="0" tIns="0" rIns="0" bIns="0" rtlCol="0">
+            <a:spAutoFit/>
+          </a:bodyPr>
+          <a:lstStyle/>
+          <a:p>
+            <a:r>
+              <a:rPr lang="en-US" sz="3600" dirty="0" smtClean="0">
+                <a:solidFill>
+                  <a:schemeClr val="bg1"/>
+                </a:solidFill>
+              </a:rPr>
+              <a:t>Summary</a:t>
+            </a:r>
+            <a:endParaRPr lang="es-AR" sz="3600" dirty="0">
+              <a:solidFill>
+                <a:schemeClr val="bg1"/>
+              </a:solidFill>
+            </a:endParaRPr>
+          </a:p>
+        </p:txBody>
+      </p:sp>
+      <p:sp>
+        <p:nvSpPr>
+          <p:cNvPr id="6" name="Content Placeholder 2"/>
+          <p:cNvSpPr txBox="1">
+            <a:spLocks/>
+          </p:cNvSpPr>
+          <p:nvPr/>
+        </p:nvSpPr>
+        <p:spPr>
+          <a:xfrm>
+            <a:off x="476534" y="1312325"/>
+            <a:ext cx="10987585" cy="4329621"/>
+          </a:xfrm>
+          <a:prstGeom prst="rect">
+            <a:avLst/>
+          </a:prstGeom>
+        </p:spPr>
+        <p:txBody>
+          <a:bodyPr vert="horz" lIns="91440" tIns="45720" rIns="91440" bIns="45720" rtlCol="0">
+            <a:noAutofit/>
+          </a:bodyPr>
+          <a:lstStyle>
+            <a:lvl1pPr marL="273050" marR="0" indent="-273050" algn="l" defTabSz="914400" rtl="0" eaLnBrk="1" fontAlgn="auto" latinLnBrk="0" hangingPunct="1">
+              <a:lnSpc>
+                <a:spcPct val="100000"/>
+              </a:lnSpc>
+              <a:spcBef>
+                <a:spcPts val="1200"/>
+              </a:spcBef>
+              <a:spcAft>
+                <a:spcPts val="0"/>
+              </a:spcAft>
+              <a:buClr>
+                <a:srgbClr val="DA1218"/>
+              </a:buClr>
+              <a:buSzTx/>
+              <a:buFont typeface="Wingdings" pitchFamily="2" charset="2"/>
+              <a:buChar char="§"/>
+              <a:tabLst/>
+              <a:defRPr lang="en-US" sz="2400" kern="1200">
+                <a:solidFill>
+                  <a:schemeClr val="tx1"/>
+                </a:solidFill>
+                <a:latin typeface="Arial" pitchFamily="34" charset="0"/>
+                <a:ea typeface="+mn-ea"/>
+                <a:cs typeface="Arial" pitchFamily="34" charset="0"/>
+              </a:defRPr>
+            </a:lvl1pPr>
+            <a:lvl2pPr marL="628650" marR="0" indent="-355600" algn="l" defTabSz="914400" rtl="0" eaLnBrk="1" fontAlgn="auto" latinLnBrk="0" hangingPunct="1">
+              <a:lnSpc>
+                <a:spcPct val="100000"/>
+              </a:lnSpc>
+              <a:spcBef>
+                <a:spcPct val="20000"/>
+              </a:spcBef>
+              <a:spcAft>
+                <a:spcPts val="0"/>
+              </a:spcAft>
+              <a:buClr>
+                <a:srgbClr val="DA1218"/>
+              </a:buClr>
+              <a:buSzTx/>
+              <a:buFont typeface="Wingdings" pitchFamily="2" charset="2"/>
+              <a:buChar char=""/>
+              <a:tabLst/>
+              <a:defRPr lang="en-US" sz="2000" kern="1200">
+                <a:solidFill>
+                  <a:schemeClr val="tx1"/>
+                </a:solidFill>
+                <a:latin typeface="Arial" pitchFamily="34" charset="0"/>
+                <a:ea typeface="+mn-ea"/>
+                <a:cs typeface="Arial" pitchFamily="34" charset="0"/>
+              </a:defRPr>
+            </a:lvl2pPr>
+            <a:lvl3pPr marL="903288" marR="0" indent="-274638" algn="l" defTabSz="914400" rtl="0" eaLnBrk="1" fontAlgn="auto" latinLnBrk="0" hangingPunct="1">
+              <a:lnSpc>
+                <a:spcPct val="100000"/>
+              </a:lnSpc>
+              <a:spcBef>
+                <a:spcPct val="20000"/>
+              </a:spcBef>
+              <a:spcAft>
+                <a:spcPts val="0"/>
+              </a:spcAft>
+              <a:buClr>
+                <a:srgbClr val="DA1218"/>
+              </a:buClr>
+              <a:buSzTx/>
+              <a:buFont typeface="Wingdings" pitchFamily="2" charset="2"/>
+              <a:buChar char="ü"/>
+              <a:tabLst/>
+              <a:defRPr lang="en-US" sz="1800" kern="1200">
+                <a:solidFill>
+                  <a:schemeClr val="tx1"/>
+                </a:solidFill>
+                <a:latin typeface="Arial" pitchFamily="34" charset="0"/>
+                <a:ea typeface="+mn-ea"/>
+                <a:cs typeface="Arial" pitchFamily="34" charset="0"/>
+              </a:defRPr>
+            </a:lvl3pPr>
+            <a:lvl4pPr marL="1081088" marR="0" indent="-177800" algn="l" defTabSz="914400" rtl="0" eaLnBrk="1" fontAlgn="auto" latinLnBrk="0" hangingPunct="1">
+              <a:lnSpc>
+                <a:spcPct val="100000"/>
+              </a:lnSpc>
+              <a:spcBef>
+                <a:spcPct val="20000"/>
+              </a:spcBef>
+              <a:spcAft>
+                <a:spcPts val="0"/>
+              </a:spcAft>
+              <a:buClr>
+                <a:srgbClr val="DA1218"/>
+              </a:buClr>
+              <a:buSzTx/>
+              <a:buFont typeface="Arial" pitchFamily="34" charset="0"/>
+              <a:buChar char="•"/>
+              <a:tabLst/>
+              <a:defRPr lang="en-US" sz="1600" kern="1200">
+                <a:solidFill>
+                  <a:schemeClr val="tx1"/>
+                </a:solidFill>
+                <a:latin typeface="Arial" pitchFamily="34" charset="0"/>
+                <a:ea typeface="+mn-ea"/>
+                <a:cs typeface="Arial" pitchFamily="34" charset="0"/>
+              </a:defRPr>
+            </a:lvl4pPr>
+            <a:lvl5pPr marL="1258888" marR="0" indent="-177800" algn="l" defTabSz="914400" rtl="0" eaLnBrk="1" fontAlgn="auto" latinLnBrk="0" hangingPunct="1">
+              <a:lnSpc>
+                <a:spcPct val="100000"/>
+              </a:lnSpc>
+              <a:spcBef>
+                <a:spcPct val="20000"/>
+              </a:spcBef>
+              <a:spcAft>
+                <a:spcPts val="0"/>
+              </a:spcAft>
+              <a:buClr>
+                <a:srgbClr val="DA1218"/>
+              </a:buClr>
+              <a:buSzPct val="100000"/>
+              <a:buFont typeface="Courier New" pitchFamily="49" charset="0"/>
+              <a:buChar char="o"/>
+              <a:tabLst/>
+              <a:defRPr lang="es-AR" sz="1400" kern="1200">
+                <a:solidFill>
+                  <a:schemeClr val="tx1"/>
+                </a:solidFill>
+                <a:latin typeface="Arial" pitchFamily="34" charset="0"/>
+                <a:ea typeface="+mn-ea"/>
+                <a:cs typeface="Arial" pitchFamily="34" charset="0"/>
+              </a:defRPr>
+            </a:lvl5pPr>
+            <a:lvl6pPr marL="2514600" indent="-228600" algn="l" defTabSz="914400" rtl="0" eaLnBrk="1" latinLnBrk="0" hangingPunct="1">
+              <a:spcBef>
+                <a:spcPct val="20000"/>
+              </a:spcBef>
+              <a:buFont typeface="Arial" pitchFamily="34" charset="0"/>
+              <a:buChar char="•"/>
+              <a:defRPr sz="2000" kern="1200">
+                <a:solidFill>
+                  <a:schemeClr val="tx1"/>
+                </a:solidFill>
+                <a:latin typeface="+mn-lt"/>
+                <a:ea typeface="+mn-ea"/>
+                <a:cs typeface="+mn-cs"/>
+              </a:defRPr>
+            </a:lvl6pPr>
+            <a:lvl7pPr marL="2971800" indent="-228600" algn="l" defTabSz="914400" rtl="0" eaLnBrk="1" latinLnBrk="0" hangingPunct="1">
+              <a:spcBef>
+                <a:spcPct val="20000"/>
+              </a:spcBef>
+              <a:buFont typeface="Arial" pitchFamily="34" charset="0"/>
+              <a:buChar char="•"/>
+              <a:defRPr sz="2000" kern="1200">
+                <a:solidFill>
+                  <a:schemeClr val="tx1"/>
+                </a:solidFill>
+                <a:latin typeface="+mn-lt"/>
+                <a:ea typeface="+mn-ea"/>
+                <a:cs typeface="+mn-cs"/>
+              </a:defRPr>
+            </a:lvl7pPr>
+            <a:lvl8pPr marL="3429000" indent="-228600" algn="l" defTabSz="914400" rtl="0" eaLnBrk="1" latinLnBrk="0" hangingPunct="1">
+              <a:spcBef>
+                <a:spcPct val="20000"/>
+              </a:spcBef>
+              <a:buFont typeface="Arial" pitchFamily="34" charset="0"/>
+              <a:buChar char="•"/>
+              <a:defRPr sz="2000" kern="1200">
+                <a:solidFill>
+                  <a:schemeClr val="tx1"/>
+                </a:solidFill>
+                <a:latin typeface="+mn-lt"/>
+                <a:ea typeface="+mn-ea"/>
+                <a:cs typeface="+mn-cs"/>
+              </a:defRPr>
+            </a:lvl8pPr>
+            <a:lvl9pPr marL="3886200" indent="-228600" algn="l" defTabSz="914400" rtl="0" eaLnBrk="1" latinLnBrk="0" hangingPunct="1">
+              <a:spcBef>
+                <a:spcPct val="20000"/>
+              </a:spcBef>
+              <a:buFont typeface="Arial" pitchFamily="34" charset="0"/>
+              <a:buChar char="•"/>
+              <a:defRPr sz="2000" kern="1200">
+                <a:solidFill>
+                  <a:schemeClr val="tx1"/>
+                </a:solidFill>
+                <a:latin typeface="+mn-lt"/>
+                <a:ea typeface="+mn-ea"/>
+                <a:cs typeface="+mn-cs"/>
+              </a:defRPr>
+            </a:lvl9pPr>
+          </a:lstStyle>
+          <a:p>
+            <a:pPr marL="0" lvl="1" indent="0">
+              <a:spcBef>
+                <a:spcPts val="1200"/>
+              </a:spcBef>
+              <a:buClrTx/>
+              <a:buNone/>
+            </a:pPr>
+            <a:r>
+              <a:rPr lang="en-US" dirty="0">
+                <a:latin typeface="Avenir 45 Book (Body)"/>
+              </a:rPr>
+              <a:t>With these practices you will also be able </a:t>
+            </a:r>
+            <a:r>
+              <a:rPr lang="en-US" dirty="0" smtClean="0">
+                <a:latin typeface="Avenir 45 Book (Body)"/>
+              </a:rPr>
+              <a:t>to</a:t>
+            </a:r>
+            <a:r>
+              <a:rPr lang="en-GB" dirty="0" smtClean="0">
+                <a:latin typeface="Avenir 45 Book (Body)"/>
+              </a:rPr>
+              <a:t>:</a:t>
+            </a:r>
+            <a:endParaRPr lang="en-GB" dirty="0" smtClean="0">
+              <a:latin typeface="Avenir 45 Book (Body)"/>
+            </a:endParaRPr>
+          </a:p>
+          <a:p>
+            <a:pPr marL="0" lvl="1" indent="0">
+              <a:spcBef>
+                <a:spcPts val="1200"/>
+              </a:spcBef>
+              <a:buClrTx/>
+              <a:buFont typeface="Wingdings" panose="05000000000000000000" pitchFamily="2" charset="2"/>
+              <a:buChar char="§"/>
+            </a:pPr>
+            <a:endParaRPr lang="en-GB" dirty="0" smtClean="0">
+              <a:latin typeface="Avenir 45 Book (Body)"/>
+            </a:endParaRPr>
+          </a:p>
+          <a:p>
+            <a:pPr marL="0" lvl="1" indent="0">
+              <a:spcBef>
+                <a:spcPts val="1200"/>
+              </a:spcBef>
+              <a:buClrTx/>
+              <a:buFont typeface="Wingdings" panose="05000000000000000000" pitchFamily="2" charset="2"/>
+              <a:buChar char="§"/>
+            </a:pPr>
+            <a:r>
+              <a:rPr lang="en-GB" dirty="0" smtClean="0">
+                <a:latin typeface="Avenir 45 Book (Body)"/>
+              </a:rPr>
+              <a:t> Improve </a:t>
+            </a:r>
+            <a:r>
+              <a:rPr lang="en-GB" dirty="0" smtClean="0">
+                <a:latin typeface="Avenir 45 Book (Body)"/>
+              </a:rPr>
+              <a:t>the development team’s internal organization</a:t>
+            </a:r>
+          </a:p>
+          <a:p>
+            <a:pPr marL="0" lvl="1" indent="0">
+              <a:spcBef>
+                <a:spcPts val="1200"/>
+              </a:spcBef>
+              <a:buClrTx/>
+              <a:buFont typeface="Wingdings" panose="05000000000000000000" pitchFamily="2" charset="2"/>
+              <a:buChar char="§"/>
+            </a:pPr>
+            <a:r>
+              <a:rPr lang="en-GB" dirty="0">
+                <a:latin typeface="Avenir 45 Book (Body)"/>
+              </a:rPr>
+              <a:t> </a:t>
+            </a:r>
+            <a:r>
+              <a:rPr lang="en-GB" dirty="0" smtClean="0">
+                <a:latin typeface="Avenir 45 Book (Body)"/>
+              </a:rPr>
+              <a:t>Maintain a current build always available for testing, demos or deployment</a:t>
+            </a:r>
+          </a:p>
+          <a:p>
+            <a:pPr marL="0" lvl="1" indent="0">
+              <a:spcBef>
+                <a:spcPts val="1200"/>
+              </a:spcBef>
+              <a:buClrTx/>
+              <a:buFont typeface="Wingdings" panose="05000000000000000000" pitchFamily="2" charset="2"/>
+              <a:buChar char="§"/>
+            </a:pPr>
+            <a:r>
+              <a:rPr lang="en-GB" dirty="0" smtClean="0">
+                <a:latin typeface="Avenir 45 Book (Body)"/>
+              </a:rPr>
+              <a:t> Allow you to generate metrics of code quality, test coverage, etc</a:t>
+            </a:r>
+            <a:r>
+              <a:rPr lang="en-GB" dirty="0" smtClean="0">
+                <a:latin typeface="Avenir 45 Book (Body)"/>
+              </a:rPr>
+              <a:t>.</a:t>
+            </a:r>
+            <a:endParaRPr lang="en-GB" dirty="0">
+              <a:latin typeface="Avenir 45 Book (Body)"/>
+            </a:endParaRPr>
+          </a:p>
+          <a:p>
+            <a:pPr lvl="0" defTabSz="914363">
+              <a:lnSpc>
+                <a:spcPct val="90000"/>
+              </a:lnSpc>
+              <a:spcBef>
+                <a:spcPts val="0"/>
+              </a:spcBef>
+              <a:spcAft>
+                <a:spcPts val="400"/>
+              </a:spcAft>
+              <a:buClr>
+                <a:schemeClr val="tx1">
+                  <a:lumMod val="75000"/>
+                  <a:lumOff val="25000"/>
+                </a:schemeClr>
+              </a:buClr>
+              <a:buSzPct val="100000"/>
+              <a:buFont typeface="Wingdings" panose="05000000000000000000" pitchFamily="2" charset="2"/>
+              <a:buChar char="ä"/>
+            </a:pPr>
+            <a:endParaRPr lang="es-AR" sz="1600" b="1" dirty="0">
+              <a:solidFill>
+                <a:srgbClr val="000000"/>
+              </a:solidFill>
+              <a:latin typeface="Avenir 45 Book (Body)"/>
+              <a:cs typeface="+mn-cs"/>
+            </a:endParaRPr>
+          </a:p>
+        </p:txBody>
+      </p:sp>
+    </p:spTree>
+    <p:extLst>
+      <p:ext uri="{BB962C8B-B14F-4D97-AF65-F5344CB8AC3E}">
+        <p14:creationId xmlns:p14="http://schemas.microsoft.com/office/powerpoint/2010/main" val="1925881899"/>
+      </p:ext>
+    </p:extLst>
+  </p:cSld>
+  <p:clrMapOvr>
+    <a:masterClrMapping/>
+  </p:clrMapOvr>
+  <p:transition spd="slow">
+    <p:wipe/>
+  </p:transition>
+  <p:timing>
+    <p:tnLst>
+      <p:par>
+        <p:cTn id="1" dur="indefinite" restart="never" nodeType="tmRoot"/>
+      </p:par>
+    </p:tnLst>
+  </p:timing>
+</p:sld>
+</file>
+
+<file path=ppt/slides/slide26.xml><?xml version="1.0" encoding="utf-8"?>
+<p:sld xmlns:a="http://schemas.openxmlformats.org/drawingml/2006/main" xmlns:r="http://schemas.openxmlformats.org/officeDocument/2006/relationships" xmlns:p="http://schemas.openxmlformats.org/presentationml/2006/main">
+  <p:cSld>
+    <p:spTree>
+      <p:nvGrpSpPr>
+        <p:cNvPr id="1" name=""/>
+        <p:cNvGrpSpPr/>
+        <p:nvPr/>
+      </p:nvGrpSpPr>
+      <p:grpSpPr>
+        <a:xfrm>
+          <a:off x="0" y="0"/>
+          <a:ext cx="0" cy="0"/>
+          <a:chOff x="0" y="0"/>
+          <a:chExt cx="0" cy="0"/>
+        </a:xfrm>
+      </p:grpSpPr>
+      <p:sp>
+        <p:nvSpPr>
+          <p:cNvPr id="15" name="Rectangle 14"/>
+          <p:cNvSpPr/>
+          <p:nvPr/>
+        </p:nvSpPr>
+        <p:spPr>
+          <a:xfrm>
+            <a:off x="-13252" y="1"/>
+            <a:ext cx="12218504" cy="1016000"/>
+          </a:xfrm>
+          <a:prstGeom prst="rect">
+            <a:avLst/>
+          </a:prstGeom>
+          <a:solidFill>
+            <a:srgbClr val="FF9600"/>
+          </a:solidFill>
+          <a:ln>
+            <a:noFill/>
+          </a:ln>
+        </p:spPr>
+        <p:style>
+          <a:lnRef idx="1">
+            <a:schemeClr val="accent6"/>
+          </a:lnRef>
+          <a:fillRef idx="3">
+            <a:schemeClr val="accent6"/>
+          </a:fillRef>
+          <a:effectRef idx="2">
+            <a:schemeClr val="accent6"/>
+          </a:effectRef>
+          <a:fontRef idx="minor">
+            <a:schemeClr val="lt1"/>
+          </a:fontRef>
+        </p:style>
+        <p:txBody>
+          <a:bodyPr anchor="ctr"/>
+          <a:lstStyle/>
+          <a:p>
+            <a:pPr marL="0" marR="0" lvl="0" indent="0" algn="ctr" defTabSz="914400" eaLnBrk="1" fontAlgn="auto" latinLnBrk="0" hangingPunct="1">
+              <a:lnSpc>
+                <a:spcPct val="100000"/>
+              </a:lnSpc>
+              <a:spcBef>
+                <a:spcPts val="0"/>
+              </a:spcBef>
+              <a:spcAft>
+                <a:spcPts val="0"/>
+              </a:spcAft>
+              <a:buClrTx/>
+              <a:buSzTx/>
+              <a:buFontTx/>
+              <a:buNone/>
+              <a:tabLst/>
+              <a:defRPr/>
+            </a:pPr>
+            <a:r>
+              <a:rPr kumimoji="0" lang="es-ES_tradnl" sz="1800" b="0" i="0" u="none" strike="noStrike" kern="0" cap="none" spc="0" normalizeH="0" baseline="0" noProof="0" dirty="0" smtClean="0">
+                <a:ln>
+                  <a:noFill/>
+                </a:ln>
+                <a:solidFill>
+                  <a:srgbClr val="FFFFFF"/>
+                </a:solidFill>
+                <a:effectLst/>
+                <a:uLnTx/>
+                <a:uFillTx/>
+                <a:latin typeface="Arial"/>
+                <a:ea typeface="ＭＳ Ｐゴシック" pitchFamily="-108" charset="-128"/>
+                <a:cs typeface="+mn-cs"/>
+              </a:rPr>
+              <a:t>  </a:t>
+            </a:r>
+            <a:endParaRPr kumimoji="0" lang="es-ES_tradnl" sz="1800" b="0" i="0" u="none" strike="noStrike" kern="0" cap="none" spc="0" normalizeH="0" baseline="0" noProof="0" dirty="0">
+              <a:ln>
+                <a:noFill/>
+              </a:ln>
+              <a:solidFill>
+                <a:srgbClr val="FFFFFF"/>
+              </a:solidFill>
+              <a:effectLst/>
+              <a:uLnTx/>
+              <a:uFillTx/>
+              <a:latin typeface="Arial"/>
+              <a:ea typeface="ＭＳ Ｐゴシック" pitchFamily="-108" charset="-128"/>
+              <a:cs typeface="+mn-cs"/>
+            </a:endParaRPr>
+          </a:p>
+        </p:txBody>
+      </p:sp>
+      <p:sp>
+        <p:nvSpPr>
+          <p:cNvPr id="16" name="TextBox 15"/>
+          <p:cNvSpPr txBox="1"/>
+          <p:nvPr/>
+        </p:nvSpPr>
+        <p:spPr>
+          <a:xfrm>
+            <a:off x="515936" y="212035"/>
+            <a:ext cx="11676063" cy="553998"/>
+          </a:xfrm>
+          <a:prstGeom prst="rect">
+            <a:avLst/>
+          </a:prstGeom>
+          <a:noFill/>
+        </p:spPr>
+        <p:txBody>
+          <a:bodyPr wrap="square" lIns="0" tIns="0" rIns="0" bIns="0" rtlCol="0">
+            <a:spAutoFit/>
+          </a:bodyPr>
+          <a:lstStyle/>
+          <a:p>
+            <a:r>
+              <a:rPr lang="en-US" sz="3600" dirty="0" smtClean="0">
+                <a:solidFill>
+                  <a:schemeClr val="bg1"/>
+                </a:solidFill>
+              </a:rPr>
+              <a:t>Part II: Scenes of the next episode…</a:t>
+            </a:r>
+            <a:endParaRPr lang="es-AR" sz="3600" dirty="0">
+              <a:solidFill>
+                <a:schemeClr val="bg1"/>
+              </a:solidFill>
+            </a:endParaRPr>
+          </a:p>
+        </p:txBody>
+      </p:sp>
+      <p:sp>
+        <p:nvSpPr>
+          <p:cNvPr id="6" name="Content Placeholder 2"/>
+          <p:cNvSpPr txBox="1">
+            <a:spLocks/>
+          </p:cNvSpPr>
+          <p:nvPr/>
+        </p:nvSpPr>
+        <p:spPr>
+          <a:xfrm>
+            <a:off x="476534" y="1312325"/>
+            <a:ext cx="10987585" cy="4329621"/>
+          </a:xfrm>
+          <a:prstGeom prst="rect">
+            <a:avLst/>
+          </a:prstGeom>
+        </p:spPr>
+        <p:txBody>
+          <a:bodyPr vert="horz" lIns="91440" tIns="45720" rIns="91440" bIns="45720" rtlCol="0">
+            <a:noAutofit/>
+          </a:bodyPr>
+          <a:lstStyle>
+            <a:lvl1pPr marL="273050" marR="0" indent="-273050" algn="l" defTabSz="914400" rtl="0" eaLnBrk="1" fontAlgn="auto" latinLnBrk="0" hangingPunct="1">
+              <a:lnSpc>
+                <a:spcPct val="100000"/>
+              </a:lnSpc>
+              <a:spcBef>
+                <a:spcPts val="1200"/>
+              </a:spcBef>
+              <a:spcAft>
+                <a:spcPts val="0"/>
+              </a:spcAft>
+              <a:buClr>
+                <a:srgbClr val="DA1218"/>
+              </a:buClr>
+              <a:buSzTx/>
+              <a:buFont typeface="Wingdings" pitchFamily="2" charset="2"/>
+              <a:buChar char="§"/>
+              <a:tabLst/>
+              <a:defRPr lang="en-US" sz="2400" kern="1200">
+                <a:solidFill>
+                  <a:schemeClr val="tx1"/>
+                </a:solidFill>
+                <a:latin typeface="Arial" pitchFamily="34" charset="0"/>
+                <a:ea typeface="+mn-ea"/>
+                <a:cs typeface="Arial" pitchFamily="34" charset="0"/>
+              </a:defRPr>
+            </a:lvl1pPr>
+            <a:lvl2pPr marL="628650" marR="0" indent="-355600" algn="l" defTabSz="914400" rtl="0" eaLnBrk="1" fontAlgn="auto" latinLnBrk="0" hangingPunct="1">
+              <a:lnSpc>
+                <a:spcPct val="100000"/>
+              </a:lnSpc>
+              <a:spcBef>
+                <a:spcPct val="20000"/>
+              </a:spcBef>
+              <a:spcAft>
+                <a:spcPts val="0"/>
+              </a:spcAft>
+              <a:buClr>
+                <a:srgbClr val="DA1218"/>
+              </a:buClr>
+              <a:buSzTx/>
+              <a:buFont typeface="Wingdings" pitchFamily="2" charset="2"/>
+              <a:buChar char=""/>
+              <a:tabLst/>
+              <a:defRPr lang="en-US" sz="2000" kern="1200">
+                <a:solidFill>
+                  <a:schemeClr val="tx1"/>
+                </a:solidFill>
+                <a:latin typeface="Arial" pitchFamily="34" charset="0"/>
+                <a:ea typeface="+mn-ea"/>
+                <a:cs typeface="Arial" pitchFamily="34" charset="0"/>
+              </a:defRPr>
+            </a:lvl2pPr>
+            <a:lvl3pPr marL="903288" marR="0" indent="-274638" algn="l" defTabSz="914400" rtl="0" eaLnBrk="1" fontAlgn="auto" latinLnBrk="0" hangingPunct="1">
+              <a:lnSpc>
+                <a:spcPct val="100000"/>
+              </a:lnSpc>
+              <a:spcBef>
+                <a:spcPct val="20000"/>
+              </a:spcBef>
+              <a:spcAft>
+                <a:spcPts val="0"/>
+              </a:spcAft>
+              <a:buClr>
+                <a:srgbClr val="DA1218"/>
+              </a:buClr>
+              <a:buSzTx/>
+              <a:buFont typeface="Wingdings" pitchFamily="2" charset="2"/>
+              <a:buChar char="ü"/>
+              <a:tabLst/>
+              <a:defRPr lang="en-US" sz="1800" kern="1200">
+                <a:solidFill>
+                  <a:schemeClr val="tx1"/>
+                </a:solidFill>
+                <a:latin typeface="Arial" pitchFamily="34" charset="0"/>
+                <a:ea typeface="+mn-ea"/>
+                <a:cs typeface="Arial" pitchFamily="34" charset="0"/>
+              </a:defRPr>
+            </a:lvl3pPr>
+            <a:lvl4pPr marL="1081088" marR="0" indent="-177800" algn="l" defTabSz="914400" rtl="0" eaLnBrk="1" fontAlgn="auto" latinLnBrk="0" hangingPunct="1">
+              <a:lnSpc>
+                <a:spcPct val="100000"/>
+              </a:lnSpc>
+              <a:spcBef>
+                <a:spcPct val="20000"/>
+              </a:spcBef>
+              <a:spcAft>
+                <a:spcPts val="0"/>
+              </a:spcAft>
+              <a:buClr>
+                <a:srgbClr val="DA1218"/>
+              </a:buClr>
+              <a:buSzTx/>
+              <a:buFont typeface="Arial" pitchFamily="34" charset="0"/>
+              <a:buChar char="•"/>
+              <a:tabLst/>
+              <a:defRPr lang="en-US" sz="1600" kern="1200">
+                <a:solidFill>
+                  <a:schemeClr val="tx1"/>
+                </a:solidFill>
+                <a:latin typeface="Arial" pitchFamily="34" charset="0"/>
+                <a:ea typeface="+mn-ea"/>
+                <a:cs typeface="Arial" pitchFamily="34" charset="0"/>
+              </a:defRPr>
+            </a:lvl4pPr>
+            <a:lvl5pPr marL="1258888" marR="0" indent="-177800" algn="l" defTabSz="914400" rtl="0" eaLnBrk="1" fontAlgn="auto" latinLnBrk="0" hangingPunct="1">
+              <a:lnSpc>
+                <a:spcPct val="100000"/>
+              </a:lnSpc>
+              <a:spcBef>
+                <a:spcPct val="20000"/>
+              </a:spcBef>
+              <a:spcAft>
+                <a:spcPts val="0"/>
+              </a:spcAft>
+              <a:buClr>
+                <a:srgbClr val="DA1218"/>
+              </a:buClr>
+              <a:buSzPct val="100000"/>
+              <a:buFont typeface="Courier New" pitchFamily="49" charset="0"/>
+              <a:buChar char="o"/>
+              <a:tabLst/>
+              <a:defRPr lang="es-AR" sz="1400" kern="1200">
+                <a:solidFill>
+                  <a:schemeClr val="tx1"/>
+                </a:solidFill>
+                <a:latin typeface="Arial" pitchFamily="34" charset="0"/>
+                <a:ea typeface="+mn-ea"/>
+                <a:cs typeface="Arial" pitchFamily="34" charset="0"/>
+              </a:defRPr>
+            </a:lvl5pPr>
+            <a:lvl6pPr marL="2514600" indent="-228600" algn="l" defTabSz="914400" rtl="0" eaLnBrk="1" latinLnBrk="0" hangingPunct="1">
+              <a:spcBef>
+                <a:spcPct val="20000"/>
+              </a:spcBef>
+              <a:buFont typeface="Arial" pitchFamily="34" charset="0"/>
+              <a:buChar char="•"/>
+              <a:defRPr sz="2000" kern="1200">
+                <a:solidFill>
+                  <a:schemeClr val="tx1"/>
+                </a:solidFill>
+                <a:latin typeface="+mn-lt"/>
+                <a:ea typeface="+mn-ea"/>
+                <a:cs typeface="+mn-cs"/>
+              </a:defRPr>
+            </a:lvl6pPr>
+            <a:lvl7pPr marL="2971800" indent="-228600" algn="l" defTabSz="914400" rtl="0" eaLnBrk="1" latinLnBrk="0" hangingPunct="1">
+              <a:spcBef>
+                <a:spcPct val="20000"/>
+              </a:spcBef>
+              <a:buFont typeface="Arial" pitchFamily="34" charset="0"/>
+              <a:buChar char="•"/>
+              <a:defRPr sz="2000" kern="1200">
+                <a:solidFill>
+                  <a:schemeClr val="tx1"/>
+                </a:solidFill>
+                <a:latin typeface="+mn-lt"/>
+                <a:ea typeface="+mn-ea"/>
+                <a:cs typeface="+mn-cs"/>
+              </a:defRPr>
+            </a:lvl7pPr>
+            <a:lvl8pPr marL="3429000" indent="-228600" algn="l" defTabSz="914400" rtl="0" eaLnBrk="1" latinLnBrk="0" hangingPunct="1">
+              <a:spcBef>
+                <a:spcPct val="20000"/>
+              </a:spcBef>
+              <a:buFont typeface="Arial" pitchFamily="34" charset="0"/>
+              <a:buChar char="•"/>
+              <a:defRPr sz="2000" kern="1200">
+                <a:solidFill>
+                  <a:schemeClr val="tx1"/>
+                </a:solidFill>
+                <a:latin typeface="+mn-lt"/>
+                <a:ea typeface="+mn-ea"/>
+                <a:cs typeface="+mn-cs"/>
+              </a:defRPr>
+            </a:lvl8pPr>
+            <a:lvl9pPr marL="3886200" indent="-228600" algn="l" defTabSz="914400" rtl="0" eaLnBrk="1" latinLnBrk="0" hangingPunct="1">
+              <a:spcBef>
+                <a:spcPct val="20000"/>
+              </a:spcBef>
+              <a:buFont typeface="Arial" pitchFamily="34" charset="0"/>
+              <a:buChar char="•"/>
+              <a:defRPr sz="2000" kern="1200">
+                <a:solidFill>
+                  <a:schemeClr val="tx1"/>
+                </a:solidFill>
+                <a:latin typeface="+mn-lt"/>
+                <a:ea typeface="+mn-ea"/>
+                <a:cs typeface="+mn-cs"/>
+              </a:defRPr>
+            </a:lvl9pPr>
+          </a:lstStyle>
+          <a:p>
+            <a:pPr marL="0" lvl="1" indent="0">
+              <a:spcBef>
+                <a:spcPts val="1200"/>
+              </a:spcBef>
+              <a:buClrTx/>
               <a:buFont typeface="Wingdings" panose="05000000000000000000" pitchFamily="2" charset="2"/>
               <a:buChar char="§"/>
             </a:pPr>
@@ -23973,7 +24980,7 @@
 </p:sld>
 </file>
 
-<file path=ppt/slides/slide25.xml><?xml version="1.0" encoding="utf-8"?>
+<file path=ppt/slides/slide27.xml><?xml version="1.0" encoding="utf-8"?>
 <p:sld xmlns:a="http://schemas.openxmlformats.org/drawingml/2006/main" xmlns:r="http://schemas.openxmlformats.org/officeDocument/2006/relationships" xmlns:p="http://schemas.openxmlformats.org/presentationml/2006/main">
   <p:cSld>
     <p:spTree>
@@ -25154,13 +26161,13 @@
           <a:lstStyle/>
           <a:p>
             <a:r>
-              <a:rPr lang="es-AR" sz="4800" dirty="0" smtClean="0">
+              <a:rPr lang="en-GB" sz="6000" dirty="0" smtClean="0">
                 <a:solidFill>
                   <a:schemeClr val="bg1"/>
                 </a:solidFill>
                 <a:latin typeface="Calibri" panose="020F0502020204030204" pitchFamily="34" charset="0"/>
               </a:rPr>
-              <a:t>¡</a:t>
+              <a:t>Thanks</a:t>
             </a:r>
             <a:r>
               <a:rPr lang="es-AR" sz="6000" dirty="0" smtClean="0">
@@ -25169,7 +26176,7 @@
                 </a:solidFill>
                 <a:latin typeface="Calibri" panose="020F0502020204030204" pitchFamily="34" charset="0"/>
               </a:rPr>
-              <a:t>Muchas Gracias!</a:t>
+              <a:t>!</a:t>
             </a:r>
             <a:r>
               <a:rPr lang="es-AR" sz="4800" dirty="0" smtClean="0">
@@ -28730,6 +29737,9 @@
             </a:lvl9pPr>
           </a:lstStyle>
           <a:p>
+            <a:pPr>
+              <a:buClrTx/>
+            </a:pPr>
             <a:r>
               <a:rPr lang="en-US" sz="2000" dirty="0">
                 <a:latin typeface="Avenir 45 Book (Body)"/>
@@ -28738,6 +29748,9 @@
             </a:r>
           </a:p>
           <a:p>
+            <a:pPr>
+              <a:buClrTx/>
+            </a:pPr>
             <a:r>
               <a:rPr lang="en-US" sz="2000" dirty="0">
                 <a:latin typeface="Avenir 45 Book (Body)"/>
@@ -28746,6 +29759,9 @@
             </a:r>
           </a:p>
           <a:p>
+            <a:pPr>
+              <a:buClrTx/>
+            </a:pPr>
             <a:r>
               <a:rPr lang="en-US" sz="2000" dirty="0">
                 <a:latin typeface="Avenir 45 Book (Body)"/>
@@ -28754,6 +29770,9 @@
             </a:r>
           </a:p>
           <a:p>
+            <a:pPr>
+              <a:buClrTx/>
+            </a:pPr>
             <a:r>
               <a:rPr lang="en-US" sz="2000" dirty="0">
                 <a:latin typeface="Avenir 45 Book (Body)"/>
@@ -28766,6 +29785,7 @@
               <a:spcBef>
                 <a:spcPts val="1200"/>
               </a:spcBef>
+              <a:buClrTx/>
               <a:buFont typeface="Wingdings" panose="05000000000000000000" pitchFamily="2" charset="2"/>
               <a:buChar char="§"/>
             </a:pPr>
@@ -28781,6 +29801,7 @@
               <a:spcBef>
                 <a:spcPts val="1200"/>
               </a:spcBef>
+              <a:buClrTx/>
               <a:buFont typeface="Wingdings" panose="05000000000000000000" pitchFamily="2" charset="2"/>
               <a:buChar char="§"/>
             </a:pPr>
@@ -28792,6 +29813,9 @@
             </a:r>
           </a:p>
           <a:p>
+            <a:pPr>
+              <a:buClrTx/>
+            </a:pPr>
             <a:r>
               <a:rPr lang="en-US" sz="2000" dirty="0">
                 <a:latin typeface="Avenir 45 Book (Body)"/>
@@ -28804,6 +29828,7 @@
               <a:spcBef>
                 <a:spcPts val="1200"/>
               </a:spcBef>
+              <a:buClrTx/>
               <a:buFont typeface="Wingdings" panose="05000000000000000000" pitchFamily="2" charset="2"/>
               <a:buChar char="§"/>
             </a:pPr>
@@ -28819,6 +29844,7 @@
               <a:spcBef>
                 <a:spcPts val="1200"/>
               </a:spcBef>
+              <a:buClrTx/>
               <a:buFont typeface="Wingdings" panose="05000000000000000000" pitchFamily="2" charset="2"/>
               <a:buChar char="§"/>
             </a:pPr>
@@ -28834,6 +29860,7 @@
               <a:spcBef>
                 <a:spcPts val="1200"/>
               </a:spcBef>
+              <a:buClrTx/>
               <a:buFont typeface="Wingdings" panose="05000000000000000000" pitchFamily="2" charset="2"/>
               <a:buChar char="§"/>
             </a:pPr>
@@ -28849,6 +29876,7 @@
               <a:spcBef>
                 <a:spcPts val="1200"/>
               </a:spcBef>
+              <a:buClrTx/>
               <a:buFont typeface="Wingdings" panose="05000000000000000000" pitchFamily="2" charset="2"/>
               <a:buChar char="§"/>
             </a:pPr>
@@ -28864,6 +29892,7 @@
               <a:spcBef>
                 <a:spcPts val="1200"/>
               </a:spcBef>
+              <a:buClrTx/>
               <a:buFont typeface="Wingdings" panose="05000000000000000000" pitchFamily="2" charset="2"/>
               <a:buChar char="§"/>
             </a:pPr>

</xml_diff>